<commit_message>
Added Application Setup Section to report with graphic
</commit_message>
<xml_diff>
--- a/report/PPT/Application_Flow_Graph.pptx
+++ b/report/PPT/Application_Flow_Graph.pptx
@@ -1,19 +1,115 @@
 
 <file path=ppt/presentation.xml><?xml version="1.0" encoding="utf-8"?>
-<p:presentation xmlns:a="http://schemas.openxmlformats.org/drawingml/2006/main" xmlns:p="http://schemas.openxmlformats.org/presentationml/2006/main" xmlns:r="http://schemas.openxmlformats.org/officeDocument/2006/relationships" xmlns:p14="http://schemas.microsoft.com/office/powerpoint/2010/main" xmlns:p15="http://schemas.microsoft.com/office/powerpoint/2012/main" xmlns:mc="http://schemas.openxmlformats.org/markup-compatibility/2006">
+<p:presentation xmlns:a="http://schemas.openxmlformats.org/drawingml/2006/main" xmlns:r="http://schemas.openxmlformats.org/officeDocument/2006/relationships" xmlns:p="http://schemas.openxmlformats.org/presentationml/2006/main">
   <p:sldMasterIdLst>
-    <p:sldMasterId id="2147483648" r:id="rId2"/>
+    <p:sldMasterId id="2147483648" r:id="rId1"/>
   </p:sldMasterIdLst>
   <p:sldIdLst>
-    <p:sldId id="256" r:id="rId3"/>
+    <p:sldId id="256" r:id="rId2"/>
+    <p:sldId id="257" r:id="rId3"/>
   </p:sldIdLst>
   <p:sldSz cx="12192000" cy="6858000"/>
   <p:notesSz cx="7772400" cy="10058400"/>
+  <p:defaultTextStyle>
+    <a:defPPr>
+      <a:defRPr lang="de-DE"/>
+    </a:defPPr>
+    <a:lvl1pPr marL="0" algn="l" defTabSz="914400" rtl="0" eaLnBrk="1" latinLnBrk="0" hangingPunct="1">
+      <a:defRPr sz="1800" kern="1200">
+        <a:solidFill>
+          <a:schemeClr val="tx1"/>
+        </a:solidFill>
+        <a:latin typeface="+mn-lt"/>
+        <a:ea typeface="+mn-ea"/>
+        <a:cs typeface="+mn-cs"/>
+      </a:defRPr>
+    </a:lvl1pPr>
+    <a:lvl2pPr marL="457200" algn="l" defTabSz="914400" rtl="0" eaLnBrk="1" latinLnBrk="0" hangingPunct="1">
+      <a:defRPr sz="1800" kern="1200">
+        <a:solidFill>
+          <a:schemeClr val="tx1"/>
+        </a:solidFill>
+        <a:latin typeface="+mn-lt"/>
+        <a:ea typeface="+mn-ea"/>
+        <a:cs typeface="+mn-cs"/>
+      </a:defRPr>
+    </a:lvl2pPr>
+    <a:lvl3pPr marL="914400" algn="l" defTabSz="914400" rtl="0" eaLnBrk="1" latinLnBrk="0" hangingPunct="1">
+      <a:defRPr sz="1800" kern="1200">
+        <a:solidFill>
+          <a:schemeClr val="tx1"/>
+        </a:solidFill>
+        <a:latin typeface="+mn-lt"/>
+        <a:ea typeface="+mn-ea"/>
+        <a:cs typeface="+mn-cs"/>
+      </a:defRPr>
+    </a:lvl3pPr>
+    <a:lvl4pPr marL="1371600" algn="l" defTabSz="914400" rtl="0" eaLnBrk="1" latinLnBrk="0" hangingPunct="1">
+      <a:defRPr sz="1800" kern="1200">
+        <a:solidFill>
+          <a:schemeClr val="tx1"/>
+        </a:solidFill>
+        <a:latin typeface="+mn-lt"/>
+        <a:ea typeface="+mn-ea"/>
+        <a:cs typeface="+mn-cs"/>
+      </a:defRPr>
+    </a:lvl4pPr>
+    <a:lvl5pPr marL="1828800" algn="l" defTabSz="914400" rtl="0" eaLnBrk="1" latinLnBrk="0" hangingPunct="1">
+      <a:defRPr sz="1800" kern="1200">
+        <a:solidFill>
+          <a:schemeClr val="tx1"/>
+        </a:solidFill>
+        <a:latin typeface="+mn-lt"/>
+        <a:ea typeface="+mn-ea"/>
+        <a:cs typeface="+mn-cs"/>
+      </a:defRPr>
+    </a:lvl5pPr>
+    <a:lvl6pPr marL="2286000" algn="l" defTabSz="914400" rtl="0" eaLnBrk="1" latinLnBrk="0" hangingPunct="1">
+      <a:defRPr sz="1800" kern="1200">
+        <a:solidFill>
+          <a:schemeClr val="tx1"/>
+        </a:solidFill>
+        <a:latin typeface="+mn-lt"/>
+        <a:ea typeface="+mn-ea"/>
+        <a:cs typeface="+mn-cs"/>
+      </a:defRPr>
+    </a:lvl6pPr>
+    <a:lvl7pPr marL="2743200" algn="l" defTabSz="914400" rtl="0" eaLnBrk="1" latinLnBrk="0" hangingPunct="1">
+      <a:defRPr sz="1800" kern="1200">
+        <a:solidFill>
+          <a:schemeClr val="tx1"/>
+        </a:solidFill>
+        <a:latin typeface="+mn-lt"/>
+        <a:ea typeface="+mn-ea"/>
+        <a:cs typeface="+mn-cs"/>
+      </a:defRPr>
+    </a:lvl7pPr>
+    <a:lvl8pPr marL="3200400" algn="l" defTabSz="914400" rtl="0" eaLnBrk="1" latinLnBrk="0" hangingPunct="1">
+      <a:defRPr sz="1800" kern="1200">
+        <a:solidFill>
+          <a:schemeClr val="tx1"/>
+        </a:solidFill>
+        <a:latin typeface="+mn-lt"/>
+        <a:ea typeface="+mn-ea"/>
+        <a:cs typeface="+mn-cs"/>
+      </a:defRPr>
+    </a:lvl8pPr>
+    <a:lvl9pPr marL="3657600" algn="l" defTabSz="914400" rtl="0" eaLnBrk="1" latinLnBrk="0" hangingPunct="1">
+      <a:defRPr sz="1800" kern="1200">
+        <a:solidFill>
+          <a:schemeClr val="tx1"/>
+        </a:solidFill>
+        <a:latin typeface="+mn-lt"/>
+        <a:ea typeface="+mn-ea"/>
+        <a:cs typeface="+mn-cs"/>
+      </a:defRPr>
+    </a:lvl9pPr>
+  </p:defaultTextStyle>
 </p:presentation>
 </file>
 
 <file path=ppt/slideLayouts/slideLayout1.xml><?xml version="1.0" encoding="utf-8"?>
-<p:sldLayout xmlns:a="http://schemas.openxmlformats.org/drawingml/2006/main" xmlns:p="http://schemas.openxmlformats.org/presentationml/2006/main" xmlns:r="http://schemas.openxmlformats.org/officeDocument/2006/relationships" xmlns:p14="http://schemas.microsoft.com/office/powerpoint/2010/main" xmlns:p15="http://schemas.microsoft.com/office/powerpoint/2012/main" xmlns:mc="http://schemas.openxmlformats.org/markup-compatibility/2006" type="blank" preserve="1">
+<p:sldLayout xmlns:a="http://schemas.openxmlformats.org/drawingml/2006/main" xmlns:r="http://schemas.openxmlformats.org/officeDocument/2006/relationships" xmlns:p="http://schemas.openxmlformats.org/presentationml/2006/main" type="blank" preserve="1">
   <p:cSld name="Blank Slide">
     <p:spTree>
       <p:nvGrpSpPr>
@@ -31,11 +127,14 @@
       </p:grpSpPr>
     </p:spTree>
   </p:cSld>
+  <p:clrMapOvr>
+    <a:masterClrMapping/>
+  </p:clrMapOvr>
 </p:sldLayout>
 </file>
 
 <file path=ppt/slideLayouts/slideLayout10.xml><?xml version="1.0" encoding="utf-8"?>
-<p:sldLayout xmlns:a="http://schemas.openxmlformats.org/drawingml/2006/main" xmlns:p="http://schemas.openxmlformats.org/presentationml/2006/main" xmlns:r="http://schemas.openxmlformats.org/officeDocument/2006/relationships" xmlns:p14="http://schemas.microsoft.com/office/powerpoint/2010/main" xmlns:p15="http://schemas.microsoft.com/office/powerpoint/2012/main" xmlns:mc="http://schemas.openxmlformats.org/markup-compatibility/2006" type="objOverTx" preserve="1">
+<p:sldLayout xmlns:a="http://schemas.openxmlformats.org/drawingml/2006/main" xmlns:r="http://schemas.openxmlformats.org/officeDocument/2006/relationships" xmlns:p="http://schemas.openxmlformats.org/presentationml/2006/main" type="objOverTx" preserve="1">
   <p:cSld name="Title, Content over Content">
     <p:spTree>
       <p:nvGrpSpPr>
@@ -71,11 +170,12 @@
           </a:prstGeom>
         </p:spPr>
         <p:txBody>
-          <a:bodyPr lIns="0" rIns="0" tIns="0" bIns="0" anchor="ctr">
+          <a:bodyPr lIns="0" tIns="0" rIns="0" bIns="0" anchor="ctr">
             <a:spAutoFit/>
           </a:bodyPr>
-          <a:p>
-            <a:endParaRPr b="0" lang="de-DE" sz="1800" spc="-1" strike="noStrike">
+          <a:lstStyle/>
+          <a:p>
+            <a:endParaRPr lang="de-DE" sz="1800" b="0" strike="noStrike" spc="-1">
               <a:solidFill>
                 <a:srgbClr val="000000"/>
               </a:solidFill>
@@ -104,11 +204,12 @@
           </a:prstGeom>
         </p:spPr>
         <p:txBody>
-          <a:bodyPr lIns="0" rIns="0" tIns="0" bIns="0">
+          <a:bodyPr lIns="0" tIns="0" rIns="0" bIns="0">
             <a:normAutofit/>
           </a:bodyPr>
-          <a:p>
-            <a:endParaRPr b="0" lang="de-DE" sz="2800" spc="-1" strike="noStrike">
+          <a:lstStyle/>
+          <a:p>
+            <a:endParaRPr lang="de-DE" sz="2800" b="0" strike="noStrike" spc="-1">
               <a:solidFill>
                 <a:srgbClr val="000000"/>
               </a:solidFill>
@@ -137,11 +238,12 @@
           </a:prstGeom>
         </p:spPr>
         <p:txBody>
-          <a:bodyPr lIns="0" rIns="0" tIns="0" bIns="0">
+          <a:bodyPr lIns="0" tIns="0" rIns="0" bIns="0">
             <a:normAutofit/>
           </a:bodyPr>
-          <a:p>
-            <a:endParaRPr b="0" lang="de-DE" sz="2800" spc="-1" strike="noStrike">
+          <a:lstStyle/>
+          <a:p>
+            <a:endParaRPr lang="de-DE" sz="2800" b="0" strike="noStrike" spc="-1">
               <a:solidFill>
                 <a:srgbClr val="000000"/>
               </a:solidFill>
@@ -152,11 +254,14 @@
       </p:sp>
     </p:spTree>
   </p:cSld>
+  <p:clrMapOvr>
+    <a:masterClrMapping/>
+  </p:clrMapOvr>
 </p:sldLayout>
 </file>
 
 <file path=ppt/slideLayouts/slideLayout11.xml><?xml version="1.0" encoding="utf-8"?>
-<p:sldLayout xmlns:a="http://schemas.openxmlformats.org/drawingml/2006/main" xmlns:p="http://schemas.openxmlformats.org/presentationml/2006/main" xmlns:r="http://schemas.openxmlformats.org/officeDocument/2006/relationships" xmlns:p14="http://schemas.microsoft.com/office/powerpoint/2010/main" xmlns:p15="http://schemas.microsoft.com/office/powerpoint/2012/main" xmlns:mc="http://schemas.openxmlformats.org/markup-compatibility/2006" type="fourObj" preserve="1">
+<p:sldLayout xmlns:a="http://schemas.openxmlformats.org/drawingml/2006/main" xmlns:r="http://schemas.openxmlformats.org/officeDocument/2006/relationships" xmlns:p="http://schemas.openxmlformats.org/presentationml/2006/main" type="fourObj" preserve="1">
   <p:cSld name="Title, 4 Content">
     <p:spTree>
       <p:nvGrpSpPr>
@@ -192,11 +297,12 @@
           </a:prstGeom>
         </p:spPr>
         <p:txBody>
-          <a:bodyPr lIns="0" rIns="0" tIns="0" bIns="0" anchor="ctr">
+          <a:bodyPr lIns="0" tIns="0" rIns="0" bIns="0" anchor="ctr">
             <a:spAutoFit/>
           </a:bodyPr>
-          <a:p>
-            <a:endParaRPr b="0" lang="de-DE" sz="1800" spc="-1" strike="noStrike">
+          <a:lstStyle/>
+          <a:p>
+            <a:endParaRPr lang="de-DE" sz="1800" b="0" strike="noStrike" spc="-1">
               <a:solidFill>
                 <a:srgbClr val="000000"/>
               </a:solidFill>
@@ -225,11 +331,12 @@
           </a:prstGeom>
         </p:spPr>
         <p:txBody>
-          <a:bodyPr lIns="0" rIns="0" tIns="0" bIns="0">
+          <a:bodyPr lIns="0" tIns="0" rIns="0" bIns="0">
             <a:normAutofit/>
           </a:bodyPr>
-          <a:p>
-            <a:endParaRPr b="0" lang="de-DE" sz="2800" spc="-1" strike="noStrike">
+          <a:lstStyle/>
+          <a:p>
+            <a:endParaRPr lang="de-DE" sz="2800" b="0" strike="noStrike" spc="-1">
               <a:solidFill>
                 <a:srgbClr val="000000"/>
               </a:solidFill>
@@ -258,11 +365,12 @@
           </a:prstGeom>
         </p:spPr>
         <p:txBody>
-          <a:bodyPr lIns="0" rIns="0" tIns="0" bIns="0">
+          <a:bodyPr lIns="0" tIns="0" rIns="0" bIns="0">
             <a:normAutofit/>
           </a:bodyPr>
-          <a:p>
-            <a:endParaRPr b="0" lang="de-DE" sz="2800" spc="-1" strike="noStrike">
+          <a:lstStyle/>
+          <a:p>
+            <a:endParaRPr lang="de-DE" sz="2800" b="0" strike="noStrike" spc="-1">
               <a:solidFill>
                 <a:srgbClr val="000000"/>
               </a:solidFill>
@@ -291,11 +399,12 @@
           </a:prstGeom>
         </p:spPr>
         <p:txBody>
-          <a:bodyPr lIns="0" rIns="0" tIns="0" bIns="0">
+          <a:bodyPr lIns="0" tIns="0" rIns="0" bIns="0">
             <a:normAutofit/>
           </a:bodyPr>
-          <a:p>
-            <a:endParaRPr b="0" lang="de-DE" sz="2800" spc="-1" strike="noStrike">
+          <a:lstStyle/>
+          <a:p>
+            <a:endParaRPr lang="de-DE" sz="2800" b="0" strike="noStrike" spc="-1">
               <a:solidFill>
                 <a:srgbClr val="000000"/>
               </a:solidFill>
@@ -324,11 +433,12 @@
           </a:prstGeom>
         </p:spPr>
         <p:txBody>
-          <a:bodyPr lIns="0" rIns="0" tIns="0" bIns="0">
+          <a:bodyPr lIns="0" tIns="0" rIns="0" bIns="0">
             <a:normAutofit/>
           </a:bodyPr>
-          <a:p>
-            <a:endParaRPr b="0" lang="de-DE" sz="2800" spc="-1" strike="noStrike">
+          <a:lstStyle/>
+          <a:p>
+            <a:endParaRPr lang="de-DE" sz="2800" b="0" strike="noStrike" spc="-1">
               <a:solidFill>
                 <a:srgbClr val="000000"/>
               </a:solidFill>
@@ -339,11 +449,14 @@
       </p:sp>
     </p:spTree>
   </p:cSld>
+  <p:clrMapOvr>
+    <a:masterClrMapping/>
+  </p:clrMapOvr>
 </p:sldLayout>
 </file>
 
 <file path=ppt/slideLayouts/slideLayout12.xml><?xml version="1.0" encoding="utf-8"?>
-<p:sldLayout xmlns:a="http://schemas.openxmlformats.org/drawingml/2006/main" xmlns:p="http://schemas.openxmlformats.org/presentationml/2006/main" xmlns:r="http://schemas.openxmlformats.org/officeDocument/2006/relationships" xmlns:p14="http://schemas.microsoft.com/office/powerpoint/2010/main" xmlns:p15="http://schemas.microsoft.com/office/powerpoint/2012/main" xmlns:mc="http://schemas.openxmlformats.org/markup-compatibility/2006" type="blank" preserve="1">
+<p:sldLayout xmlns:a="http://schemas.openxmlformats.org/drawingml/2006/main" xmlns:r="http://schemas.openxmlformats.org/officeDocument/2006/relationships" xmlns:p="http://schemas.openxmlformats.org/presentationml/2006/main" type="blank" preserve="1">
   <p:cSld name="Title, 6 Content">
     <p:spTree>
       <p:nvGrpSpPr>
@@ -379,11 +492,12 @@
           </a:prstGeom>
         </p:spPr>
         <p:txBody>
-          <a:bodyPr lIns="0" rIns="0" tIns="0" bIns="0" anchor="ctr">
+          <a:bodyPr lIns="0" tIns="0" rIns="0" bIns="0" anchor="ctr">
             <a:spAutoFit/>
           </a:bodyPr>
-          <a:p>
-            <a:endParaRPr b="0" lang="de-DE" sz="1800" spc="-1" strike="noStrike">
+          <a:lstStyle/>
+          <a:p>
+            <a:endParaRPr lang="de-DE" sz="1800" b="0" strike="noStrike" spc="-1">
               <a:solidFill>
                 <a:srgbClr val="000000"/>
               </a:solidFill>
@@ -412,11 +526,12 @@
           </a:prstGeom>
         </p:spPr>
         <p:txBody>
-          <a:bodyPr lIns="0" rIns="0" tIns="0" bIns="0">
+          <a:bodyPr lIns="0" tIns="0" rIns="0" bIns="0">
             <a:normAutofit/>
           </a:bodyPr>
-          <a:p>
-            <a:endParaRPr b="0" lang="de-DE" sz="2800" spc="-1" strike="noStrike">
+          <a:lstStyle/>
+          <a:p>
+            <a:endParaRPr lang="de-DE" sz="2800" b="0" strike="noStrike" spc="-1">
               <a:solidFill>
                 <a:srgbClr val="000000"/>
               </a:solidFill>
@@ -445,11 +560,12 @@
           </a:prstGeom>
         </p:spPr>
         <p:txBody>
-          <a:bodyPr lIns="0" rIns="0" tIns="0" bIns="0">
+          <a:bodyPr lIns="0" tIns="0" rIns="0" bIns="0">
             <a:normAutofit/>
           </a:bodyPr>
-          <a:p>
-            <a:endParaRPr b="0" lang="de-DE" sz="2800" spc="-1" strike="noStrike">
+          <a:lstStyle/>
+          <a:p>
+            <a:endParaRPr lang="de-DE" sz="2800" b="0" strike="noStrike" spc="-1">
               <a:solidFill>
                 <a:srgbClr val="000000"/>
               </a:solidFill>
@@ -478,11 +594,12 @@
           </a:prstGeom>
         </p:spPr>
         <p:txBody>
-          <a:bodyPr lIns="0" rIns="0" tIns="0" bIns="0">
+          <a:bodyPr lIns="0" tIns="0" rIns="0" bIns="0">
             <a:normAutofit/>
           </a:bodyPr>
-          <a:p>
-            <a:endParaRPr b="0" lang="de-DE" sz="2800" spc="-1" strike="noStrike">
+          <a:lstStyle/>
+          <a:p>
+            <a:endParaRPr lang="de-DE" sz="2800" b="0" strike="noStrike" spc="-1">
               <a:solidFill>
                 <a:srgbClr val="000000"/>
               </a:solidFill>
@@ -511,11 +628,12 @@
           </a:prstGeom>
         </p:spPr>
         <p:txBody>
-          <a:bodyPr lIns="0" rIns="0" tIns="0" bIns="0">
+          <a:bodyPr lIns="0" tIns="0" rIns="0" bIns="0">
             <a:normAutofit/>
           </a:bodyPr>
-          <a:p>
-            <a:endParaRPr b="0" lang="de-DE" sz="2800" spc="-1" strike="noStrike">
+          <a:lstStyle/>
+          <a:p>
+            <a:endParaRPr lang="de-DE" sz="2800" b="0" strike="noStrike" spc="-1">
               <a:solidFill>
                 <a:srgbClr val="000000"/>
               </a:solidFill>
@@ -544,11 +662,12 @@
           </a:prstGeom>
         </p:spPr>
         <p:txBody>
-          <a:bodyPr lIns="0" rIns="0" tIns="0" bIns="0">
+          <a:bodyPr lIns="0" tIns="0" rIns="0" bIns="0">
             <a:normAutofit/>
           </a:bodyPr>
-          <a:p>
-            <a:endParaRPr b="0" lang="de-DE" sz="2800" spc="-1" strike="noStrike">
+          <a:lstStyle/>
+          <a:p>
+            <a:endParaRPr lang="de-DE" sz="2800" b="0" strike="noStrike" spc="-1">
               <a:solidFill>
                 <a:srgbClr val="000000"/>
               </a:solidFill>
@@ -577,11 +696,12 @@
           </a:prstGeom>
         </p:spPr>
         <p:txBody>
-          <a:bodyPr lIns="0" rIns="0" tIns="0" bIns="0">
+          <a:bodyPr lIns="0" tIns="0" rIns="0" bIns="0">
             <a:normAutofit/>
           </a:bodyPr>
-          <a:p>
-            <a:endParaRPr b="0" lang="de-DE" sz="2800" spc="-1" strike="noStrike">
+          <a:lstStyle/>
+          <a:p>
+            <a:endParaRPr lang="de-DE" sz="2800" b="0" strike="noStrike" spc="-1">
               <a:solidFill>
                 <a:srgbClr val="000000"/>
               </a:solidFill>
@@ -592,11 +712,14 @@
       </p:sp>
     </p:spTree>
   </p:cSld>
+  <p:clrMapOvr>
+    <a:masterClrMapping/>
+  </p:clrMapOvr>
 </p:sldLayout>
 </file>
 
 <file path=ppt/slideLayouts/slideLayout2.xml><?xml version="1.0" encoding="utf-8"?>
-<p:sldLayout xmlns:a="http://schemas.openxmlformats.org/drawingml/2006/main" xmlns:p="http://schemas.openxmlformats.org/presentationml/2006/main" xmlns:r="http://schemas.openxmlformats.org/officeDocument/2006/relationships" xmlns:p14="http://schemas.microsoft.com/office/powerpoint/2010/main" xmlns:p15="http://schemas.microsoft.com/office/powerpoint/2012/main" xmlns:mc="http://schemas.openxmlformats.org/markup-compatibility/2006" type="tx" preserve="1">
+<p:sldLayout xmlns:a="http://schemas.openxmlformats.org/drawingml/2006/main" xmlns:r="http://schemas.openxmlformats.org/officeDocument/2006/relationships" xmlns:p="http://schemas.openxmlformats.org/presentationml/2006/main" type="tx" preserve="1">
   <p:cSld name="Title Slide">
     <p:spTree>
       <p:nvGrpSpPr>
@@ -632,11 +755,12 @@
           </a:prstGeom>
         </p:spPr>
         <p:txBody>
-          <a:bodyPr lIns="0" rIns="0" tIns="0" bIns="0" anchor="ctr">
+          <a:bodyPr lIns="0" tIns="0" rIns="0" bIns="0" anchor="ctr">
             <a:spAutoFit/>
           </a:bodyPr>
-          <a:p>
-            <a:endParaRPr b="0" lang="de-DE" sz="1800" spc="-1" strike="noStrike">
+          <a:lstStyle/>
+          <a:p>
+            <a:endParaRPr lang="de-DE" sz="1800" b="0" strike="noStrike" spc="-1">
               <a:solidFill>
                 <a:srgbClr val="000000"/>
               </a:solidFill>
@@ -665,12 +789,13 @@
           </a:prstGeom>
         </p:spPr>
         <p:txBody>
-          <a:bodyPr lIns="0" rIns="0" tIns="0" bIns="0" anchor="ctr">
+          <a:bodyPr lIns="0" tIns="0" rIns="0" bIns="0" anchor="ctr">
             <a:spAutoFit/>
           </a:bodyPr>
+          <a:lstStyle/>
           <a:p>
             <a:pPr algn="ctr"/>
-            <a:endParaRPr b="0" lang="en-US" sz="3200" spc="-1" strike="noStrike">
+            <a:endParaRPr lang="en-US" sz="3200" b="0" strike="noStrike" spc="-1">
               <a:latin typeface="Nimbus Sans"/>
             </a:endParaRPr>
           </a:p>
@@ -678,11 +803,14 @@
       </p:sp>
     </p:spTree>
   </p:cSld>
+  <p:clrMapOvr>
+    <a:masterClrMapping/>
+  </p:clrMapOvr>
 </p:sldLayout>
 </file>
 
 <file path=ppt/slideLayouts/slideLayout3.xml><?xml version="1.0" encoding="utf-8"?>
-<p:sldLayout xmlns:a="http://schemas.openxmlformats.org/drawingml/2006/main" xmlns:p="http://schemas.openxmlformats.org/presentationml/2006/main" xmlns:r="http://schemas.openxmlformats.org/officeDocument/2006/relationships" xmlns:p14="http://schemas.microsoft.com/office/powerpoint/2010/main" xmlns:p15="http://schemas.microsoft.com/office/powerpoint/2012/main" xmlns:mc="http://schemas.openxmlformats.org/markup-compatibility/2006" type="obj" preserve="1">
+<p:sldLayout xmlns:a="http://schemas.openxmlformats.org/drawingml/2006/main" xmlns:r="http://schemas.openxmlformats.org/officeDocument/2006/relationships" xmlns:p="http://schemas.openxmlformats.org/presentationml/2006/main" type="obj" preserve="1">
   <p:cSld name="Title, Content">
     <p:spTree>
       <p:nvGrpSpPr>
@@ -718,11 +846,12 @@
           </a:prstGeom>
         </p:spPr>
         <p:txBody>
-          <a:bodyPr lIns="0" rIns="0" tIns="0" bIns="0" anchor="ctr">
+          <a:bodyPr lIns="0" tIns="0" rIns="0" bIns="0" anchor="ctr">
             <a:spAutoFit/>
           </a:bodyPr>
-          <a:p>
-            <a:endParaRPr b="0" lang="de-DE" sz="1800" spc="-1" strike="noStrike">
+          <a:lstStyle/>
+          <a:p>
+            <a:endParaRPr lang="de-DE" sz="1800" b="0" strike="noStrike" spc="-1">
               <a:solidFill>
                 <a:srgbClr val="000000"/>
               </a:solidFill>
@@ -751,11 +880,12 @@
           </a:prstGeom>
         </p:spPr>
         <p:txBody>
-          <a:bodyPr lIns="0" rIns="0" tIns="0" bIns="0">
+          <a:bodyPr lIns="0" tIns="0" rIns="0" bIns="0">
             <a:normAutofit/>
           </a:bodyPr>
-          <a:p>
-            <a:endParaRPr b="0" lang="de-DE" sz="2800" spc="-1" strike="noStrike">
+          <a:lstStyle/>
+          <a:p>
+            <a:endParaRPr lang="de-DE" sz="2800" b="0" strike="noStrike" spc="-1">
               <a:solidFill>
                 <a:srgbClr val="000000"/>
               </a:solidFill>
@@ -766,11 +896,14 @@
       </p:sp>
     </p:spTree>
   </p:cSld>
+  <p:clrMapOvr>
+    <a:masterClrMapping/>
+  </p:clrMapOvr>
 </p:sldLayout>
 </file>
 
 <file path=ppt/slideLayouts/slideLayout4.xml><?xml version="1.0" encoding="utf-8"?>
-<p:sldLayout xmlns:a="http://schemas.openxmlformats.org/drawingml/2006/main" xmlns:p="http://schemas.openxmlformats.org/presentationml/2006/main" xmlns:r="http://schemas.openxmlformats.org/officeDocument/2006/relationships" xmlns:p14="http://schemas.microsoft.com/office/powerpoint/2010/main" xmlns:p15="http://schemas.microsoft.com/office/powerpoint/2012/main" xmlns:mc="http://schemas.openxmlformats.org/markup-compatibility/2006" type="twoObj" preserve="1">
+<p:sldLayout xmlns:a="http://schemas.openxmlformats.org/drawingml/2006/main" xmlns:r="http://schemas.openxmlformats.org/officeDocument/2006/relationships" xmlns:p="http://schemas.openxmlformats.org/presentationml/2006/main" type="twoObj" preserve="1">
   <p:cSld name="Title, 2 Content">
     <p:spTree>
       <p:nvGrpSpPr>
@@ -806,11 +939,12 @@
           </a:prstGeom>
         </p:spPr>
         <p:txBody>
-          <a:bodyPr lIns="0" rIns="0" tIns="0" bIns="0" anchor="ctr">
+          <a:bodyPr lIns="0" tIns="0" rIns="0" bIns="0" anchor="ctr">
             <a:spAutoFit/>
           </a:bodyPr>
-          <a:p>
-            <a:endParaRPr b="0" lang="de-DE" sz="1800" spc="-1" strike="noStrike">
+          <a:lstStyle/>
+          <a:p>
+            <a:endParaRPr lang="de-DE" sz="1800" b="0" strike="noStrike" spc="-1">
               <a:solidFill>
                 <a:srgbClr val="000000"/>
               </a:solidFill>
@@ -839,11 +973,12 @@
           </a:prstGeom>
         </p:spPr>
         <p:txBody>
-          <a:bodyPr lIns="0" rIns="0" tIns="0" bIns="0">
+          <a:bodyPr lIns="0" tIns="0" rIns="0" bIns="0">
             <a:normAutofit/>
           </a:bodyPr>
-          <a:p>
-            <a:endParaRPr b="0" lang="de-DE" sz="2800" spc="-1" strike="noStrike">
+          <a:lstStyle/>
+          <a:p>
+            <a:endParaRPr lang="de-DE" sz="2800" b="0" strike="noStrike" spc="-1">
               <a:solidFill>
                 <a:srgbClr val="000000"/>
               </a:solidFill>
@@ -872,11 +1007,12 @@
           </a:prstGeom>
         </p:spPr>
         <p:txBody>
-          <a:bodyPr lIns="0" rIns="0" tIns="0" bIns="0">
+          <a:bodyPr lIns="0" tIns="0" rIns="0" bIns="0">
             <a:normAutofit/>
           </a:bodyPr>
-          <a:p>
-            <a:endParaRPr b="0" lang="de-DE" sz="2800" spc="-1" strike="noStrike">
+          <a:lstStyle/>
+          <a:p>
+            <a:endParaRPr lang="de-DE" sz="2800" b="0" strike="noStrike" spc="-1">
               <a:solidFill>
                 <a:srgbClr val="000000"/>
               </a:solidFill>
@@ -887,11 +1023,14 @@
       </p:sp>
     </p:spTree>
   </p:cSld>
+  <p:clrMapOvr>
+    <a:masterClrMapping/>
+  </p:clrMapOvr>
 </p:sldLayout>
 </file>
 
 <file path=ppt/slideLayouts/slideLayout5.xml><?xml version="1.0" encoding="utf-8"?>
-<p:sldLayout xmlns:a="http://schemas.openxmlformats.org/drawingml/2006/main" xmlns:p="http://schemas.openxmlformats.org/presentationml/2006/main" xmlns:r="http://schemas.openxmlformats.org/officeDocument/2006/relationships" xmlns:p14="http://schemas.microsoft.com/office/powerpoint/2010/main" xmlns:p15="http://schemas.microsoft.com/office/powerpoint/2012/main" xmlns:mc="http://schemas.openxmlformats.org/markup-compatibility/2006" type="titleOnly" preserve="1">
+<p:sldLayout xmlns:a="http://schemas.openxmlformats.org/drawingml/2006/main" xmlns:r="http://schemas.openxmlformats.org/officeDocument/2006/relationships" xmlns:p="http://schemas.openxmlformats.org/presentationml/2006/main" type="titleOnly" preserve="1">
   <p:cSld name="Title Only">
     <p:spTree>
       <p:nvGrpSpPr>
@@ -927,11 +1066,12 @@
           </a:prstGeom>
         </p:spPr>
         <p:txBody>
-          <a:bodyPr lIns="0" rIns="0" tIns="0" bIns="0" anchor="ctr">
+          <a:bodyPr lIns="0" tIns="0" rIns="0" bIns="0" anchor="ctr">
             <a:spAutoFit/>
           </a:bodyPr>
-          <a:p>
-            <a:endParaRPr b="0" lang="de-DE" sz="1800" spc="-1" strike="noStrike">
+          <a:lstStyle/>
+          <a:p>
+            <a:endParaRPr lang="de-DE" sz="1800" b="0" strike="noStrike" spc="-1">
               <a:solidFill>
                 <a:srgbClr val="000000"/>
               </a:solidFill>
@@ -942,11 +1082,14 @@
       </p:sp>
     </p:spTree>
   </p:cSld>
+  <p:clrMapOvr>
+    <a:masterClrMapping/>
+  </p:clrMapOvr>
 </p:sldLayout>
 </file>
 
 <file path=ppt/slideLayouts/slideLayout6.xml><?xml version="1.0" encoding="utf-8"?>
-<p:sldLayout xmlns:a="http://schemas.openxmlformats.org/drawingml/2006/main" xmlns:p="http://schemas.openxmlformats.org/presentationml/2006/main" xmlns:r="http://schemas.openxmlformats.org/officeDocument/2006/relationships" xmlns:p14="http://schemas.microsoft.com/office/powerpoint/2010/main" xmlns:p15="http://schemas.microsoft.com/office/powerpoint/2012/main" xmlns:mc="http://schemas.openxmlformats.org/markup-compatibility/2006" type="objOnly" preserve="1">
+<p:sldLayout xmlns:a="http://schemas.openxmlformats.org/drawingml/2006/main" xmlns:r="http://schemas.openxmlformats.org/officeDocument/2006/relationships" xmlns:p="http://schemas.openxmlformats.org/presentationml/2006/main" type="objOnly" preserve="1">
   <p:cSld name="Centered Text">
     <p:spTree>
       <p:nvGrpSpPr>
@@ -982,12 +1125,13 @@
           </a:prstGeom>
         </p:spPr>
         <p:txBody>
-          <a:bodyPr lIns="0" rIns="0" tIns="0" bIns="0" anchor="ctr">
+          <a:bodyPr lIns="0" tIns="0" rIns="0" bIns="0" anchor="ctr">
             <a:spAutoFit/>
           </a:bodyPr>
+          <a:lstStyle/>
           <a:p>
             <a:pPr algn="ctr"/>
-            <a:endParaRPr b="0" lang="en-US" sz="3200" spc="-1" strike="noStrike">
+            <a:endParaRPr lang="en-US" sz="3200" b="0" strike="noStrike" spc="-1">
               <a:latin typeface="Nimbus Sans"/>
             </a:endParaRPr>
           </a:p>
@@ -995,11 +1139,14 @@
       </p:sp>
     </p:spTree>
   </p:cSld>
+  <p:clrMapOvr>
+    <a:masterClrMapping/>
+  </p:clrMapOvr>
 </p:sldLayout>
 </file>
 
 <file path=ppt/slideLayouts/slideLayout7.xml><?xml version="1.0" encoding="utf-8"?>
-<p:sldLayout xmlns:a="http://schemas.openxmlformats.org/drawingml/2006/main" xmlns:p="http://schemas.openxmlformats.org/presentationml/2006/main" xmlns:r="http://schemas.openxmlformats.org/officeDocument/2006/relationships" xmlns:p14="http://schemas.microsoft.com/office/powerpoint/2010/main" xmlns:p15="http://schemas.microsoft.com/office/powerpoint/2012/main" xmlns:mc="http://schemas.openxmlformats.org/markup-compatibility/2006" type="twoObjAndObj" preserve="1">
+<p:sldLayout xmlns:a="http://schemas.openxmlformats.org/drawingml/2006/main" xmlns:r="http://schemas.openxmlformats.org/officeDocument/2006/relationships" xmlns:p="http://schemas.openxmlformats.org/presentationml/2006/main" type="twoObjAndObj" preserve="1">
   <p:cSld name="Title, 2 Content and Content">
     <p:spTree>
       <p:nvGrpSpPr>
@@ -1035,11 +1182,12 @@
           </a:prstGeom>
         </p:spPr>
         <p:txBody>
-          <a:bodyPr lIns="0" rIns="0" tIns="0" bIns="0" anchor="ctr">
+          <a:bodyPr lIns="0" tIns="0" rIns="0" bIns="0" anchor="ctr">
             <a:spAutoFit/>
           </a:bodyPr>
-          <a:p>
-            <a:endParaRPr b="0" lang="de-DE" sz="1800" spc="-1" strike="noStrike">
+          <a:lstStyle/>
+          <a:p>
+            <a:endParaRPr lang="de-DE" sz="1800" b="0" strike="noStrike" spc="-1">
               <a:solidFill>
                 <a:srgbClr val="000000"/>
               </a:solidFill>
@@ -1068,11 +1216,12 @@
           </a:prstGeom>
         </p:spPr>
         <p:txBody>
-          <a:bodyPr lIns="0" rIns="0" tIns="0" bIns="0">
+          <a:bodyPr lIns="0" tIns="0" rIns="0" bIns="0">
             <a:normAutofit/>
           </a:bodyPr>
-          <a:p>
-            <a:endParaRPr b="0" lang="de-DE" sz="2800" spc="-1" strike="noStrike">
+          <a:lstStyle/>
+          <a:p>
+            <a:endParaRPr lang="de-DE" sz="2800" b="0" strike="noStrike" spc="-1">
               <a:solidFill>
                 <a:srgbClr val="000000"/>
               </a:solidFill>
@@ -1101,11 +1250,12 @@
           </a:prstGeom>
         </p:spPr>
         <p:txBody>
-          <a:bodyPr lIns="0" rIns="0" tIns="0" bIns="0">
+          <a:bodyPr lIns="0" tIns="0" rIns="0" bIns="0">
             <a:normAutofit/>
           </a:bodyPr>
-          <a:p>
-            <a:endParaRPr b="0" lang="de-DE" sz="2800" spc="-1" strike="noStrike">
+          <a:lstStyle/>
+          <a:p>
+            <a:endParaRPr lang="de-DE" sz="2800" b="0" strike="noStrike" spc="-1">
               <a:solidFill>
                 <a:srgbClr val="000000"/>
               </a:solidFill>
@@ -1134,11 +1284,12 @@
           </a:prstGeom>
         </p:spPr>
         <p:txBody>
-          <a:bodyPr lIns="0" rIns="0" tIns="0" bIns="0">
+          <a:bodyPr lIns="0" tIns="0" rIns="0" bIns="0">
             <a:normAutofit/>
           </a:bodyPr>
-          <a:p>
-            <a:endParaRPr b="0" lang="de-DE" sz="2800" spc="-1" strike="noStrike">
+          <a:lstStyle/>
+          <a:p>
+            <a:endParaRPr lang="de-DE" sz="2800" b="0" strike="noStrike" spc="-1">
               <a:solidFill>
                 <a:srgbClr val="000000"/>
               </a:solidFill>
@@ -1149,11 +1300,14 @@
       </p:sp>
     </p:spTree>
   </p:cSld>
+  <p:clrMapOvr>
+    <a:masterClrMapping/>
+  </p:clrMapOvr>
 </p:sldLayout>
 </file>
 
 <file path=ppt/slideLayouts/slideLayout8.xml><?xml version="1.0" encoding="utf-8"?>
-<p:sldLayout xmlns:a="http://schemas.openxmlformats.org/drawingml/2006/main" xmlns:p="http://schemas.openxmlformats.org/presentationml/2006/main" xmlns:r="http://schemas.openxmlformats.org/officeDocument/2006/relationships" xmlns:p14="http://schemas.microsoft.com/office/powerpoint/2010/main" xmlns:p15="http://schemas.microsoft.com/office/powerpoint/2012/main" xmlns:mc="http://schemas.openxmlformats.org/markup-compatibility/2006" type="objAndTwoObj" preserve="1">
+<p:sldLayout xmlns:a="http://schemas.openxmlformats.org/drawingml/2006/main" xmlns:r="http://schemas.openxmlformats.org/officeDocument/2006/relationships" xmlns:p="http://schemas.openxmlformats.org/presentationml/2006/main" type="objAndTwoObj" preserve="1">
   <p:cSld name="Title Content and 2 Content">
     <p:spTree>
       <p:nvGrpSpPr>
@@ -1189,11 +1343,12 @@
           </a:prstGeom>
         </p:spPr>
         <p:txBody>
-          <a:bodyPr lIns="0" rIns="0" tIns="0" bIns="0" anchor="ctr">
+          <a:bodyPr lIns="0" tIns="0" rIns="0" bIns="0" anchor="ctr">
             <a:spAutoFit/>
           </a:bodyPr>
-          <a:p>
-            <a:endParaRPr b="0" lang="de-DE" sz="1800" spc="-1" strike="noStrike">
+          <a:lstStyle/>
+          <a:p>
+            <a:endParaRPr lang="de-DE" sz="1800" b="0" strike="noStrike" spc="-1">
               <a:solidFill>
                 <a:srgbClr val="000000"/>
               </a:solidFill>
@@ -1222,11 +1377,12 @@
           </a:prstGeom>
         </p:spPr>
         <p:txBody>
-          <a:bodyPr lIns="0" rIns="0" tIns="0" bIns="0">
+          <a:bodyPr lIns="0" tIns="0" rIns="0" bIns="0">
             <a:normAutofit/>
           </a:bodyPr>
-          <a:p>
-            <a:endParaRPr b="0" lang="de-DE" sz="2800" spc="-1" strike="noStrike">
+          <a:lstStyle/>
+          <a:p>
+            <a:endParaRPr lang="de-DE" sz="2800" b="0" strike="noStrike" spc="-1">
               <a:solidFill>
                 <a:srgbClr val="000000"/>
               </a:solidFill>
@@ -1255,11 +1411,12 @@
           </a:prstGeom>
         </p:spPr>
         <p:txBody>
-          <a:bodyPr lIns="0" rIns="0" tIns="0" bIns="0">
+          <a:bodyPr lIns="0" tIns="0" rIns="0" bIns="0">
             <a:normAutofit/>
           </a:bodyPr>
-          <a:p>
-            <a:endParaRPr b="0" lang="de-DE" sz="2800" spc="-1" strike="noStrike">
+          <a:lstStyle/>
+          <a:p>
+            <a:endParaRPr lang="de-DE" sz="2800" b="0" strike="noStrike" spc="-1">
               <a:solidFill>
                 <a:srgbClr val="000000"/>
               </a:solidFill>
@@ -1288,11 +1445,12 @@
           </a:prstGeom>
         </p:spPr>
         <p:txBody>
-          <a:bodyPr lIns="0" rIns="0" tIns="0" bIns="0">
+          <a:bodyPr lIns="0" tIns="0" rIns="0" bIns="0">
             <a:normAutofit/>
           </a:bodyPr>
-          <a:p>
-            <a:endParaRPr b="0" lang="de-DE" sz="2800" spc="-1" strike="noStrike">
+          <a:lstStyle/>
+          <a:p>
+            <a:endParaRPr lang="de-DE" sz="2800" b="0" strike="noStrike" spc="-1">
               <a:solidFill>
                 <a:srgbClr val="000000"/>
               </a:solidFill>
@@ -1303,11 +1461,14 @@
       </p:sp>
     </p:spTree>
   </p:cSld>
+  <p:clrMapOvr>
+    <a:masterClrMapping/>
+  </p:clrMapOvr>
 </p:sldLayout>
 </file>
 
 <file path=ppt/slideLayouts/slideLayout9.xml><?xml version="1.0" encoding="utf-8"?>
-<p:sldLayout xmlns:a="http://schemas.openxmlformats.org/drawingml/2006/main" xmlns:p="http://schemas.openxmlformats.org/presentationml/2006/main" xmlns:r="http://schemas.openxmlformats.org/officeDocument/2006/relationships" xmlns:p14="http://schemas.microsoft.com/office/powerpoint/2010/main" xmlns:p15="http://schemas.microsoft.com/office/powerpoint/2012/main" xmlns:mc="http://schemas.openxmlformats.org/markup-compatibility/2006" type="twoObjOverTx" preserve="1">
+<p:sldLayout xmlns:a="http://schemas.openxmlformats.org/drawingml/2006/main" xmlns:r="http://schemas.openxmlformats.org/officeDocument/2006/relationships" xmlns:p="http://schemas.openxmlformats.org/presentationml/2006/main" type="twoObjOverTx" preserve="1">
   <p:cSld name="Title, 2 Content over Content">
     <p:spTree>
       <p:nvGrpSpPr>
@@ -1343,11 +1504,12 @@
           </a:prstGeom>
         </p:spPr>
         <p:txBody>
-          <a:bodyPr lIns="0" rIns="0" tIns="0" bIns="0" anchor="ctr">
+          <a:bodyPr lIns="0" tIns="0" rIns="0" bIns="0" anchor="ctr">
             <a:spAutoFit/>
           </a:bodyPr>
-          <a:p>
-            <a:endParaRPr b="0" lang="de-DE" sz="1800" spc="-1" strike="noStrike">
+          <a:lstStyle/>
+          <a:p>
+            <a:endParaRPr lang="de-DE" sz="1800" b="0" strike="noStrike" spc="-1">
               <a:solidFill>
                 <a:srgbClr val="000000"/>
               </a:solidFill>
@@ -1376,11 +1538,12 @@
           </a:prstGeom>
         </p:spPr>
         <p:txBody>
-          <a:bodyPr lIns="0" rIns="0" tIns="0" bIns="0">
+          <a:bodyPr lIns="0" tIns="0" rIns="0" bIns="0">
             <a:normAutofit/>
           </a:bodyPr>
-          <a:p>
-            <a:endParaRPr b="0" lang="de-DE" sz="2800" spc="-1" strike="noStrike">
+          <a:lstStyle/>
+          <a:p>
+            <a:endParaRPr lang="de-DE" sz="2800" b="0" strike="noStrike" spc="-1">
               <a:solidFill>
                 <a:srgbClr val="000000"/>
               </a:solidFill>
@@ -1409,11 +1572,12 @@
           </a:prstGeom>
         </p:spPr>
         <p:txBody>
-          <a:bodyPr lIns="0" rIns="0" tIns="0" bIns="0">
+          <a:bodyPr lIns="0" tIns="0" rIns="0" bIns="0">
             <a:normAutofit/>
           </a:bodyPr>
-          <a:p>
-            <a:endParaRPr b="0" lang="de-DE" sz="2800" spc="-1" strike="noStrike">
+          <a:lstStyle/>
+          <a:p>
+            <a:endParaRPr lang="de-DE" sz="2800" b="0" strike="noStrike" spc="-1">
               <a:solidFill>
                 <a:srgbClr val="000000"/>
               </a:solidFill>
@@ -1442,11 +1606,12 @@
           </a:prstGeom>
         </p:spPr>
         <p:txBody>
-          <a:bodyPr lIns="0" rIns="0" tIns="0" bIns="0">
+          <a:bodyPr lIns="0" tIns="0" rIns="0" bIns="0">
             <a:normAutofit/>
           </a:bodyPr>
-          <a:p>
-            <a:endParaRPr b="0" lang="de-DE" sz="2800" spc="-1" strike="noStrike">
+          <a:lstStyle/>
+          <a:p>
+            <a:endParaRPr lang="de-DE" sz="2800" b="0" strike="noStrike" spc="-1">
               <a:solidFill>
                 <a:srgbClr val="000000"/>
               </a:solidFill>
@@ -1457,17 +1622,21 @@
       </p:sp>
     </p:spTree>
   </p:cSld>
+  <p:clrMapOvr>
+    <a:masterClrMapping/>
+  </p:clrMapOvr>
 </p:sldLayout>
 </file>
 
 <file path=ppt/slideMasters/slideMaster1.xml><?xml version="1.0" encoding="utf-8"?>
-<p:sldMaster xmlns:a="http://schemas.openxmlformats.org/drawingml/2006/main" xmlns:p="http://schemas.openxmlformats.org/presentationml/2006/main" xmlns:r="http://schemas.openxmlformats.org/officeDocument/2006/relationships" xmlns:p14="http://schemas.microsoft.com/office/powerpoint/2010/main" xmlns:p15="http://schemas.microsoft.com/office/powerpoint/2012/main" xmlns:mc="http://schemas.openxmlformats.org/markup-compatibility/2006">
+<p:sldMaster xmlns:a="http://schemas.openxmlformats.org/drawingml/2006/main" xmlns:r="http://schemas.openxmlformats.org/officeDocument/2006/relationships" xmlns:p="http://schemas.openxmlformats.org/presentationml/2006/main">
   <p:cSld>
     <p:bg>
       <p:bgPr>
         <a:solidFill>
-          <a:srgbClr val="ffffff"/>
+          <a:srgbClr val="FFFFFF"/>
         </a:solidFill>
+        <a:effectLst/>
       </p:bgPr>
     </p:bg>
     <p:spTree>
@@ -1486,7 +1655,7 @@
       </p:grpSpPr>
       <p:sp>
         <p:nvSpPr>
-          <p:cNvPr id="0" name="PlaceHolder 1"/>
+          <p:cNvPr id="5" name="PlaceHolder 1"/>
           <p:cNvSpPr>
             <a:spLocks noGrp="1"/>
           </p:cNvSpPr>
@@ -1507,6 +1676,7 @@
           <a:bodyPr anchor="b">
             <a:noAutofit/>
           </a:bodyPr>
+          <a:lstStyle/>
           <a:p>
             <a:pPr algn="ctr">
               <a:lnSpc>
@@ -1514,7 +1684,7 @@
               </a:lnSpc>
             </a:pPr>
             <a:r>
-              <a:rPr b="0" lang="de-DE" sz="6000" spc="-1" strike="noStrike">
+              <a:rPr lang="de-DE" sz="6000" b="0" strike="noStrike" spc="-1">
                 <a:solidFill>
                   <a:srgbClr val="000000"/>
                 </a:solidFill>
@@ -1522,7 +1692,7 @@
               </a:rPr>
               <a:t>Mastertitelformat bearbeiten</a:t>
             </a:r>
-            <a:endParaRPr b="0" lang="de-DE" sz="6000" spc="-1" strike="noStrike">
+            <a:endParaRPr lang="de-DE" sz="6000" b="0" strike="noStrike" spc="-1">
               <a:solidFill>
                 <a:srgbClr val="000000"/>
               </a:solidFill>
@@ -1533,7 +1703,7 @@
       </p:sp>
       <p:sp>
         <p:nvSpPr>
-          <p:cNvPr id="1" name="PlaceHolder 2"/>
+          <p:cNvPr id="6" name="PlaceHolder 2"/>
           <p:cNvSpPr>
             <a:spLocks noGrp="1"/>
           </p:cNvSpPr>
@@ -1554,6 +1724,7 @@
           <a:bodyPr anchor="ctr">
             <a:noAutofit/>
           </a:bodyPr>
+          <a:lstStyle/>
           <a:p>
             <a:pPr>
               <a:lnSpc>
@@ -1561,15 +1732,15 @@
               </a:lnSpc>
             </a:pPr>
             <a:fld id="{6D5E44CF-63A8-4B07-A76D-2072E9BF71C8}" type="datetime">
-              <a:rPr b="0" lang="en-US" sz="1200" spc="-1" strike="noStrike">
+              <a:rPr lang="en-US" sz="1200" b="0" strike="noStrike" spc="-1">
                 <a:solidFill>
-                  <a:srgbClr val="8b8b8b"/>
+                  <a:srgbClr val="8B8B8B"/>
                 </a:solidFill>
                 <a:latin typeface="Calibri"/>
               </a:rPr>
-              <a:t>7/13/19</a:t>
+              <a:t>7/14/19</a:t>
             </a:fld>
-            <a:endParaRPr b="0" lang="en-US" sz="1200" spc="-1" strike="noStrike">
+            <a:endParaRPr lang="en-US" sz="1200" b="0" strike="noStrike" spc="-1">
               <a:latin typeface="Nimbus Roman"/>
             </a:endParaRPr>
           </a:p>
@@ -1598,8 +1769,9 @@
           <a:bodyPr anchor="ctr">
             <a:noAutofit/>
           </a:bodyPr>
-          <a:p>
-            <a:endParaRPr b="0" lang="en-US" sz="2400" spc="-1" strike="noStrike">
+          <a:lstStyle/>
+          <a:p>
+            <a:endParaRPr lang="en-US" sz="2400" b="0" strike="noStrike" spc="-1">
               <a:latin typeface="Nimbus Roman"/>
             </a:endParaRPr>
           </a:p>
@@ -1628,6 +1800,7 @@
           <a:bodyPr anchor="ctr">
             <a:noAutofit/>
           </a:bodyPr>
+          <a:lstStyle/>
           <a:p>
             <a:pPr algn="r">
               <a:lnSpc>
@@ -1635,15 +1808,15 @@
               </a:lnSpc>
             </a:pPr>
             <a:fld id="{83E61633-2318-4A74-974F-C348A4B7DB04}" type="slidenum">
-              <a:rPr b="0" lang="en-US" sz="1200" spc="-1" strike="noStrike">
+              <a:rPr lang="en-US" sz="1200" b="0" strike="noStrike" spc="-1">
                 <a:solidFill>
-                  <a:srgbClr val="8b8b8b"/>
+                  <a:srgbClr val="8B8B8B"/>
                 </a:solidFill>
                 <a:latin typeface="Calibri"/>
               </a:rPr>
-              <a:t>&lt;number&gt;</a:t>
+              <a:t>‹Nr.›</a:t>
             </a:fld>
-            <a:endParaRPr b="0" lang="en-US" sz="1200" spc="-1" strike="noStrike">
+            <a:endParaRPr lang="en-US" sz="1200" b="0" strike="noStrike" spc="-1">
               <a:latin typeface="Nimbus Roman"/>
             </a:endParaRPr>
           </a:p>
@@ -1669,9 +1842,10 @@
           </a:prstGeom>
         </p:spPr>
         <p:txBody>
-          <a:bodyPr lIns="0" rIns="0" tIns="0" bIns="0">
+          <a:bodyPr lIns="0" tIns="0" rIns="0" bIns="0">
             <a:normAutofit/>
           </a:bodyPr>
+          <a:lstStyle/>
           <a:p>
             <a:pPr marL="432000" indent="-324000">
               <a:spcBef>
@@ -1685,7 +1859,7 @@
               <a:buChar char=""/>
             </a:pPr>
             <a:r>
-              <a:rPr b="0" lang="de-DE" sz="2800" spc="-1" strike="noStrike">
+              <a:rPr lang="de-DE" sz="2800" b="0" strike="noStrike" spc="-1">
                 <a:solidFill>
                   <a:srgbClr val="000000"/>
                 </a:solidFill>
@@ -1693,15 +1867,9 @@
               </a:rPr>
               <a:t>Click to edit the outline text format</a:t>
             </a:r>
-            <a:endParaRPr b="0" lang="de-DE" sz="2800" spc="-1" strike="noStrike">
-              <a:solidFill>
-                <a:srgbClr val="000000"/>
-              </a:solidFill>
-              <a:latin typeface="Calibri"/>
-            </a:endParaRPr>
-          </a:p>
-          <a:p>
-            <a:pPr lvl="1" marL="864000" indent="-324000">
+          </a:p>
+          <a:p>
+            <a:pPr marL="864000" lvl="1" indent="-324000">
               <a:spcBef>
                 <a:spcPts val="1134"/>
               </a:spcBef>
@@ -1713,7 +1881,7 @@
               <a:buChar char=""/>
             </a:pPr>
             <a:r>
-              <a:rPr b="0" lang="de-DE" sz="2000" spc="-1" strike="noStrike">
+              <a:rPr lang="de-DE" sz="2000" b="0" strike="noStrike" spc="-1">
                 <a:solidFill>
                   <a:srgbClr val="000000"/>
                 </a:solidFill>
@@ -1721,15 +1889,9 @@
               </a:rPr>
               <a:t>Second Outline Level</a:t>
             </a:r>
-            <a:endParaRPr b="0" lang="de-DE" sz="2000" spc="-1" strike="noStrike">
-              <a:solidFill>
-                <a:srgbClr val="000000"/>
-              </a:solidFill>
-              <a:latin typeface="Calibri"/>
-            </a:endParaRPr>
-          </a:p>
-          <a:p>
-            <a:pPr lvl="2" marL="1296000" indent="-288000">
+          </a:p>
+          <a:p>
+            <a:pPr marL="1296000" lvl="2" indent="-288000">
               <a:spcBef>
                 <a:spcPts val="850"/>
               </a:spcBef>
@@ -1741,7 +1903,7 @@
               <a:buChar char=""/>
             </a:pPr>
             <a:r>
-              <a:rPr b="0" lang="de-DE" sz="1800" spc="-1" strike="noStrike">
+              <a:rPr lang="de-DE" sz="1800" b="0" strike="noStrike" spc="-1">
                 <a:solidFill>
                   <a:srgbClr val="000000"/>
                 </a:solidFill>
@@ -1749,15 +1911,9 @@
               </a:rPr>
               <a:t>Third Outline Level</a:t>
             </a:r>
-            <a:endParaRPr b="0" lang="de-DE" sz="1800" spc="-1" strike="noStrike">
-              <a:solidFill>
-                <a:srgbClr val="000000"/>
-              </a:solidFill>
-              <a:latin typeface="Calibri"/>
-            </a:endParaRPr>
-          </a:p>
-          <a:p>
-            <a:pPr lvl="3" marL="1728000" indent="-216000">
+          </a:p>
+          <a:p>
+            <a:pPr marL="1728000" lvl="3" indent="-216000">
               <a:spcBef>
                 <a:spcPts val="567"/>
               </a:spcBef>
@@ -1769,7 +1925,7 @@
               <a:buChar char=""/>
             </a:pPr>
             <a:r>
-              <a:rPr b="0" lang="de-DE" sz="1800" spc="-1" strike="noStrike">
+              <a:rPr lang="de-DE" sz="1800" b="0" strike="noStrike" spc="-1">
                 <a:solidFill>
                   <a:srgbClr val="000000"/>
                 </a:solidFill>
@@ -1777,15 +1933,9 @@
               </a:rPr>
               <a:t>Fourth Outline Level</a:t>
             </a:r>
-            <a:endParaRPr b="0" lang="de-DE" sz="1800" spc="-1" strike="noStrike">
-              <a:solidFill>
-                <a:srgbClr val="000000"/>
-              </a:solidFill>
-              <a:latin typeface="Calibri"/>
-            </a:endParaRPr>
-          </a:p>
-          <a:p>
-            <a:pPr lvl="4" marL="2160000" indent="-216000">
+          </a:p>
+          <a:p>
+            <a:pPr marL="2160000" lvl="4" indent="-216000">
               <a:spcBef>
                 <a:spcPts val="283"/>
               </a:spcBef>
@@ -1797,7 +1947,7 @@
               <a:buChar char=""/>
             </a:pPr>
             <a:r>
-              <a:rPr b="0" lang="de-DE" sz="2000" spc="-1" strike="noStrike">
+              <a:rPr lang="de-DE" sz="2000" b="0" strike="noStrike" spc="-1">
                 <a:solidFill>
                   <a:srgbClr val="000000"/>
                 </a:solidFill>
@@ -1805,15 +1955,9 @@
               </a:rPr>
               <a:t>Fifth Outline Level</a:t>
             </a:r>
-            <a:endParaRPr b="0" lang="de-DE" sz="2000" spc="-1" strike="noStrike">
-              <a:solidFill>
-                <a:srgbClr val="000000"/>
-              </a:solidFill>
-              <a:latin typeface="Calibri"/>
-            </a:endParaRPr>
-          </a:p>
-          <a:p>
-            <a:pPr lvl="5" marL="2592000" indent="-216000">
+          </a:p>
+          <a:p>
+            <a:pPr marL="2592000" lvl="5" indent="-216000">
               <a:spcBef>
                 <a:spcPts val="283"/>
               </a:spcBef>
@@ -1825,7 +1969,7 @@
               <a:buChar char=""/>
             </a:pPr>
             <a:r>
-              <a:rPr b="0" lang="de-DE" sz="2000" spc="-1" strike="noStrike">
+              <a:rPr lang="de-DE" sz="2000" b="0" strike="noStrike" spc="-1">
                 <a:solidFill>
                   <a:srgbClr val="000000"/>
                 </a:solidFill>
@@ -1833,15 +1977,9 @@
               </a:rPr>
               <a:t>Sixth Outline Level</a:t>
             </a:r>
-            <a:endParaRPr b="0" lang="de-DE" sz="2000" spc="-1" strike="noStrike">
-              <a:solidFill>
-                <a:srgbClr val="000000"/>
-              </a:solidFill>
-              <a:latin typeface="Calibri"/>
-            </a:endParaRPr>
-          </a:p>
-          <a:p>
-            <a:pPr lvl="6" marL="3024000" indent="-216000">
+          </a:p>
+          <a:p>
+            <a:pPr marL="3024000" lvl="6" indent="-216000">
               <a:spcBef>
                 <a:spcPts val="283"/>
               </a:spcBef>
@@ -1853,7 +1991,7 @@
               <a:buChar char=""/>
             </a:pPr>
             <a:r>
-              <a:rPr b="0" lang="de-DE" sz="2000" spc="-1" strike="noStrike">
+              <a:rPr lang="de-DE" sz="2000" b="0" strike="noStrike" spc="-1">
                 <a:solidFill>
                   <a:srgbClr val="000000"/>
                 </a:solidFill>
@@ -1861,37 +1999,311 @@
               </a:rPr>
               <a:t>Seventh Outline Level</a:t>
             </a:r>
-            <a:endParaRPr b="0" lang="de-DE" sz="2000" spc="-1" strike="noStrike">
-              <a:solidFill>
-                <a:srgbClr val="000000"/>
-              </a:solidFill>
-              <a:latin typeface="Calibri"/>
-            </a:endParaRPr>
           </a:p>
         </p:txBody>
       </p:sp>
     </p:spTree>
   </p:cSld>
-  <p:clrMap bg1="lt1" bg2="lt2" tx1="dk1" tx2="dk2" accent1="accent1" accent2="accent2" accent3="accent3" accent4="accent4" accent5="accent5" accent6="accent6" hlink="hlink" folHlink="folHlink"/>
+  <p:clrMap bg1="lt1" tx1="dk1" bg2="lt2" tx2="dk2" accent1="accent1" accent2="accent2" accent3="accent3" accent4="accent4" accent5="accent5" accent6="accent6" hlink="hlink" folHlink="folHlink"/>
   <p:sldLayoutIdLst>
-    <p:sldLayoutId id="2147483649" r:id="rId2"/>
-    <p:sldLayoutId id="2147483650" r:id="rId3"/>
-    <p:sldLayoutId id="2147483651" r:id="rId4"/>
-    <p:sldLayoutId id="2147483652" r:id="rId5"/>
-    <p:sldLayoutId id="2147483653" r:id="rId6"/>
-    <p:sldLayoutId id="2147483654" r:id="rId7"/>
-    <p:sldLayoutId id="2147483655" r:id="rId8"/>
-    <p:sldLayoutId id="2147483656" r:id="rId9"/>
-    <p:sldLayoutId id="2147483657" r:id="rId10"/>
-    <p:sldLayoutId id="2147483658" r:id="rId11"/>
-    <p:sldLayoutId id="2147483659" r:id="rId12"/>
-    <p:sldLayoutId id="2147483660" r:id="rId13"/>
+    <p:sldLayoutId id="2147483649" r:id="rId1"/>
+    <p:sldLayoutId id="2147483650" r:id="rId2"/>
+    <p:sldLayoutId id="2147483651" r:id="rId3"/>
+    <p:sldLayoutId id="2147483652" r:id="rId4"/>
+    <p:sldLayoutId id="2147483653" r:id="rId5"/>
+    <p:sldLayoutId id="2147483654" r:id="rId6"/>
+    <p:sldLayoutId id="2147483655" r:id="rId7"/>
+    <p:sldLayoutId id="2147483656" r:id="rId8"/>
+    <p:sldLayoutId id="2147483657" r:id="rId9"/>
+    <p:sldLayoutId id="2147483658" r:id="rId10"/>
+    <p:sldLayoutId id="2147483659" r:id="rId11"/>
+    <p:sldLayoutId id="2147483660" r:id="rId12"/>
   </p:sldLayoutIdLst>
+  <p:txStyles>
+    <p:titleStyle>
+      <a:lvl1pPr algn="l" defTabSz="914400" rtl="0" eaLnBrk="1" latinLnBrk="0" hangingPunct="1">
+        <a:lnSpc>
+          <a:spcPct val="90000"/>
+        </a:lnSpc>
+        <a:spcBef>
+          <a:spcPct val="0"/>
+        </a:spcBef>
+        <a:buNone/>
+        <a:defRPr sz="4400" kern="1200">
+          <a:solidFill>
+            <a:schemeClr val="tx1"/>
+          </a:solidFill>
+          <a:latin typeface="+mj-lt"/>
+          <a:ea typeface="+mj-ea"/>
+          <a:cs typeface="+mj-cs"/>
+        </a:defRPr>
+      </a:lvl1pPr>
+    </p:titleStyle>
+    <p:bodyStyle>
+      <a:lvl1pPr marL="228600" indent="-228600" algn="l" defTabSz="914400" rtl="0" eaLnBrk="1" latinLnBrk="0" hangingPunct="1">
+        <a:lnSpc>
+          <a:spcPct val="90000"/>
+        </a:lnSpc>
+        <a:spcBef>
+          <a:spcPts val="1000"/>
+        </a:spcBef>
+        <a:buFont typeface="Arial" panose="020B0604020202020204" pitchFamily="34" charset="0"/>
+        <a:buChar char="•"/>
+        <a:defRPr sz="2800" kern="1200">
+          <a:solidFill>
+            <a:schemeClr val="tx1"/>
+          </a:solidFill>
+          <a:latin typeface="+mn-lt"/>
+          <a:ea typeface="+mn-ea"/>
+          <a:cs typeface="+mn-cs"/>
+        </a:defRPr>
+      </a:lvl1pPr>
+      <a:lvl2pPr marL="685800" indent="-228600" algn="l" defTabSz="914400" rtl="0" eaLnBrk="1" latinLnBrk="0" hangingPunct="1">
+        <a:lnSpc>
+          <a:spcPct val="90000"/>
+        </a:lnSpc>
+        <a:spcBef>
+          <a:spcPts val="500"/>
+        </a:spcBef>
+        <a:buFont typeface="Arial" panose="020B0604020202020204" pitchFamily="34" charset="0"/>
+        <a:buChar char="•"/>
+        <a:defRPr sz="2400" kern="1200">
+          <a:solidFill>
+            <a:schemeClr val="tx1"/>
+          </a:solidFill>
+          <a:latin typeface="+mn-lt"/>
+          <a:ea typeface="+mn-ea"/>
+          <a:cs typeface="+mn-cs"/>
+        </a:defRPr>
+      </a:lvl2pPr>
+      <a:lvl3pPr marL="1143000" indent="-228600" algn="l" defTabSz="914400" rtl="0" eaLnBrk="1" latinLnBrk="0" hangingPunct="1">
+        <a:lnSpc>
+          <a:spcPct val="90000"/>
+        </a:lnSpc>
+        <a:spcBef>
+          <a:spcPts val="500"/>
+        </a:spcBef>
+        <a:buFont typeface="Arial" panose="020B0604020202020204" pitchFamily="34" charset="0"/>
+        <a:buChar char="•"/>
+        <a:defRPr sz="2000" kern="1200">
+          <a:solidFill>
+            <a:schemeClr val="tx1"/>
+          </a:solidFill>
+          <a:latin typeface="+mn-lt"/>
+          <a:ea typeface="+mn-ea"/>
+          <a:cs typeface="+mn-cs"/>
+        </a:defRPr>
+      </a:lvl3pPr>
+      <a:lvl4pPr marL="1600200" indent="-228600" algn="l" defTabSz="914400" rtl="0" eaLnBrk="1" latinLnBrk="0" hangingPunct="1">
+        <a:lnSpc>
+          <a:spcPct val="90000"/>
+        </a:lnSpc>
+        <a:spcBef>
+          <a:spcPts val="500"/>
+        </a:spcBef>
+        <a:buFont typeface="Arial" panose="020B0604020202020204" pitchFamily="34" charset="0"/>
+        <a:buChar char="•"/>
+        <a:defRPr sz="1800" kern="1200">
+          <a:solidFill>
+            <a:schemeClr val="tx1"/>
+          </a:solidFill>
+          <a:latin typeface="+mn-lt"/>
+          <a:ea typeface="+mn-ea"/>
+          <a:cs typeface="+mn-cs"/>
+        </a:defRPr>
+      </a:lvl4pPr>
+      <a:lvl5pPr marL="2057400" indent="-228600" algn="l" defTabSz="914400" rtl="0" eaLnBrk="1" latinLnBrk="0" hangingPunct="1">
+        <a:lnSpc>
+          <a:spcPct val="90000"/>
+        </a:lnSpc>
+        <a:spcBef>
+          <a:spcPts val="500"/>
+        </a:spcBef>
+        <a:buFont typeface="Arial" panose="020B0604020202020204" pitchFamily="34" charset="0"/>
+        <a:buChar char="•"/>
+        <a:defRPr sz="1800" kern="1200">
+          <a:solidFill>
+            <a:schemeClr val="tx1"/>
+          </a:solidFill>
+          <a:latin typeface="+mn-lt"/>
+          <a:ea typeface="+mn-ea"/>
+          <a:cs typeface="+mn-cs"/>
+        </a:defRPr>
+      </a:lvl5pPr>
+      <a:lvl6pPr marL="2514600" indent="-228600" algn="l" defTabSz="914400" rtl="0" eaLnBrk="1" latinLnBrk="0" hangingPunct="1">
+        <a:lnSpc>
+          <a:spcPct val="90000"/>
+        </a:lnSpc>
+        <a:spcBef>
+          <a:spcPts val="500"/>
+        </a:spcBef>
+        <a:buFont typeface="Arial" panose="020B0604020202020204" pitchFamily="34" charset="0"/>
+        <a:buChar char="•"/>
+        <a:defRPr sz="1800" kern="1200">
+          <a:solidFill>
+            <a:schemeClr val="tx1"/>
+          </a:solidFill>
+          <a:latin typeface="+mn-lt"/>
+          <a:ea typeface="+mn-ea"/>
+          <a:cs typeface="+mn-cs"/>
+        </a:defRPr>
+      </a:lvl6pPr>
+      <a:lvl7pPr marL="2971800" indent="-228600" algn="l" defTabSz="914400" rtl="0" eaLnBrk="1" latinLnBrk="0" hangingPunct="1">
+        <a:lnSpc>
+          <a:spcPct val="90000"/>
+        </a:lnSpc>
+        <a:spcBef>
+          <a:spcPts val="500"/>
+        </a:spcBef>
+        <a:buFont typeface="Arial" panose="020B0604020202020204" pitchFamily="34" charset="0"/>
+        <a:buChar char="•"/>
+        <a:defRPr sz="1800" kern="1200">
+          <a:solidFill>
+            <a:schemeClr val="tx1"/>
+          </a:solidFill>
+          <a:latin typeface="+mn-lt"/>
+          <a:ea typeface="+mn-ea"/>
+          <a:cs typeface="+mn-cs"/>
+        </a:defRPr>
+      </a:lvl7pPr>
+      <a:lvl8pPr marL="3429000" indent="-228600" algn="l" defTabSz="914400" rtl="0" eaLnBrk="1" latinLnBrk="0" hangingPunct="1">
+        <a:lnSpc>
+          <a:spcPct val="90000"/>
+        </a:lnSpc>
+        <a:spcBef>
+          <a:spcPts val="500"/>
+        </a:spcBef>
+        <a:buFont typeface="Arial" panose="020B0604020202020204" pitchFamily="34" charset="0"/>
+        <a:buChar char="•"/>
+        <a:defRPr sz="1800" kern="1200">
+          <a:solidFill>
+            <a:schemeClr val="tx1"/>
+          </a:solidFill>
+          <a:latin typeface="+mn-lt"/>
+          <a:ea typeface="+mn-ea"/>
+          <a:cs typeface="+mn-cs"/>
+        </a:defRPr>
+      </a:lvl8pPr>
+      <a:lvl9pPr marL="3886200" indent="-228600" algn="l" defTabSz="914400" rtl="0" eaLnBrk="1" latinLnBrk="0" hangingPunct="1">
+        <a:lnSpc>
+          <a:spcPct val="90000"/>
+        </a:lnSpc>
+        <a:spcBef>
+          <a:spcPts val="500"/>
+        </a:spcBef>
+        <a:buFont typeface="Arial" panose="020B0604020202020204" pitchFamily="34" charset="0"/>
+        <a:buChar char="•"/>
+        <a:defRPr sz="1800" kern="1200">
+          <a:solidFill>
+            <a:schemeClr val="tx1"/>
+          </a:solidFill>
+          <a:latin typeface="+mn-lt"/>
+          <a:ea typeface="+mn-ea"/>
+          <a:cs typeface="+mn-cs"/>
+        </a:defRPr>
+      </a:lvl9pPr>
+    </p:bodyStyle>
+    <p:otherStyle>
+      <a:defPPr>
+        <a:defRPr lang="de-DE"/>
+      </a:defPPr>
+      <a:lvl1pPr marL="0" algn="l" defTabSz="914400" rtl="0" eaLnBrk="1" latinLnBrk="0" hangingPunct="1">
+        <a:defRPr sz="1800" kern="1200">
+          <a:solidFill>
+            <a:schemeClr val="tx1"/>
+          </a:solidFill>
+          <a:latin typeface="+mn-lt"/>
+          <a:ea typeface="+mn-ea"/>
+          <a:cs typeface="+mn-cs"/>
+        </a:defRPr>
+      </a:lvl1pPr>
+      <a:lvl2pPr marL="457200" algn="l" defTabSz="914400" rtl="0" eaLnBrk="1" latinLnBrk="0" hangingPunct="1">
+        <a:defRPr sz="1800" kern="1200">
+          <a:solidFill>
+            <a:schemeClr val="tx1"/>
+          </a:solidFill>
+          <a:latin typeface="+mn-lt"/>
+          <a:ea typeface="+mn-ea"/>
+          <a:cs typeface="+mn-cs"/>
+        </a:defRPr>
+      </a:lvl2pPr>
+      <a:lvl3pPr marL="914400" algn="l" defTabSz="914400" rtl="0" eaLnBrk="1" latinLnBrk="0" hangingPunct="1">
+        <a:defRPr sz="1800" kern="1200">
+          <a:solidFill>
+            <a:schemeClr val="tx1"/>
+          </a:solidFill>
+          <a:latin typeface="+mn-lt"/>
+          <a:ea typeface="+mn-ea"/>
+          <a:cs typeface="+mn-cs"/>
+        </a:defRPr>
+      </a:lvl3pPr>
+      <a:lvl4pPr marL="1371600" algn="l" defTabSz="914400" rtl="0" eaLnBrk="1" latinLnBrk="0" hangingPunct="1">
+        <a:defRPr sz="1800" kern="1200">
+          <a:solidFill>
+            <a:schemeClr val="tx1"/>
+          </a:solidFill>
+          <a:latin typeface="+mn-lt"/>
+          <a:ea typeface="+mn-ea"/>
+          <a:cs typeface="+mn-cs"/>
+        </a:defRPr>
+      </a:lvl4pPr>
+      <a:lvl5pPr marL="1828800" algn="l" defTabSz="914400" rtl="0" eaLnBrk="1" latinLnBrk="0" hangingPunct="1">
+        <a:defRPr sz="1800" kern="1200">
+          <a:solidFill>
+            <a:schemeClr val="tx1"/>
+          </a:solidFill>
+          <a:latin typeface="+mn-lt"/>
+          <a:ea typeface="+mn-ea"/>
+          <a:cs typeface="+mn-cs"/>
+        </a:defRPr>
+      </a:lvl5pPr>
+      <a:lvl6pPr marL="2286000" algn="l" defTabSz="914400" rtl="0" eaLnBrk="1" latinLnBrk="0" hangingPunct="1">
+        <a:defRPr sz="1800" kern="1200">
+          <a:solidFill>
+            <a:schemeClr val="tx1"/>
+          </a:solidFill>
+          <a:latin typeface="+mn-lt"/>
+          <a:ea typeface="+mn-ea"/>
+          <a:cs typeface="+mn-cs"/>
+        </a:defRPr>
+      </a:lvl6pPr>
+      <a:lvl7pPr marL="2743200" algn="l" defTabSz="914400" rtl="0" eaLnBrk="1" latinLnBrk="0" hangingPunct="1">
+        <a:defRPr sz="1800" kern="1200">
+          <a:solidFill>
+            <a:schemeClr val="tx1"/>
+          </a:solidFill>
+          <a:latin typeface="+mn-lt"/>
+          <a:ea typeface="+mn-ea"/>
+          <a:cs typeface="+mn-cs"/>
+        </a:defRPr>
+      </a:lvl7pPr>
+      <a:lvl8pPr marL="3200400" algn="l" defTabSz="914400" rtl="0" eaLnBrk="1" latinLnBrk="0" hangingPunct="1">
+        <a:defRPr sz="1800" kern="1200">
+          <a:solidFill>
+            <a:schemeClr val="tx1"/>
+          </a:solidFill>
+          <a:latin typeface="+mn-lt"/>
+          <a:ea typeface="+mn-ea"/>
+          <a:cs typeface="+mn-cs"/>
+        </a:defRPr>
+      </a:lvl8pPr>
+      <a:lvl9pPr marL="3657600" algn="l" defTabSz="914400" rtl="0" eaLnBrk="1" latinLnBrk="0" hangingPunct="1">
+        <a:defRPr sz="1800" kern="1200">
+          <a:solidFill>
+            <a:schemeClr val="tx1"/>
+          </a:solidFill>
+          <a:latin typeface="+mn-lt"/>
+          <a:ea typeface="+mn-ea"/>
+          <a:cs typeface="+mn-cs"/>
+        </a:defRPr>
+      </a:lvl9pPr>
+    </p:otherStyle>
+  </p:txStyles>
 </p:sldMaster>
 </file>
 
 <file path=ppt/slides/slide1.xml><?xml version="1.0" encoding="utf-8"?>
-<p:sld xmlns:a="http://schemas.openxmlformats.org/drawingml/2006/main" xmlns:p="http://schemas.openxmlformats.org/presentationml/2006/main" xmlns:r="http://schemas.openxmlformats.org/officeDocument/2006/relationships" xmlns:p14="http://schemas.microsoft.com/office/powerpoint/2010/main" xmlns:p15="http://schemas.microsoft.com/office/powerpoint/2012/main" xmlns:mc="http://schemas.openxmlformats.org/markup-compatibility/2006">
+<p:sld xmlns:a="http://schemas.openxmlformats.org/drawingml/2006/main" xmlns:r="http://schemas.openxmlformats.org/officeDocument/2006/relationships" xmlns:p="http://schemas.openxmlformats.org/presentationml/2006/main">
   <p:cSld>
     <p:spTree>
       <p:nvGrpSpPr>
@@ -1938,7 +2350,7 @@
               </a:avLst>
             </a:prstGeom>
             <a:solidFill>
-              <a:srgbClr val="00b0f0">
+              <a:srgbClr val="00B0F0">
                 <a:alpha val="48000"/>
               </a:srgbClr>
             </a:solidFill>
@@ -1978,7 +2390,7 @@
               </a:avLst>
             </a:prstGeom>
             <a:solidFill>
-              <a:srgbClr val="c00000">
+              <a:srgbClr val="C00000">
                 <a:alpha val="48000"/>
               </a:srgbClr>
             </a:solidFill>
@@ -2032,9 +2444,10 @@
             <a:fontRef idx="minor"/>
           </p:style>
           <p:txBody>
-            <a:bodyPr lIns="90000" rIns="90000" tIns="45000" bIns="45000" anchor="ctr">
+            <a:bodyPr lIns="90000" tIns="45000" rIns="90000" bIns="45000" anchor="ctr">
               <a:noAutofit/>
             </a:bodyPr>
+            <a:lstStyle/>
             <a:p>
               <a:pPr algn="ctr">
                 <a:lnSpc>
@@ -2042,15 +2455,15 @@
                 </a:lnSpc>
               </a:pPr>
               <a:r>
-                <a:rPr b="0" lang="en-US" sz="1800" spc="-1" strike="noStrike">
+                <a:rPr lang="en-US" sz="1800" b="0" strike="noStrike" spc="-1">
                   <a:solidFill>
-                    <a:srgbClr val="ffffff"/>
+                    <a:srgbClr val="FFFFFF"/>
                   </a:solidFill>
                   <a:latin typeface="Calibri"/>
                 </a:rPr>
                 <a:t>IDLE</a:t>
               </a:r>
-              <a:endParaRPr b="0" lang="en-US" sz="1800" spc="-1" strike="noStrike">
+              <a:endParaRPr lang="en-US" sz="1800" b="0" strike="noStrike" spc="-1">
                 <a:latin typeface="Nimbus Sans"/>
               </a:endParaRPr>
             </a:p>
@@ -2087,9 +2500,10 @@
             <a:fontRef idx="minor"/>
           </p:style>
           <p:txBody>
-            <a:bodyPr lIns="90000" rIns="90000" tIns="45000" bIns="45000" anchor="ctr">
+            <a:bodyPr lIns="90000" tIns="45000" rIns="90000" bIns="45000" anchor="ctr">
               <a:noAutofit/>
             </a:bodyPr>
+            <a:lstStyle/>
             <a:p>
               <a:pPr algn="ctr">
                 <a:lnSpc>
@@ -2097,15 +2511,15 @@
                 </a:lnSpc>
               </a:pPr>
               <a:r>
-                <a:rPr b="0" lang="en-US" sz="1800" spc="-1" strike="noStrike">
+                <a:rPr lang="en-US" sz="1800" b="0" strike="noStrike" spc="-1">
                   <a:solidFill>
-                    <a:srgbClr val="ffffff"/>
+                    <a:srgbClr val="FFFFFF"/>
                   </a:solidFill>
                   <a:latin typeface="Calibri"/>
                 </a:rPr>
                 <a:t>NETWORK DISCOVERY</a:t>
               </a:r>
-              <a:endParaRPr b="0" lang="en-US" sz="1800" spc="-1" strike="noStrike">
+              <a:endParaRPr lang="en-US" sz="1800" b="0" strike="noStrike" spc="-1">
                 <a:latin typeface="Nimbus Sans"/>
               </a:endParaRPr>
             </a:p>
@@ -2142,9 +2556,10 @@
             <a:fontRef idx="minor"/>
           </p:style>
           <p:txBody>
-            <a:bodyPr lIns="90000" rIns="90000" tIns="45000" bIns="45000" anchor="ctr">
+            <a:bodyPr lIns="90000" tIns="45000" rIns="90000" bIns="45000" anchor="ctr">
               <a:noAutofit/>
             </a:bodyPr>
+            <a:lstStyle/>
             <a:p>
               <a:pPr algn="ctr">
                 <a:lnSpc>
@@ -2152,15 +2567,15 @@
                 </a:lnSpc>
               </a:pPr>
               <a:r>
-                <a:rPr b="0" lang="en-US" sz="1800" spc="-1" strike="noStrike">
+                <a:rPr lang="en-US" sz="1800" b="0" strike="noStrike" spc="-1">
                   <a:solidFill>
-                    <a:srgbClr val="ffffff"/>
+                    <a:srgbClr val="FFFFFF"/>
                   </a:solidFill>
                   <a:latin typeface="Calibri"/>
                 </a:rPr>
                 <a:t>PATHMODE</a:t>
               </a:r>
-              <a:endParaRPr b="0" lang="en-US" sz="1800" spc="-1" strike="noStrike">
+              <a:endParaRPr lang="en-US" sz="1800" b="0" strike="noStrike" spc="-1">
                 <a:latin typeface="Nimbus Sans"/>
               </a:endParaRPr>
             </a:p>
@@ -2197,9 +2612,10 @@
             <a:fontRef idx="minor"/>
           </p:style>
           <p:txBody>
-            <a:bodyPr lIns="90000" rIns="90000" tIns="45000" bIns="45000" anchor="ctr">
+            <a:bodyPr lIns="90000" tIns="45000" rIns="90000" bIns="45000" anchor="ctr">
               <a:noAutofit/>
             </a:bodyPr>
+            <a:lstStyle/>
             <a:p>
               <a:pPr algn="ctr">
                 <a:lnSpc>
@@ -2207,15 +2623,15 @@
                 </a:lnSpc>
               </a:pPr>
               <a:r>
-                <a:rPr b="0" lang="en-US" sz="1800" spc="-1" strike="noStrike">
+                <a:rPr lang="en-US" sz="1800" b="0" strike="noStrike" spc="-1">
                   <a:solidFill>
-                    <a:srgbClr val="ffffff"/>
+                    <a:srgbClr val="FFFFFF"/>
                   </a:solidFill>
                   <a:latin typeface="Calibri"/>
                 </a:rPr>
                 <a:t>UNICAST MODE</a:t>
               </a:r>
-              <a:endParaRPr b="0" lang="en-US" sz="1800" spc="-1" strike="noStrike">
+              <a:endParaRPr lang="en-US" sz="1800" b="0" strike="noStrike" spc="-1">
                 <a:latin typeface="Nimbus Sans"/>
               </a:endParaRPr>
             </a:p>
@@ -2252,9 +2668,10 @@
             <a:fontRef idx="minor"/>
           </p:style>
           <p:txBody>
-            <a:bodyPr lIns="90000" rIns="90000" tIns="45000" bIns="45000" anchor="ctr">
+            <a:bodyPr lIns="90000" tIns="45000" rIns="90000" bIns="45000" anchor="ctr">
               <a:noAutofit/>
             </a:bodyPr>
+            <a:lstStyle/>
             <a:p>
               <a:pPr algn="ctr">
                 <a:lnSpc>
@@ -2262,15 +2679,15 @@
                 </a:lnSpc>
               </a:pPr>
               <a:r>
-                <a:rPr b="0" lang="en-US" sz="1800" spc="-1" strike="noStrike">
+                <a:rPr lang="en-US" sz="1800" b="0" strike="noStrike" spc="-1">
                   <a:solidFill>
-                    <a:srgbClr val="ffffff"/>
+                    <a:srgbClr val="FFFFFF"/>
                   </a:solidFill>
                   <a:latin typeface="Calibri"/>
                 </a:rPr>
                 <a:t>EMERGENCY</a:t>
               </a:r>
-              <a:endParaRPr b="0" lang="en-US" sz="1800" spc="-1" strike="noStrike">
+              <a:endParaRPr lang="en-US" sz="1800" b="0" strike="noStrike" spc="-1">
                 <a:latin typeface="Nimbus Sans"/>
               </a:endParaRPr>
             </a:p>
@@ -2283,7 +2700,7 @@
             <p:nvPr/>
           </p:nvSpPr>
           <p:spPr>
-            <a:xfrm flipH="1" rot="5400000">
+            <a:xfrm rot="5400000" flipH="1">
               <a:off x="3603600" y="5753160"/>
               <a:ext cx="746640" cy="12240"/>
             </a:xfrm>
@@ -2296,7 +2713,7 @@
             </a:prstGeom>
             <a:noFill/>
             <a:ln w="38160">
-              <a:tailEnd len="med" type="triangle" w="med"/>
+              <a:tailEnd type="triangle" w="med" len="med"/>
             </a:ln>
           </p:spPr>
           <p:style>
@@ -2319,7 +2736,7 @@
             <p:nvPr/>
           </p:nvSpPr>
           <p:spPr>
-            <a:xfrm flipH="1" flipV="1" rot="5400000">
+            <a:xfrm rot="5400000" flipH="1" flipV="1">
               <a:off x="3714840" y="2771640"/>
               <a:ext cx="3021120" cy="3996000"/>
             </a:xfrm>
@@ -2330,7 +2747,7 @@
             </a:prstGeom>
             <a:noFill/>
             <a:ln w="38160">
-              <a:tailEnd len="med" type="triangle" w="med"/>
+              <a:tailEnd type="triangle" w="med" len="med"/>
             </a:ln>
           </p:spPr>
           <p:style>
@@ -2361,6 +2778,7 @@
               <a:avLst/>
               <a:gdLst/>
               <a:ahLst/>
+              <a:cxnLst/>
               <a:rect l="l" t="t" r="r" b="b"/>
               <a:pathLst>
                 <a:path w="21600" h="21600">
@@ -2378,7 +2796,7 @@
               <a:solidFill>
                 <a:schemeClr val="accent1"/>
               </a:solidFill>
-              <a:tailEnd len="med" type="triangle" w="med"/>
+              <a:tailEnd type="triangle" w="med" len="med"/>
             </a:ln>
           </p:spPr>
           <p:style>
@@ -2409,6 +2827,7 @@
               <a:avLst/>
               <a:gdLst/>
               <a:ahLst/>
+              <a:cxnLst/>
               <a:rect l="l" t="t" r="r" b="b"/>
               <a:pathLst>
                 <a:path w="21600" h="21600">
@@ -2423,7 +2842,7 @@
             </a:custGeom>
             <a:noFill/>
             <a:ln w="38160">
-              <a:tailEnd len="med" type="triangle" w="med"/>
+              <a:tailEnd type="triangle" w="med" len="med"/>
             </a:ln>
           </p:spPr>
           <p:style>
@@ -2454,6 +2873,7 @@
               <a:avLst/>
               <a:gdLst/>
               <a:ahLst/>
+              <a:cxnLst/>
               <a:rect l="l" t="t" r="r" b="b"/>
               <a:pathLst>
                 <a:path w="21600" h="21600">
@@ -2468,7 +2888,7 @@
             </a:custGeom>
             <a:noFill/>
             <a:ln w="38160">
-              <a:tailEnd len="med" type="triangle" w="med"/>
+              <a:tailEnd type="triangle" w="med" len="med"/>
             </a:ln>
           </p:spPr>
           <p:style>
@@ -2502,7 +2922,7 @@
             </a:prstGeom>
             <a:noFill/>
             <a:ln w="38160">
-              <a:tailEnd len="med" type="triangle" w="med"/>
+              <a:tailEnd type="triangle" w="med" len="med"/>
             </a:ln>
           </p:spPr>
           <p:style>
@@ -2525,7 +2945,7 @@
             <p:nvPr/>
           </p:nvSpPr>
           <p:spPr>
-            <a:xfrm flipH="1" rot="5400000">
+            <a:xfrm rot="5400000" flipH="1">
               <a:off x="7599960" y="2731680"/>
               <a:ext cx="746640" cy="12240"/>
             </a:xfrm>
@@ -2538,7 +2958,7 @@
             </a:prstGeom>
             <a:noFill/>
             <a:ln w="38160">
-              <a:tailEnd len="med" type="triangle" w="med"/>
+              <a:tailEnd type="triangle" w="med" len="med"/>
             </a:ln>
           </p:spPr>
           <p:style>
@@ -2569,6 +2989,7 @@
               <a:avLst/>
               <a:gdLst/>
               <a:ahLst/>
+              <a:cxnLst/>
               <a:rect l="l" t="t" r="r" b="b"/>
               <a:pathLst>
                 <a:path w="21600" h="21600">
@@ -2583,7 +3004,7 @@
             </a:custGeom>
             <a:noFill/>
             <a:ln w="38160">
-              <a:tailEnd len="med" type="triangle" w="med"/>
+              <a:tailEnd type="triangle" w="med" len="med"/>
             </a:ln>
           </p:spPr>
           <p:style>
@@ -2619,15 +3040,22 @@
             </a:ln>
           </p:spPr>
           <p:style>
-            <a:lnRef idx="0"/>
-            <a:fillRef idx="0"/>
-            <a:effectRef idx="0"/>
+            <a:lnRef idx="0">
+              <a:scrgbClr r="0" g="0" b="0"/>
+            </a:lnRef>
+            <a:fillRef idx="0">
+              <a:scrgbClr r="0" g="0" b="0"/>
+            </a:fillRef>
+            <a:effectRef idx="0">
+              <a:scrgbClr r="0" g="0" b="0"/>
+            </a:effectRef>
             <a:fontRef idx="minor"/>
           </p:style>
           <p:txBody>
-            <a:bodyPr lIns="90000" rIns="90000" tIns="45000" bIns="45000">
+            <a:bodyPr lIns="90000" tIns="45000" rIns="90000" bIns="45000">
               <a:spAutoFit/>
             </a:bodyPr>
+            <a:lstStyle/>
             <a:p>
               <a:pPr>
                 <a:lnSpc>
@@ -2635,7 +3063,7 @@
                 </a:lnSpc>
               </a:pPr>
               <a:r>
-                <a:rPr b="0" lang="en-US" sz="1800" spc="-1" strike="noStrike">
+                <a:rPr lang="en-US" sz="1800" b="0" strike="noStrike" spc="-1">
                   <a:solidFill>
                     <a:srgbClr val="000000"/>
                   </a:solidFill>
@@ -2643,7 +3071,7 @@
                 </a:rPr>
                 <a:t>BOOT UP</a:t>
               </a:r>
-              <a:endParaRPr b="0" lang="en-US" sz="1800" spc="-1" strike="noStrike">
+              <a:endParaRPr lang="en-US" sz="1800" b="0" strike="noStrike" spc="-1">
                 <a:latin typeface="Nimbus Sans"/>
               </a:endParaRPr>
             </a:p>
@@ -2656,7 +3084,7 @@
             <p:nvPr/>
           </p:nvSpPr>
           <p:spPr>
-            <a:xfrm flipH="1" rot="5400000">
+            <a:xfrm rot="5400000" flipH="1">
               <a:off x="3603600" y="792000"/>
               <a:ext cx="746640" cy="12240"/>
             </a:xfrm>
@@ -2669,7 +3097,7 @@
             </a:prstGeom>
             <a:noFill/>
             <a:ln w="38160">
-              <a:tailEnd len="med" type="triangle" w="med"/>
+              <a:tailEnd type="triangle" w="med" len="med"/>
             </a:ln>
           </p:spPr>
           <p:style>
@@ -2705,15 +3133,22 @@
             </a:ln>
           </p:spPr>
           <p:style>
-            <a:lnRef idx="0"/>
-            <a:fillRef idx="0"/>
-            <a:effectRef idx="0"/>
+            <a:lnRef idx="0">
+              <a:scrgbClr r="0" g="0" b="0"/>
+            </a:lnRef>
+            <a:fillRef idx="0">
+              <a:scrgbClr r="0" g="0" b="0"/>
+            </a:fillRef>
+            <a:effectRef idx="0">
+              <a:scrgbClr r="0" g="0" b="0"/>
+            </a:effectRef>
             <a:fontRef idx="minor"/>
           </p:style>
           <p:txBody>
-            <a:bodyPr lIns="90000" rIns="90000" tIns="45000" bIns="45000">
+            <a:bodyPr lIns="90000" tIns="45000" rIns="90000" bIns="45000">
               <a:spAutoFit/>
             </a:bodyPr>
+            <a:lstStyle/>
             <a:p>
               <a:pPr>
                 <a:lnSpc>
@@ -2721,15 +3156,15 @@
                 </a:lnSpc>
               </a:pPr>
               <a:r>
-                <a:rPr b="1" lang="en-US" sz="1800" spc="-1" strike="noStrike">
+                <a:rPr lang="en-US" sz="1800" b="1" strike="noStrike" spc="-1">
                   <a:solidFill>
-                    <a:srgbClr val="c00000"/>
+                    <a:srgbClr val="C00000"/>
                   </a:solidFill>
                   <a:latin typeface="Calibri"/>
                 </a:rPr>
                 <a:t>Broadcast</a:t>
               </a:r>
-              <a:endParaRPr b="0" lang="en-US" sz="1800" spc="-1" strike="noStrike">
+              <a:endParaRPr lang="en-US" sz="1800" b="0" strike="noStrike" spc="-1">
                 <a:latin typeface="Nimbus Sans"/>
               </a:endParaRPr>
             </a:p>
@@ -2755,15 +3190,22 @@
             </a:ln>
           </p:spPr>
           <p:style>
-            <a:lnRef idx="0"/>
-            <a:fillRef idx="0"/>
-            <a:effectRef idx="0"/>
+            <a:lnRef idx="0">
+              <a:scrgbClr r="0" g="0" b="0"/>
+            </a:lnRef>
+            <a:fillRef idx="0">
+              <a:scrgbClr r="0" g="0" b="0"/>
+            </a:fillRef>
+            <a:effectRef idx="0">
+              <a:scrgbClr r="0" g="0" b="0"/>
+            </a:effectRef>
             <a:fontRef idx="minor"/>
           </p:style>
           <p:txBody>
-            <a:bodyPr lIns="90000" rIns="90000" tIns="45000" bIns="45000">
+            <a:bodyPr lIns="90000" tIns="45000" rIns="90000" bIns="45000">
               <a:spAutoFit/>
             </a:bodyPr>
+            <a:lstStyle/>
             <a:p>
               <a:pPr>
                 <a:lnSpc>
@@ -2771,7 +3213,7 @@
                 </a:lnSpc>
               </a:pPr>
               <a:r>
-                <a:rPr b="1" lang="en-US" sz="1800" spc="-1" strike="noStrike">
+                <a:rPr lang="en-US" sz="1800" b="1" strike="noStrike" spc="-1">
                   <a:solidFill>
                     <a:srgbClr val="002060"/>
                   </a:solidFill>
@@ -2779,7 +3221,7 @@
                 </a:rPr>
                 <a:t>Unicast</a:t>
               </a:r>
-              <a:endParaRPr b="0" lang="en-US" sz="1800" spc="-1" strike="noStrike">
+              <a:endParaRPr lang="en-US" sz="1800" b="0" strike="noStrike" spc="-1">
                 <a:latin typeface="Nimbus Sans"/>
               </a:endParaRPr>
             </a:p>
@@ -2805,15 +3247,22 @@
             </a:ln>
           </p:spPr>
           <p:style>
-            <a:lnRef idx="0"/>
-            <a:fillRef idx="0"/>
-            <a:effectRef idx="0"/>
+            <a:lnRef idx="0">
+              <a:scrgbClr r="0" g="0" b="0"/>
+            </a:lnRef>
+            <a:fillRef idx="0">
+              <a:scrgbClr r="0" g="0" b="0"/>
+            </a:fillRef>
+            <a:effectRef idx="0">
+              <a:scrgbClr r="0" g="0" b="0"/>
+            </a:effectRef>
             <a:fontRef idx="minor"/>
           </p:style>
           <p:txBody>
-            <a:bodyPr lIns="90000" rIns="90000" tIns="45000" bIns="45000">
+            <a:bodyPr lIns="90000" tIns="45000" rIns="90000" bIns="45000">
               <a:spAutoFit/>
             </a:bodyPr>
+            <a:lstStyle/>
             <a:p>
               <a:pPr>
                 <a:lnSpc>
@@ -2821,7 +3270,7 @@
                 </a:lnSpc>
               </a:pPr>
               <a:r>
-                <a:rPr b="0" i="1" lang="en-US" sz="1800" spc="-1" strike="noStrike">
+                <a:rPr lang="en-US" sz="1800" b="0" i="1" strike="noStrike" spc="-1">
                   <a:solidFill>
                     <a:srgbClr val="000000"/>
                   </a:solidFill>
@@ -2829,7 +3278,7 @@
                 </a:rPr>
                 <a:t>button  press</a:t>
               </a:r>
-              <a:endParaRPr b="0" lang="en-US" sz="1800" spc="-1" strike="noStrike">
+              <a:endParaRPr lang="en-US" sz="1800" b="0" strike="noStrike" spc="-1">
                 <a:latin typeface="Nimbus Sans"/>
               </a:endParaRPr>
             </a:p>
@@ -2855,15 +3304,22 @@
             </a:ln>
           </p:spPr>
           <p:style>
-            <a:lnRef idx="0"/>
-            <a:fillRef idx="0"/>
-            <a:effectRef idx="0"/>
+            <a:lnRef idx="0">
+              <a:scrgbClr r="0" g="0" b="0"/>
+            </a:lnRef>
+            <a:fillRef idx="0">
+              <a:scrgbClr r="0" g="0" b="0"/>
+            </a:fillRef>
+            <a:effectRef idx="0">
+              <a:scrgbClr r="0" g="0" b="0"/>
+            </a:effectRef>
             <a:fontRef idx="minor"/>
           </p:style>
           <p:txBody>
-            <a:bodyPr lIns="90000" rIns="90000" tIns="45000" bIns="45000">
+            <a:bodyPr lIns="90000" tIns="45000" rIns="90000" bIns="45000">
               <a:spAutoFit/>
             </a:bodyPr>
+            <a:lstStyle/>
             <a:p>
               <a:pPr>
                 <a:lnSpc>
@@ -2871,7 +3327,7 @@
                 </a:lnSpc>
               </a:pPr>
               <a:r>
-                <a:rPr b="0" i="1" lang="en-US" sz="1800" spc="-1" strike="noStrike">
+                <a:rPr lang="en-US" sz="1800" b="0" i="1" strike="noStrike" spc="-1">
                   <a:solidFill>
                     <a:srgbClr val="000000"/>
                   </a:solidFill>
@@ -2879,7 +3335,7 @@
                 </a:rPr>
                 <a:t>complete</a:t>
               </a:r>
-              <a:endParaRPr b="0" lang="en-US" sz="1800" spc="-1" strike="noStrike">
+              <a:endParaRPr lang="en-US" sz="1800" b="0" strike="noStrike" spc="-1">
                 <a:latin typeface="Nimbus Sans"/>
               </a:endParaRPr>
             </a:p>
@@ -2892,7 +3348,7 @@
             <p:nvPr/>
           </p:nvSpPr>
           <p:spPr>
-            <a:xfrm flipH="1" rot="5400000">
+            <a:xfrm rot="5400000" flipH="1">
               <a:off x="3564720" y="4207680"/>
               <a:ext cx="746640" cy="12240"/>
             </a:xfrm>
@@ -2905,7 +3361,7 @@
             </a:prstGeom>
             <a:noFill/>
             <a:ln w="38160">
-              <a:tailEnd len="med" type="triangle" w="med"/>
+              <a:tailEnd type="triangle" w="med" len="med"/>
             </a:ln>
           </p:spPr>
           <p:style>
@@ -2941,15 +3397,22 @@
             </a:ln>
           </p:spPr>
           <p:style>
-            <a:lnRef idx="0"/>
-            <a:fillRef idx="0"/>
-            <a:effectRef idx="0"/>
+            <a:lnRef idx="0">
+              <a:scrgbClr r="0" g="0" b="0"/>
+            </a:lnRef>
+            <a:fillRef idx="0">
+              <a:scrgbClr r="0" g="0" b="0"/>
+            </a:fillRef>
+            <a:effectRef idx="0">
+              <a:scrgbClr r="0" g="0" b="0"/>
+            </a:effectRef>
             <a:fontRef idx="minor"/>
           </p:style>
           <p:txBody>
-            <a:bodyPr lIns="90000" rIns="90000" tIns="45000" bIns="45000">
+            <a:bodyPr lIns="90000" tIns="45000" rIns="90000" bIns="45000">
               <a:spAutoFit/>
             </a:bodyPr>
+            <a:lstStyle/>
             <a:p>
               <a:pPr>
                 <a:lnSpc>
@@ -2957,7 +3420,7 @@
                 </a:lnSpc>
               </a:pPr>
               <a:r>
-                <a:rPr b="0" i="1" lang="en-US" sz="1800" spc="-1" strike="noStrike">
+                <a:rPr lang="en-US" sz="1800" b="0" i="1" strike="noStrike" spc="-1">
                   <a:solidFill>
                     <a:srgbClr val="000000"/>
                   </a:solidFill>
@@ -2965,7 +3428,7 @@
                 </a:rPr>
                 <a:t>next Mote</a:t>
               </a:r>
-              <a:endParaRPr b="0" lang="en-US" sz="1800" spc="-1" strike="noStrike">
+              <a:endParaRPr lang="en-US" sz="1800" b="0" strike="noStrike" spc="-1">
                 <a:latin typeface="Nimbus Sans"/>
               </a:endParaRPr>
             </a:p>
@@ -2991,15 +3454,22 @@
             </a:ln>
           </p:spPr>
           <p:style>
-            <a:lnRef idx="0"/>
-            <a:fillRef idx="0"/>
-            <a:effectRef idx="0"/>
+            <a:lnRef idx="0">
+              <a:scrgbClr r="0" g="0" b="0"/>
+            </a:lnRef>
+            <a:fillRef idx="0">
+              <a:scrgbClr r="0" g="0" b="0"/>
+            </a:fillRef>
+            <a:effectRef idx="0">
+              <a:scrgbClr r="0" g="0" b="0"/>
+            </a:effectRef>
             <a:fontRef idx="minor"/>
           </p:style>
           <p:txBody>
-            <a:bodyPr lIns="90000" rIns="90000" tIns="45000" bIns="45000">
+            <a:bodyPr lIns="90000" tIns="45000" rIns="90000" bIns="45000">
               <a:spAutoFit/>
             </a:bodyPr>
+            <a:lstStyle/>
             <a:p>
               <a:pPr>
                 <a:lnSpc>
@@ -3007,7 +3477,7 @@
                 </a:lnSpc>
               </a:pPr>
               <a:r>
-                <a:rPr b="0" i="1" lang="en-US" sz="1800" spc="-1" strike="noStrike">
+                <a:rPr lang="en-US" sz="1800" b="0" i="1" strike="noStrike" spc="-1">
                   <a:solidFill>
                     <a:srgbClr val="000000"/>
                   </a:solidFill>
@@ -3015,7 +3485,7 @@
                 </a:rPr>
                 <a:t>automatic or manual</a:t>
               </a:r>
-              <a:endParaRPr b="0" lang="en-US" sz="1800" spc="-1" strike="noStrike">
+              <a:endParaRPr lang="en-US" sz="1800" b="0" strike="noStrike" spc="-1">
                 <a:latin typeface="Nimbus Sans"/>
               </a:endParaRPr>
             </a:p>
@@ -3041,15 +3511,22 @@
             </a:ln>
           </p:spPr>
           <p:style>
-            <a:lnRef idx="0"/>
-            <a:fillRef idx="0"/>
-            <a:effectRef idx="0"/>
+            <a:lnRef idx="0">
+              <a:scrgbClr r="0" g="0" b="0"/>
+            </a:lnRef>
+            <a:fillRef idx="0">
+              <a:scrgbClr r="0" g="0" b="0"/>
+            </a:fillRef>
+            <a:effectRef idx="0">
+              <a:scrgbClr r="0" g="0" b="0"/>
+            </a:effectRef>
             <a:fontRef idx="minor"/>
           </p:style>
           <p:txBody>
-            <a:bodyPr lIns="90000" rIns="90000" tIns="45000" bIns="45000">
+            <a:bodyPr lIns="90000" tIns="45000" rIns="90000" bIns="45000">
               <a:spAutoFit/>
             </a:bodyPr>
+            <a:lstStyle/>
             <a:p>
               <a:pPr>
                 <a:lnSpc>
@@ -3057,7 +3534,7 @@
                 </a:lnSpc>
               </a:pPr>
               <a:r>
-                <a:rPr b="0" i="1" lang="en-US" sz="1800" spc="-1" strike="noStrike">
+                <a:rPr lang="en-US" sz="1800" b="0" i="1" strike="noStrike" spc="-1">
                   <a:solidFill>
                     <a:srgbClr val="000000"/>
                   </a:solidFill>
@@ -3065,7 +3542,7 @@
                 </a:rPr>
                 <a:t>next Mote</a:t>
               </a:r>
-              <a:endParaRPr b="0" lang="en-US" sz="1800" spc="-1" strike="noStrike">
+              <a:endParaRPr lang="en-US" sz="1800" b="0" strike="noStrike" spc="-1">
                 <a:latin typeface="Nimbus Sans"/>
               </a:endParaRPr>
             </a:p>
@@ -3091,15 +3568,22 @@
             </a:ln>
           </p:spPr>
           <p:style>
-            <a:lnRef idx="0"/>
-            <a:fillRef idx="0"/>
-            <a:effectRef idx="0"/>
+            <a:lnRef idx="0">
+              <a:scrgbClr r="0" g="0" b="0"/>
+            </a:lnRef>
+            <a:fillRef idx="0">
+              <a:scrgbClr r="0" g="0" b="0"/>
+            </a:fillRef>
+            <a:effectRef idx="0">
+              <a:scrgbClr r="0" g="0" b="0"/>
+            </a:effectRef>
             <a:fontRef idx="minor"/>
           </p:style>
           <p:txBody>
-            <a:bodyPr lIns="90000" rIns="90000" tIns="45000" bIns="45000">
+            <a:bodyPr lIns="90000" tIns="45000" rIns="90000" bIns="45000">
               <a:spAutoFit/>
             </a:bodyPr>
+            <a:lstStyle/>
             <a:p>
               <a:pPr>
                 <a:lnSpc>
@@ -3107,7 +3591,7 @@
                 </a:lnSpc>
               </a:pPr>
               <a:r>
-                <a:rPr b="0" i="1" lang="en-US" sz="1800" spc="-1" strike="noStrike">
+                <a:rPr lang="en-US" sz="1800" b="0" i="1" strike="noStrike" spc="-1">
                   <a:solidFill>
                     <a:srgbClr val="000000"/>
                   </a:solidFill>
@@ -3115,7 +3599,7 @@
                 </a:rPr>
                 <a:t>complete</a:t>
               </a:r>
-              <a:endParaRPr b="0" lang="en-US" sz="1800" spc="-1" strike="noStrike">
+              <a:endParaRPr lang="en-US" sz="1800" b="0" strike="noStrike" spc="-1">
                 <a:latin typeface="Nimbus Sans"/>
               </a:endParaRPr>
             </a:p>
@@ -3141,15 +3625,22 @@
             </a:ln>
           </p:spPr>
           <p:style>
-            <a:lnRef idx="0"/>
-            <a:fillRef idx="0"/>
-            <a:effectRef idx="0"/>
+            <a:lnRef idx="0">
+              <a:scrgbClr r="0" g="0" b="0"/>
+            </a:lnRef>
+            <a:fillRef idx="0">
+              <a:scrgbClr r="0" g="0" b="0"/>
+            </a:fillRef>
+            <a:effectRef idx="0">
+              <a:scrgbClr r="0" g="0" b="0"/>
+            </a:effectRef>
             <a:fontRef idx="minor"/>
           </p:style>
           <p:txBody>
-            <a:bodyPr lIns="90000" rIns="90000" tIns="45000" bIns="45000">
+            <a:bodyPr lIns="90000" tIns="45000" rIns="90000" bIns="45000">
               <a:spAutoFit/>
             </a:bodyPr>
+            <a:lstStyle/>
             <a:p>
               <a:pPr>
                 <a:lnSpc>
@@ -3157,7 +3648,7 @@
                 </a:lnSpc>
               </a:pPr>
               <a:r>
-                <a:rPr b="0" i="1" lang="en-US" sz="1800" spc="-1" strike="noStrike">
+                <a:rPr lang="en-US" sz="1800" b="0" i="1" strike="noStrike" spc="-1">
                   <a:solidFill>
                     <a:srgbClr val="000000"/>
                   </a:solidFill>
@@ -3165,7 +3656,7 @@
                 </a:rPr>
                 <a:t>Emergency</a:t>
               </a:r>
-              <a:endParaRPr b="0" lang="en-US" sz="1800" spc="-1" strike="noStrike">
+              <a:endParaRPr lang="en-US" sz="1800" b="0" strike="noStrike" spc="-1">
                 <a:latin typeface="Nimbus Sans"/>
               </a:endParaRPr>
             </a:p>
@@ -3191,15 +3682,22 @@
             </a:ln>
           </p:spPr>
           <p:style>
-            <a:lnRef idx="0"/>
-            <a:fillRef idx="0"/>
-            <a:effectRef idx="0"/>
+            <a:lnRef idx="0">
+              <a:scrgbClr r="0" g="0" b="0"/>
+            </a:lnRef>
+            <a:fillRef idx="0">
+              <a:scrgbClr r="0" g="0" b="0"/>
+            </a:fillRef>
+            <a:effectRef idx="0">
+              <a:scrgbClr r="0" g="0" b="0"/>
+            </a:effectRef>
             <a:fontRef idx="minor"/>
           </p:style>
           <p:txBody>
-            <a:bodyPr lIns="90000" rIns="90000" tIns="45000" bIns="45000">
+            <a:bodyPr lIns="90000" tIns="45000" rIns="90000" bIns="45000">
               <a:spAutoFit/>
             </a:bodyPr>
+            <a:lstStyle/>
             <a:p>
               <a:pPr>
                 <a:lnSpc>
@@ -3207,7 +3705,7 @@
                 </a:lnSpc>
               </a:pPr>
               <a:r>
-                <a:rPr b="0" i="1" lang="en-US" sz="1800" spc="-1" strike="noStrike">
+                <a:rPr lang="en-US" sz="1800" b="0" i="1" strike="noStrike" spc="-1">
                   <a:solidFill>
                     <a:srgbClr val="000000"/>
                   </a:solidFill>
@@ -3215,7 +3713,7 @@
                 </a:rPr>
                 <a:t>Resume Operation</a:t>
               </a:r>
-              <a:endParaRPr b="0" lang="en-US" sz="1800" spc="-1" strike="noStrike">
+              <a:endParaRPr lang="en-US" sz="1800" b="0" strike="noStrike" spc="-1">
                 <a:latin typeface="Nimbus Sans"/>
               </a:endParaRPr>
             </a:p>
@@ -3224,14 +3722,1583 @@
       </p:grpSp>
     </p:spTree>
   </p:cSld>
-  <mc:AlternateContent>
-    <mc:Choice Requires="p14">
-      <p:transition spd="slow" p14:dur="2000"/>
-    </mc:Choice>
-    <mc:Fallback>
-      <p:transition spd="slow"/>
-    </mc:Fallback>
-  </mc:AlternateContent>
+  <p:clrMapOvr>
+    <a:masterClrMapping/>
+  </p:clrMapOvr>
+</p:sld>
+</file>
+
+<file path=ppt/slides/slide2.xml><?xml version="1.0" encoding="utf-8"?>
+<p:sld xmlns:a="http://schemas.openxmlformats.org/drawingml/2006/main" xmlns:r="http://schemas.openxmlformats.org/officeDocument/2006/relationships" xmlns:p="http://schemas.openxmlformats.org/presentationml/2006/main">
+  <p:cSld>
+    <p:spTree>
+      <p:nvGrpSpPr>
+        <p:cNvPr id="1" name=""/>
+        <p:cNvGrpSpPr/>
+        <p:nvPr/>
+      </p:nvGrpSpPr>
+      <p:grpSpPr>
+        <a:xfrm>
+          <a:off x="0" y="0"/>
+          <a:ext cx="0" cy="0"/>
+          <a:chOff x="0" y="0"/>
+          <a:chExt cx="0" cy="0"/>
+        </a:xfrm>
+      </p:grpSpPr>
+      <p:pic>
+        <p:nvPicPr>
+          <p:cNvPr id="11" name="Grafik 18">
+            <a:extLst>
+              <a:ext uri="{FF2B5EF4-FFF2-40B4-BE49-F238E27FC236}">
+                <a16:creationId xmlns:a16="http://schemas.microsoft.com/office/drawing/2014/main" id="{7E834309-1655-E449-9E49-4216767AE357}"/>
+              </a:ext>
+            </a:extLst>
+          </p:cNvPr>
+          <p:cNvPicPr/>
+          <p:nvPr/>
+        </p:nvPicPr>
+        <p:blipFill>
+          <a:blip r:embed="rId2"/>
+          <a:stretch/>
+        </p:blipFill>
+        <p:spPr>
+          <a:xfrm>
+            <a:off x="3818506" y="3026399"/>
+            <a:ext cx="301320" cy="305640"/>
+          </a:xfrm>
+          <a:prstGeom prst="rect">
+            <a:avLst/>
+          </a:prstGeom>
+          <a:ln>
+            <a:noFill/>
+          </a:ln>
+        </p:spPr>
+      </p:pic>
+      <p:pic>
+        <p:nvPicPr>
+          <p:cNvPr id="14" name="Grafik 19">
+            <a:extLst>
+              <a:ext uri="{FF2B5EF4-FFF2-40B4-BE49-F238E27FC236}">
+                <a16:creationId xmlns:a16="http://schemas.microsoft.com/office/drawing/2014/main" id="{B8274F63-D6EF-B847-A869-E340D2D07586}"/>
+              </a:ext>
+            </a:extLst>
+          </p:cNvPr>
+          <p:cNvPicPr/>
+          <p:nvPr/>
+        </p:nvPicPr>
+        <p:blipFill>
+          <a:blip r:embed="rId2"/>
+          <a:stretch/>
+        </p:blipFill>
+        <p:spPr>
+          <a:xfrm>
+            <a:off x="4912186" y="2524375"/>
+            <a:ext cx="301320" cy="305640"/>
+          </a:xfrm>
+          <a:prstGeom prst="rect">
+            <a:avLst/>
+          </a:prstGeom>
+          <a:ln>
+            <a:noFill/>
+          </a:ln>
+        </p:spPr>
+      </p:pic>
+      <p:pic>
+        <p:nvPicPr>
+          <p:cNvPr id="17" name="Grafik 20">
+            <a:extLst>
+              <a:ext uri="{FF2B5EF4-FFF2-40B4-BE49-F238E27FC236}">
+                <a16:creationId xmlns:a16="http://schemas.microsoft.com/office/drawing/2014/main" id="{1A9B6F76-85B4-2E4D-BBC5-FF416B0D049C}"/>
+              </a:ext>
+            </a:extLst>
+          </p:cNvPr>
+          <p:cNvPicPr/>
+          <p:nvPr/>
+        </p:nvPicPr>
+        <p:blipFill>
+          <a:blip r:embed="rId2"/>
+          <a:stretch/>
+        </p:blipFill>
+        <p:spPr>
+          <a:xfrm>
+            <a:off x="6004066" y="2524375"/>
+            <a:ext cx="301320" cy="305640"/>
+          </a:xfrm>
+          <a:prstGeom prst="rect">
+            <a:avLst/>
+          </a:prstGeom>
+          <a:ln>
+            <a:noFill/>
+          </a:ln>
+        </p:spPr>
+      </p:pic>
+      <p:pic>
+        <p:nvPicPr>
+          <p:cNvPr id="20" name="Grafik 21">
+            <a:extLst>
+              <a:ext uri="{FF2B5EF4-FFF2-40B4-BE49-F238E27FC236}">
+                <a16:creationId xmlns:a16="http://schemas.microsoft.com/office/drawing/2014/main" id="{5A5AD728-C4E7-724D-9A2C-5943D3BD0D59}"/>
+              </a:ext>
+            </a:extLst>
+          </p:cNvPr>
+          <p:cNvPicPr/>
+          <p:nvPr/>
+        </p:nvPicPr>
+        <p:blipFill>
+          <a:blip r:embed="rId2"/>
+          <a:stretch/>
+        </p:blipFill>
+        <p:spPr>
+          <a:xfrm>
+            <a:off x="7069306" y="2524375"/>
+            <a:ext cx="301320" cy="305640"/>
+          </a:xfrm>
+          <a:prstGeom prst="rect">
+            <a:avLst/>
+          </a:prstGeom>
+          <a:ln>
+            <a:noFill/>
+          </a:ln>
+        </p:spPr>
+      </p:pic>
+      <p:pic>
+        <p:nvPicPr>
+          <p:cNvPr id="26" name="Grafik 23">
+            <a:extLst>
+              <a:ext uri="{FF2B5EF4-FFF2-40B4-BE49-F238E27FC236}">
+                <a16:creationId xmlns:a16="http://schemas.microsoft.com/office/drawing/2014/main" id="{8B6CC5B2-0463-624D-A1AD-C6A4DF0CD12F}"/>
+              </a:ext>
+            </a:extLst>
+          </p:cNvPr>
+          <p:cNvPicPr/>
+          <p:nvPr/>
+        </p:nvPicPr>
+        <p:blipFill>
+          <a:blip r:embed="rId2"/>
+          <a:stretch/>
+        </p:blipFill>
+        <p:spPr>
+          <a:xfrm>
+            <a:off x="4912186" y="3421495"/>
+            <a:ext cx="301320" cy="305640"/>
+          </a:xfrm>
+          <a:prstGeom prst="rect">
+            <a:avLst/>
+          </a:prstGeom>
+          <a:ln>
+            <a:noFill/>
+          </a:ln>
+        </p:spPr>
+      </p:pic>
+      <p:pic>
+        <p:nvPicPr>
+          <p:cNvPr id="29" name="Grafik 24">
+            <a:extLst>
+              <a:ext uri="{FF2B5EF4-FFF2-40B4-BE49-F238E27FC236}">
+                <a16:creationId xmlns:a16="http://schemas.microsoft.com/office/drawing/2014/main" id="{B225D637-7A86-DD40-B874-E1A8C2681A63}"/>
+              </a:ext>
+            </a:extLst>
+          </p:cNvPr>
+          <p:cNvPicPr/>
+          <p:nvPr/>
+        </p:nvPicPr>
+        <p:blipFill>
+          <a:blip r:embed="rId2"/>
+          <a:stretch/>
+        </p:blipFill>
+        <p:spPr>
+          <a:xfrm>
+            <a:off x="6004066" y="3421495"/>
+            <a:ext cx="301320" cy="305640"/>
+          </a:xfrm>
+          <a:prstGeom prst="rect">
+            <a:avLst/>
+          </a:prstGeom>
+          <a:ln>
+            <a:noFill/>
+          </a:ln>
+        </p:spPr>
+      </p:pic>
+      <p:pic>
+        <p:nvPicPr>
+          <p:cNvPr id="32" name="Grafik 25">
+            <a:extLst>
+              <a:ext uri="{FF2B5EF4-FFF2-40B4-BE49-F238E27FC236}">
+                <a16:creationId xmlns:a16="http://schemas.microsoft.com/office/drawing/2014/main" id="{6B3DA1A7-F0E3-BB48-B085-209355991D30}"/>
+              </a:ext>
+            </a:extLst>
+          </p:cNvPr>
+          <p:cNvPicPr/>
+          <p:nvPr/>
+        </p:nvPicPr>
+        <p:blipFill>
+          <a:blip r:embed="rId2"/>
+          <a:stretch/>
+        </p:blipFill>
+        <p:spPr>
+          <a:xfrm>
+            <a:off x="7069306" y="3421495"/>
+            <a:ext cx="301320" cy="305640"/>
+          </a:xfrm>
+          <a:prstGeom prst="rect">
+            <a:avLst/>
+          </a:prstGeom>
+          <a:ln>
+            <a:noFill/>
+          </a:ln>
+        </p:spPr>
+      </p:pic>
+      <p:grpSp>
+        <p:nvGrpSpPr>
+          <p:cNvPr id="33" name="Group 11">
+            <a:extLst>
+              <a:ext uri="{FF2B5EF4-FFF2-40B4-BE49-F238E27FC236}">
+                <a16:creationId xmlns:a16="http://schemas.microsoft.com/office/drawing/2014/main" id="{980BF236-E267-7642-B851-6E4E3BB715E6}"/>
+              </a:ext>
+            </a:extLst>
+          </p:cNvPr>
+          <p:cNvGrpSpPr/>
+          <p:nvPr/>
+        </p:nvGrpSpPr>
+        <p:grpSpPr>
+          <a:xfrm>
+            <a:off x="8098186" y="3017575"/>
+            <a:ext cx="955080" cy="1100880"/>
+            <a:chOff x="6448680" y="5043600"/>
+            <a:chExt cx="955080" cy="1100880"/>
+          </a:xfrm>
+        </p:grpSpPr>
+        <p:pic>
+          <p:nvPicPr>
+            <p:cNvPr id="34" name="Grafik 16">
+              <a:extLst>
+                <a:ext uri="{FF2B5EF4-FFF2-40B4-BE49-F238E27FC236}">
+                  <a16:creationId xmlns:a16="http://schemas.microsoft.com/office/drawing/2014/main" id="{819383D5-2F61-4744-8735-580D9F8A43CD}"/>
+                </a:ext>
+              </a:extLst>
+            </p:cNvPr>
+            <p:cNvPicPr/>
+            <p:nvPr/>
+          </p:nvPicPr>
+          <p:blipFill>
+            <a:blip r:embed="rId3"/>
+            <a:stretch/>
+          </p:blipFill>
+          <p:spPr>
+            <a:xfrm>
+              <a:off x="6448680" y="5257080"/>
+              <a:ext cx="955080" cy="598680"/>
+            </a:xfrm>
+            <a:prstGeom prst="rect">
+              <a:avLst/>
+            </a:prstGeom>
+            <a:ln>
+              <a:noFill/>
+            </a:ln>
+          </p:spPr>
+        </p:pic>
+        <p:sp>
+          <p:nvSpPr>
+            <p:cNvPr id="35" name="CustomShape 12">
+              <a:extLst>
+                <a:ext uri="{FF2B5EF4-FFF2-40B4-BE49-F238E27FC236}">
+                  <a16:creationId xmlns:a16="http://schemas.microsoft.com/office/drawing/2014/main" id="{F2D3540C-4482-BF41-AA33-B3C974DC1DBD}"/>
+                </a:ext>
+              </a:extLst>
+            </p:cNvPr>
+            <p:cNvSpPr/>
+            <p:nvPr/>
+          </p:nvSpPr>
+          <p:spPr>
+            <a:xfrm>
+              <a:off x="6577920" y="5810760"/>
+              <a:ext cx="696240" cy="333720"/>
+            </a:xfrm>
+            <a:prstGeom prst="rect">
+              <a:avLst/>
+            </a:prstGeom>
+            <a:noFill/>
+            <a:ln>
+              <a:noFill/>
+            </a:ln>
+          </p:spPr>
+          <p:style>
+            <a:lnRef idx="0">
+              <a:scrgbClr r="0" g="0" b="0"/>
+            </a:lnRef>
+            <a:fillRef idx="0">
+              <a:scrgbClr r="0" g="0" b="0"/>
+            </a:fillRef>
+            <a:effectRef idx="0">
+              <a:scrgbClr r="0" g="0" b="0"/>
+            </a:effectRef>
+            <a:fontRef idx="minor"/>
+          </p:style>
+          <p:txBody>
+            <a:bodyPr lIns="90000" tIns="45000" rIns="90000" bIns="45000">
+              <a:spAutoFit/>
+            </a:bodyPr>
+            <a:lstStyle/>
+            <a:p>
+              <a:pPr>
+                <a:lnSpc>
+                  <a:spcPct val="100000"/>
+                </a:lnSpc>
+              </a:pPr>
+              <a:r>
+                <a:rPr lang="en-US" sz="1600" b="0" strike="noStrike" spc="-1">
+                  <a:solidFill>
+                    <a:srgbClr val="000000"/>
+                  </a:solidFill>
+                  <a:latin typeface="Arial"/>
+                  <a:ea typeface="DejaVu Sans"/>
+                </a:rPr>
+                <a:t>GUI</a:t>
+              </a:r>
+              <a:endParaRPr lang="en-US" sz="1600" b="0" strike="noStrike" spc="-1">
+                <a:latin typeface="Nimbus Sans"/>
+              </a:endParaRPr>
+            </a:p>
+          </p:txBody>
+        </p:sp>
+        <p:pic>
+          <p:nvPicPr>
+            <p:cNvPr id="36" name="Grafik 26">
+              <a:extLst>
+                <a:ext uri="{FF2B5EF4-FFF2-40B4-BE49-F238E27FC236}">
+                  <a16:creationId xmlns:a16="http://schemas.microsoft.com/office/drawing/2014/main" id="{68667C20-AAA8-9C4F-B467-AF4DFE25F563}"/>
+                </a:ext>
+              </a:extLst>
+            </p:cNvPr>
+            <p:cNvPicPr/>
+            <p:nvPr/>
+          </p:nvPicPr>
+          <p:blipFill>
+            <a:blip r:embed="rId2"/>
+            <a:stretch/>
+          </p:blipFill>
+          <p:spPr>
+            <a:xfrm>
+              <a:off x="6509520" y="5043600"/>
+              <a:ext cx="301320" cy="305640"/>
+            </a:xfrm>
+            <a:prstGeom prst="rect">
+              <a:avLst/>
+            </a:prstGeom>
+            <a:ln>
+              <a:noFill/>
+            </a:ln>
+          </p:spPr>
+        </p:pic>
+      </p:grpSp>
+      <p:sp>
+        <p:nvSpPr>
+          <p:cNvPr id="37" name="CustomShape 13">
+            <a:extLst>
+              <a:ext uri="{FF2B5EF4-FFF2-40B4-BE49-F238E27FC236}">
+                <a16:creationId xmlns:a16="http://schemas.microsoft.com/office/drawing/2014/main" id="{90305D87-3D85-3D44-BCF7-A1912D41BE4E}"/>
+              </a:ext>
+            </a:extLst>
+          </p:cNvPr>
+          <p:cNvSpPr/>
+          <p:nvPr/>
+        </p:nvSpPr>
+        <p:spPr>
+          <a:xfrm flipV="1">
+            <a:off x="4166266" y="2634895"/>
+            <a:ext cx="640800" cy="374760"/>
+          </a:xfrm>
+          <a:custGeom>
+            <a:avLst/>
+            <a:gdLst/>
+            <a:ahLst/>
+            <a:cxnLst/>
+            <a:rect l="l" t="t" r="r" b="b"/>
+            <a:pathLst>
+              <a:path w="21600" h="21600">
+                <a:moveTo>
+                  <a:pt x="0" y="0"/>
+                </a:moveTo>
+                <a:lnTo>
+                  <a:pt x="21600" y="21600"/>
+                </a:lnTo>
+              </a:path>
+            </a:pathLst>
+          </a:custGeom>
+          <a:noFill/>
+          <a:ln>
+            <a:solidFill>
+              <a:srgbClr val="00508F">
+                <a:alpha val="50000"/>
+              </a:srgbClr>
+            </a:solidFill>
+            <a:round/>
+            <a:headEnd type="triangle" w="med" len="med"/>
+            <a:tailEnd type="triangle" w="med" len="med"/>
+          </a:ln>
+        </p:spPr>
+        <p:style>
+          <a:lnRef idx="1">
+            <a:schemeClr val="accent1"/>
+          </a:lnRef>
+          <a:fillRef idx="0">
+            <a:schemeClr val="accent1"/>
+          </a:fillRef>
+          <a:effectRef idx="0">
+            <a:schemeClr val="accent1"/>
+          </a:effectRef>
+          <a:fontRef idx="minor"/>
+        </p:style>
+      </p:sp>
+      <p:sp>
+        <p:nvSpPr>
+          <p:cNvPr id="38" name="CustomShape 14">
+            <a:extLst>
+              <a:ext uri="{FF2B5EF4-FFF2-40B4-BE49-F238E27FC236}">
+                <a16:creationId xmlns:a16="http://schemas.microsoft.com/office/drawing/2014/main" id="{EEDF1C0F-1420-A242-A343-44970341DC45}"/>
+              </a:ext>
+            </a:extLst>
+          </p:cNvPr>
+          <p:cNvSpPr/>
+          <p:nvPr/>
+        </p:nvSpPr>
+        <p:spPr>
+          <a:xfrm>
+            <a:off x="4166266" y="3321081"/>
+            <a:ext cx="553320" cy="303813"/>
+          </a:xfrm>
+          <a:custGeom>
+            <a:avLst/>
+            <a:gdLst/>
+            <a:ahLst/>
+            <a:cxnLst/>
+            <a:rect l="l" t="t" r="r" b="b"/>
+            <a:pathLst>
+              <a:path w="21600" h="21600">
+                <a:moveTo>
+                  <a:pt x="0" y="0"/>
+                </a:moveTo>
+                <a:lnTo>
+                  <a:pt x="21600" y="21600"/>
+                </a:lnTo>
+              </a:path>
+            </a:pathLst>
+          </a:custGeom>
+          <a:noFill/>
+          <a:ln>
+            <a:solidFill>
+              <a:srgbClr val="00508F">
+                <a:alpha val="49000"/>
+              </a:srgbClr>
+            </a:solidFill>
+            <a:round/>
+            <a:headEnd type="triangle" w="med" len="med"/>
+            <a:tailEnd type="triangle" w="med" len="med"/>
+          </a:ln>
+        </p:spPr>
+        <p:style>
+          <a:lnRef idx="1">
+            <a:schemeClr val="accent1"/>
+          </a:lnRef>
+          <a:fillRef idx="0">
+            <a:schemeClr val="accent1"/>
+          </a:fillRef>
+          <a:effectRef idx="0">
+            <a:schemeClr val="accent1"/>
+          </a:effectRef>
+          <a:fontRef idx="minor"/>
+        </p:style>
+      </p:sp>
+      <p:sp>
+        <p:nvSpPr>
+          <p:cNvPr id="40" name="CustomShape 16">
+            <a:extLst>
+              <a:ext uri="{FF2B5EF4-FFF2-40B4-BE49-F238E27FC236}">
+                <a16:creationId xmlns:a16="http://schemas.microsoft.com/office/drawing/2014/main" id="{6937CDCF-8A80-1945-ADC7-4A878B1E4DD0}"/>
+              </a:ext>
+            </a:extLst>
+          </p:cNvPr>
+          <p:cNvSpPr/>
+          <p:nvPr/>
+        </p:nvSpPr>
+        <p:spPr>
+          <a:xfrm>
+            <a:off x="5299546" y="2629855"/>
+            <a:ext cx="600480" cy="360"/>
+          </a:xfrm>
+          <a:custGeom>
+            <a:avLst/>
+            <a:gdLst/>
+            <a:ahLst/>
+            <a:cxnLst/>
+            <a:rect l="l" t="t" r="r" b="b"/>
+            <a:pathLst>
+              <a:path w="21600" h="21600">
+                <a:moveTo>
+                  <a:pt x="0" y="0"/>
+                </a:moveTo>
+                <a:lnTo>
+                  <a:pt x="21600" y="21600"/>
+                </a:lnTo>
+              </a:path>
+            </a:pathLst>
+          </a:custGeom>
+          <a:noFill/>
+          <a:ln>
+            <a:solidFill>
+              <a:schemeClr val="accent1">
+                <a:shade val="95000"/>
+                <a:satMod val="105000"/>
+                <a:alpha val="46000"/>
+              </a:schemeClr>
+            </a:solidFill>
+            <a:round/>
+            <a:headEnd type="triangle" w="med" len="med"/>
+            <a:tailEnd type="triangle" w="med" len="med"/>
+          </a:ln>
+        </p:spPr>
+        <p:style>
+          <a:lnRef idx="1">
+            <a:schemeClr val="accent1"/>
+          </a:lnRef>
+          <a:fillRef idx="0">
+            <a:schemeClr val="accent1"/>
+          </a:fillRef>
+          <a:effectRef idx="0">
+            <a:schemeClr val="accent1"/>
+          </a:effectRef>
+          <a:fontRef idx="minor"/>
+        </p:style>
+      </p:sp>
+      <p:sp>
+        <p:nvSpPr>
+          <p:cNvPr id="41" name="CustomShape 17">
+            <a:extLst>
+              <a:ext uri="{FF2B5EF4-FFF2-40B4-BE49-F238E27FC236}">
+                <a16:creationId xmlns:a16="http://schemas.microsoft.com/office/drawing/2014/main" id="{CDC7A4EB-44AA-7045-A056-F7146CEDDF55}"/>
+              </a:ext>
+            </a:extLst>
+          </p:cNvPr>
+          <p:cNvSpPr/>
+          <p:nvPr/>
+        </p:nvSpPr>
+        <p:spPr>
+          <a:xfrm>
+            <a:off x="6388186" y="2638855"/>
+            <a:ext cx="600480" cy="360"/>
+          </a:xfrm>
+          <a:custGeom>
+            <a:avLst/>
+            <a:gdLst/>
+            <a:ahLst/>
+            <a:cxnLst/>
+            <a:rect l="l" t="t" r="r" b="b"/>
+            <a:pathLst>
+              <a:path w="21600" h="21600">
+                <a:moveTo>
+                  <a:pt x="0" y="0"/>
+                </a:moveTo>
+                <a:lnTo>
+                  <a:pt x="21600" y="21600"/>
+                </a:lnTo>
+              </a:path>
+            </a:pathLst>
+          </a:custGeom>
+          <a:noFill/>
+          <a:ln>
+            <a:solidFill>
+              <a:schemeClr val="accent1">
+                <a:shade val="95000"/>
+                <a:satMod val="105000"/>
+                <a:alpha val="50000"/>
+              </a:schemeClr>
+            </a:solidFill>
+            <a:round/>
+            <a:headEnd type="triangle" w="med" len="med"/>
+            <a:tailEnd type="triangle" w="med" len="med"/>
+          </a:ln>
+        </p:spPr>
+        <p:style>
+          <a:lnRef idx="1">
+            <a:schemeClr val="accent1"/>
+          </a:lnRef>
+          <a:fillRef idx="0">
+            <a:schemeClr val="accent1"/>
+          </a:fillRef>
+          <a:effectRef idx="0">
+            <a:schemeClr val="accent1"/>
+          </a:effectRef>
+          <a:fontRef idx="minor"/>
+        </p:style>
+      </p:sp>
+      <p:sp>
+        <p:nvSpPr>
+          <p:cNvPr id="42" name="CustomShape 18">
+            <a:extLst>
+              <a:ext uri="{FF2B5EF4-FFF2-40B4-BE49-F238E27FC236}">
+                <a16:creationId xmlns:a16="http://schemas.microsoft.com/office/drawing/2014/main" id="{EC9D45C8-D522-2C4C-9AFA-27EDE4B22E77}"/>
+              </a:ext>
+            </a:extLst>
+          </p:cNvPr>
+          <p:cNvSpPr/>
+          <p:nvPr/>
+        </p:nvSpPr>
+        <p:spPr>
+          <a:xfrm>
+            <a:off x="7440826" y="2728855"/>
+            <a:ext cx="657000" cy="280800"/>
+          </a:xfrm>
+          <a:custGeom>
+            <a:avLst/>
+            <a:gdLst/>
+            <a:ahLst/>
+            <a:cxnLst/>
+            <a:rect l="l" t="t" r="r" b="b"/>
+            <a:pathLst>
+              <a:path w="21600" h="21600">
+                <a:moveTo>
+                  <a:pt x="0" y="0"/>
+                </a:moveTo>
+                <a:lnTo>
+                  <a:pt x="21600" y="21600"/>
+                </a:lnTo>
+              </a:path>
+            </a:pathLst>
+          </a:custGeom>
+          <a:noFill/>
+          <a:ln>
+            <a:solidFill>
+              <a:schemeClr val="accent1">
+                <a:shade val="95000"/>
+                <a:satMod val="105000"/>
+                <a:alpha val="50000"/>
+              </a:schemeClr>
+            </a:solidFill>
+            <a:round/>
+            <a:headEnd type="triangle" w="med" len="med"/>
+            <a:tailEnd type="triangle" w="med" len="med"/>
+          </a:ln>
+        </p:spPr>
+        <p:style>
+          <a:lnRef idx="1">
+            <a:schemeClr val="accent1"/>
+          </a:lnRef>
+          <a:fillRef idx="0">
+            <a:schemeClr val="accent1"/>
+          </a:fillRef>
+          <a:effectRef idx="0">
+            <a:schemeClr val="accent1"/>
+          </a:effectRef>
+          <a:fontRef idx="minor"/>
+        </p:style>
+      </p:sp>
+      <p:sp>
+        <p:nvSpPr>
+          <p:cNvPr id="43" name="CustomShape 19">
+            <a:extLst>
+              <a:ext uri="{FF2B5EF4-FFF2-40B4-BE49-F238E27FC236}">
+                <a16:creationId xmlns:a16="http://schemas.microsoft.com/office/drawing/2014/main" id="{3BF78A39-F1F7-A84E-8799-A5B1D14DEC8A}"/>
+              </a:ext>
+            </a:extLst>
+          </p:cNvPr>
+          <p:cNvSpPr/>
+          <p:nvPr/>
+        </p:nvSpPr>
+        <p:spPr>
+          <a:xfrm flipV="1">
+            <a:off x="7440826" y="3222775"/>
+            <a:ext cx="657000" cy="247320"/>
+          </a:xfrm>
+          <a:custGeom>
+            <a:avLst/>
+            <a:gdLst/>
+            <a:ahLst/>
+            <a:cxnLst/>
+            <a:rect l="l" t="t" r="r" b="b"/>
+            <a:pathLst>
+              <a:path w="21600" h="21600">
+                <a:moveTo>
+                  <a:pt x="0" y="0"/>
+                </a:moveTo>
+                <a:lnTo>
+                  <a:pt x="21600" y="21600"/>
+                </a:lnTo>
+              </a:path>
+            </a:pathLst>
+          </a:custGeom>
+          <a:noFill/>
+          <a:ln>
+            <a:solidFill>
+              <a:schemeClr val="accent1">
+                <a:shade val="95000"/>
+                <a:satMod val="105000"/>
+                <a:alpha val="50000"/>
+              </a:schemeClr>
+            </a:solidFill>
+            <a:round/>
+            <a:headEnd type="triangle" w="med" len="med"/>
+            <a:tailEnd type="triangle" w="med" len="med"/>
+          </a:ln>
+        </p:spPr>
+        <p:style>
+          <a:lnRef idx="1">
+            <a:schemeClr val="accent1"/>
+          </a:lnRef>
+          <a:fillRef idx="0">
+            <a:schemeClr val="accent1"/>
+          </a:fillRef>
+          <a:effectRef idx="0">
+            <a:schemeClr val="accent1"/>
+          </a:effectRef>
+          <a:fontRef idx="minor"/>
+        </p:style>
+      </p:sp>
+      <p:sp>
+        <p:nvSpPr>
+          <p:cNvPr id="44" name="CustomShape 20">
+            <a:extLst>
+              <a:ext uri="{FF2B5EF4-FFF2-40B4-BE49-F238E27FC236}">
+                <a16:creationId xmlns:a16="http://schemas.microsoft.com/office/drawing/2014/main" id="{49A59331-B708-314C-BDB4-4A28F70AD214}"/>
+              </a:ext>
+            </a:extLst>
+          </p:cNvPr>
+          <p:cNvSpPr/>
+          <p:nvPr/>
+        </p:nvSpPr>
+        <p:spPr>
+          <a:xfrm>
+            <a:off x="6375226" y="3531295"/>
+            <a:ext cx="600480" cy="360"/>
+          </a:xfrm>
+          <a:custGeom>
+            <a:avLst/>
+            <a:gdLst/>
+            <a:ahLst/>
+            <a:cxnLst/>
+            <a:rect l="l" t="t" r="r" b="b"/>
+            <a:pathLst>
+              <a:path w="21600" h="21600">
+                <a:moveTo>
+                  <a:pt x="0" y="0"/>
+                </a:moveTo>
+                <a:lnTo>
+                  <a:pt x="21600" y="21600"/>
+                </a:lnTo>
+              </a:path>
+            </a:pathLst>
+          </a:custGeom>
+          <a:noFill/>
+          <a:ln>
+            <a:solidFill>
+              <a:schemeClr val="accent1">
+                <a:shade val="95000"/>
+                <a:satMod val="105000"/>
+                <a:alpha val="50000"/>
+              </a:schemeClr>
+            </a:solidFill>
+            <a:round/>
+            <a:headEnd type="triangle" w="med" len="med"/>
+            <a:tailEnd type="triangle" w="med" len="med"/>
+          </a:ln>
+        </p:spPr>
+        <p:style>
+          <a:lnRef idx="1">
+            <a:schemeClr val="accent1"/>
+          </a:lnRef>
+          <a:fillRef idx="0">
+            <a:schemeClr val="accent1"/>
+          </a:fillRef>
+          <a:effectRef idx="0">
+            <a:schemeClr val="accent1"/>
+          </a:effectRef>
+          <a:fontRef idx="minor"/>
+        </p:style>
+      </p:sp>
+      <p:sp>
+        <p:nvSpPr>
+          <p:cNvPr id="45" name="CustomShape 21">
+            <a:extLst>
+              <a:ext uri="{FF2B5EF4-FFF2-40B4-BE49-F238E27FC236}">
+                <a16:creationId xmlns:a16="http://schemas.microsoft.com/office/drawing/2014/main" id="{43CFEBAA-3F4A-2447-961C-8CE363D3A575}"/>
+              </a:ext>
+            </a:extLst>
+          </p:cNvPr>
+          <p:cNvSpPr/>
+          <p:nvPr/>
+        </p:nvSpPr>
+        <p:spPr>
+          <a:xfrm>
+            <a:off x="5290906" y="3535615"/>
+            <a:ext cx="600480" cy="360"/>
+          </a:xfrm>
+          <a:custGeom>
+            <a:avLst/>
+            <a:gdLst/>
+            <a:ahLst/>
+            <a:cxnLst/>
+            <a:rect l="l" t="t" r="r" b="b"/>
+            <a:pathLst>
+              <a:path w="21600" h="21600">
+                <a:moveTo>
+                  <a:pt x="0" y="0"/>
+                </a:moveTo>
+                <a:lnTo>
+                  <a:pt x="21600" y="21600"/>
+                </a:lnTo>
+              </a:path>
+            </a:pathLst>
+          </a:custGeom>
+          <a:noFill/>
+          <a:ln>
+            <a:solidFill>
+              <a:schemeClr val="accent1">
+                <a:shade val="95000"/>
+                <a:satMod val="105000"/>
+                <a:alpha val="50000"/>
+              </a:schemeClr>
+            </a:solidFill>
+            <a:round/>
+            <a:headEnd type="triangle" w="med" len="med"/>
+            <a:tailEnd type="triangle" w="med" len="med"/>
+          </a:ln>
+        </p:spPr>
+        <p:style>
+          <a:lnRef idx="1">
+            <a:schemeClr val="accent1"/>
+          </a:lnRef>
+          <a:fillRef idx="0">
+            <a:schemeClr val="accent1"/>
+          </a:fillRef>
+          <a:effectRef idx="0">
+            <a:schemeClr val="accent1"/>
+          </a:effectRef>
+          <a:fontRef idx="minor"/>
+        </p:style>
+      </p:sp>
+      <p:sp>
+        <p:nvSpPr>
+          <p:cNvPr id="46" name="CustomShape 22">
+            <a:extLst>
+              <a:ext uri="{FF2B5EF4-FFF2-40B4-BE49-F238E27FC236}">
+                <a16:creationId xmlns:a16="http://schemas.microsoft.com/office/drawing/2014/main" id="{C1DD6449-CDE6-A941-881A-96477E2D7AAA}"/>
+              </a:ext>
+            </a:extLst>
+          </p:cNvPr>
+          <p:cNvSpPr/>
+          <p:nvPr/>
+        </p:nvSpPr>
+        <p:spPr>
+          <a:xfrm>
+            <a:off x="5117656" y="2895895"/>
+            <a:ext cx="360" cy="511560"/>
+          </a:xfrm>
+          <a:custGeom>
+            <a:avLst/>
+            <a:gdLst/>
+            <a:ahLst/>
+            <a:cxnLst/>
+            <a:rect l="l" t="t" r="r" b="b"/>
+            <a:pathLst>
+              <a:path w="21600" h="21600">
+                <a:moveTo>
+                  <a:pt x="0" y="0"/>
+                </a:moveTo>
+                <a:lnTo>
+                  <a:pt x="21600" y="21600"/>
+                </a:lnTo>
+              </a:path>
+            </a:pathLst>
+          </a:custGeom>
+          <a:noFill/>
+          <a:ln>
+            <a:solidFill>
+              <a:schemeClr val="accent1">
+                <a:shade val="95000"/>
+                <a:satMod val="105000"/>
+                <a:alpha val="50000"/>
+              </a:schemeClr>
+            </a:solidFill>
+            <a:round/>
+            <a:headEnd type="triangle" w="med" len="med"/>
+            <a:tailEnd type="triangle" w="med" len="med"/>
+          </a:ln>
+        </p:spPr>
+        <p:style>
+          <a:lnRef idx="1">
+            <a:schemeClr val="accent1"/>
+          </a:lnRef>
+          <a:fillRef idx="0">
+            <a:schemeClr val="accent1"/>
+          </a:fillRef>
+          <a:effectRef idx="0">
+            <a:schemeClr val="accent1"/>
+          </a:effectRef>
+          <a:fontRef idx="minor"/>
+        </p:style>
+      </p:sp>
+      <p:sp>
+        <p:nvSpPr>
+          <p:cNvPr id="47" name="CustomShape 23">
+            <a:extLst>
+              <a:ext uri="{FF2B5EF4-FFF2-40B4-BE49-F238E27FC236}">
+                <a16:creationId xmlns:a16="http://schemas.microsoft.com/office/drawing/2014/main" id="{134C4724-B363-C04C-9B2F-6A17433E3911}"/>
+              </a:ext>
+            </a:extLst>
+          </p:cNvPr>
+          <p:cNvSpPr/>
+          <p:nvPr/>
+        </p:nvSpPr>
+        <p:spPr>
+          <a:xfrm>
+            <a:off x="6196108" y="2891575"/>
+            <a:ext cx="360" cy="511560"/>
+          </a:xfrm>
+          <a:custGeom>
+            <a:avLst/>
+            <a:gdLst/>
+            <a:ahLst/>
+            <a:cxnLst/>
+            <a:rect l="l" t="t" r="r" b="b"/>
+            <a:pathLst>
+              <a:path w="21600" h="21600">
+                <a:moveTo>
+                  <a:pt x="0" y="0"/>
+                </a:moveTo>
+                <a:lnTo>
+                  <a:pt x="21600" y="21600"/>
+                </a:lnTo>
+              </a:path>
+            </a:pathLst>
+          </a:custGeom>
+          <a:noFill/>
+          <a:ln>
+            <a:solidFill>
+              <a:schemeClr val="accent1">
+                <a:shade val="95000"/>
+                <a:satMod val="105000"/>
+                <a:alpha val="50000"/>
+              </a:schemeClr>
+            </a:solidFill>
+            <a:round/>
+            <a:headEnd type="triangle" w="med" len="med"/>
+            <a:tailEnd type="triangle" w="med" len="med"/>
+          </a:ln>
+        </p:spPr>
+        <p:style>
+          <a:lnRef idx="1">
+            <a:schemeClr val="accent1"/>
+          </a:lnRef>
+          <a:fillRef idx="0">
+            <a:schemeClr val="accent1"/>
+          </a:fillRef>
+          <a:effectRef idx="0">
+            <a:schemeClr val="accent1"/>
+          </a:effectRef>
+          <a:fontRef idx="minor"/>
+        </p:style>
+      </p:sp>
+      <p:sp>
+        <p:nvSpPr>
+          <p:cNvPr id="48" name="CustomShape 24">
+            <a:extLst>
+              <a:ext uri="{FF2B5EF4-FFF2-40B4-BE49-F238E27FC236}">
+                <a16:creationId xmlns:a16="http://schemas.microsoft.com/office/drawing/2014/main" id="{505AC71F-8C55-744D-B3F4-322A7474C721}"/>
+              </a:ext>
+            </a:extLst>
+          </p:cNvPr>
+          <p:cNvSpPr/>
+          <p:nvPr/>
+        </p:nvSpPr>
+        <p:spPr>
+          <a:xfrm>
+            <a:off x="7280230" y="2895895"/>
+            <a:ext cx="360" cy="511560"/>
+          </a:xfrm>
+          <a:custGeom>
+            <a:avLst/>
+            <a:gdLst/>
+            <a:ahLst/>
+            <a:cxnLst/>
+            <a:rect l="l" t="t" r="r" b="b"/>
+            <a:pathLst>
+              <a:path w="21600" h="21600">
+                <a:moveTo>
+                  <a:pt x="0" y="0"/>
+                </a:moveTo>
+                <a:lnTo>
+                  <a:pt x="21600" y="21600"/>
+                </a:lnTo>
+              </a:path>
+            </a:pathLst>
+          </a:custGeom>
+          <a:noFill/>
+          <a:ln>
+            <a:solidFill>
+              <a:schemeClr val="accent1">
+                <a:shade val="95000"/>
+                <a:satMod val="105000"/>
+                <a:alpha val="50000"/>
+              </a:schemeClr>
+            </a:solidFill>
+            <a:round/>
+            <a:headEnd type="triangle" w="med" len="med"/>
+            <a:tailEnd type="triangle" w="med" len="med"/>
+          </a:ln>
+        </p:spPr>
+        <p:style>
+          <a:lnRef idx="1">
+            <a:schemeClr val="accent1"/>
+          </a:lnRef>
+          <a:fillRef idx="0">
+            <a:schemeClr val="accent1"/>
+          </a:fillRef>
+          <a:effectRef idx="0">
+            <a:schemeClr val="accent1"/>
+          </a:effectRef>
+          <a:fontRef idx="minor"/>
+        </p:style>
+      </p:sp>
+      <p:pic>
+        <p:nvPicPr>
+          <p:cNvPr id="50" name="Grafik 38">
+            <a:extLst>
+              <a:ext uri="{FF2B5EF4-FFF2-40B4-BE49-F238E27FC236}">
+                <a16:creationId xmlns:a16="http://schemas.microsoft.com/office/drawing/2014/main" id="{A648B406-533E-344D-A33E-E258DCB56A12}"/>
+              </a:ext>
+            </a:extLst>
+          </p:cNvPr>
+          <p:cNvPicPr/>
+          <p:nvPr/>
+        </p:nvPicPr>
+        <p:blipFill>
+          <a:blip r:embed="rId4"/>
+          <a:stretch/>
+        </p:blipFill>
+        <p:spPr>
+          <a:xfrm>
+            <a:off x="8548877" y="2803057"/>
+            <a:ext cx="628560" cy="628560"/>
+          </a:xfrm>
+          <a:prstGeom prst="rect">
+            <a:avLst/>
+          </a:prstGeom>
+          <a:ln>
+            <a:noFill/>
+          </a:ln>
+        </p:spPr>
+      </p:pic>
+      <p:sp>
+        <p:nvSpPr>
+          <p:cNvPr id="61" name="Parallelogramm 60">
+            <a:extLst>
+              <a:ext uri="{FF2B5EF4-FFF2-40B4-BE49-F238E27FC236}">
+                <a16:creationId xmlns:a16="http://schemas.microsoft.com/office/drawing/2014/main" id="{09AF3AC2-10D7-6A47-B7AD-2AFCB1B252CB}"/>
+              </a:ext>
+            </a:extLst>
+          </p:cNvPr>
+          <p:cNvSpPr/>
+          <p:nvPr/>
+        </p:nvSpPr>
+        <p:spPr>
+          <a:xfrm>
+            <a:off x="3548358" y="3362400"/>
+            <a:ext cx="426600" cy="549798"/>
+          </a:xfrm>
+          <a:prstGeom prst="parallelogram">
+            <a:avLst/>
+          </a:prstGeom>
+        </p:spPr>
+        <p:style>
+          <a:lnRef idx="2">
+            <a:schemeClr val="accent1">
+              <a:shade val="50000"/>
+            </a:schemeClr>
+          </a:lnRef>
+          <a:fillRef idx="1">
+            <a:schemeClr val="accent1"/>
+          </a:fillRef>
+          <a:effectRef idx="0">
+            <a:schemeClr val="accent1"/>
+          </a:effectRef>
+          <a:fontRef idx="minor">
+            <a:schemeClr val="lt1"/>
+          </a:fontRef>
+        </p:style>
+        <p:txBody>
+          <a:bodyPr rtlCol="0" anchor="ctr"/>
+          <a:lstStyle/>
+          <a:p>
+            <a:pPr algn="ctr"/>
+            <a:endParaRPr lang="de-DE"/>
+          </a:p>
+        </p:txBody>
+      </p:sp>
+      <p:sp>
+        <p:nvSpPr>
+          <p:cNvPr id="62" name="Parallelogramm 61">
+            <a:extLst>
+              <a:ext uri="{FF2B5EF4-FFF2-40B4-BE49-F238E27FC236}">
+                <a16:creationId xmlns:a16="http://schemas.microsoft.com/office/drawing/2014/main" id="{5277A186-8FB7-B144-A41F-CC35521163AD}"/>
+              </a:ext>
+            </a:extLst>
+          </p:cNvPr>
+          <p:cNvSpPr/>
+          <p:nvPr/>
+        </p:nvSpPr>
+        <p:spPr>
+          <a:xfrm>
+            <a:off x="4633186" y="3750075"/>
+            <a:ext cx="426600" cy="549798"/>
+          </a:xfrm>
+          <a:prstGeom prst="parallelogram">
+            <a:avLst/>
+          </a:prstGeom>
+        </p:spPr>
+        <p:style>
+          <a:lnRef idx="2">
+            <a:schemeClr val="accent1">
+              <a:shade val="50000"/>
+            </a:schemeClr>
+          </a:lnRef>
+          <a:fillRef idx="1">
+            <a:schemeClr val="accent1"/>
+          </a:fillRef>
+          <a:effectRef idx="0">
+            <a:schemeClr val="accent1"/>
+          </a:effectRef>
+          <a:fontRef idx="minor">
+            <a:schemeClr val="lt1"/>
+          </a:fontRef>
+        </p:style>
+        <p:txBody>
+          <a:bodyPr rtlCol="0" anchor="ctr"/>
+          <a:lstStyle/>
+          <a:p>
+            <a:pPr algn="ctr"/>
+            <a:endParaRPr lang="de-DE"/>
+          </a:p>
+        </p:txBody>
+      </p:sp>
+      <p:sp>
+        <p:nvSpPr>
+          <p:cNvPr id="63" name="Parallelogramm 62">
+            <a:extLst>
+              <a:ext uri="{FF2B5EF4-FFF2-40B4-BE49-F238E27FC236}">
+                <a16:creationId xmlns:a16="http://schemas.microsoft.com/office/drawing/2014/main" id="{35EF4523-A152-B54F-A128-CFEAD7BC573E}"/>
+              </a:ext>
+            </a:extLst>
+          </p:cNvPr>
+          <p:cNvSpPr/>
+          <p:nvPr/>
+        </p:nvSpPr>
+        <p:spPr>
+          <a:xfrm>
+            <a:off x="4627609" y="2840178"/>
+            <a:ext cx="426600" cy="549798"/>
+          </a:xfrm>
+          <a:prstGeom prst="parallelogram">
+            <a:avLst/>
+          </a:prstGeom>
+        </p:spPr>
+        <p:style>
+          <a:lnRef idx="2">
+            <a:schemeClr val="accent1">
+              <a:shade val="50000"/>
+            </a:schemeClr>
+          </a:lnRef>
+          <a:fillRef idx="1">
+            <a:schemeClr val="accent1"/>
+          </a:fillRef>
+          <a:effectRef idx="0">
+            <a:schemeClr val="accent1"/>
+          </a:effectRef>
+          <a:fontRef idx="minor">
+            <a:schemeClr val="lt1"/>
+          </a:fontRef>
+        </p:style>
+        <p:txBody>
+          <a:bodyPr rtlCol="0" anchor="ctr"/>
+          <a:lstStyle/>
+          <a:p>
+            <a:pPr algn="ctr"/>
+            <a:endParaRPr lang="de-DE"/>
+          </a:p>
+        </p:txBody>
+      </p:sp>
+      <p:sp>
+        <p:nvSpPr>
+          <p:cNvPr id="64" name="Parallelogramm 63">
+            <a:extLst>
+              <a:ext uri="{FF2B5EF4-FFF2-40B4-BE49-F238E27FC236}">
+                <a16:creationId xmlns:a16="http://schemas.microsoft.com/office/drawing/2014/main" id="{F9362068-CA0D-2A46-94B3-BB158EBEA912}"/>
+              </a:ext>
+            </a:extLst>
+          </p:cNvPr>
+          <p:cNvSpPr/>
+          <p:nvPr/>
+        </p:nvSpPr>
+        <p:spPr>
+          <a:xfrm>
+            <a:off x="5723344" y="2842107"/>
+            <a:ext cx="426600" cy="549798"/>
+          </a:xfrm>
+          <a:prstGeom prst="parallelogram">
+            <a:avLst/>
+          </a:prstGeom>
+        </p:spPr>
+        <p:style>
+          <a:lnRef idx="2">
+            <a:schemeClr val="accent1">
+              <a:shade val="50000"/>
+            </a:schemeClr>
+          </a:lnRef>
+          <a:fillRef idx="1">
+            <a:schemeClr val="accent1"/>
+          </a:fillRef>
+          <a:effectRef idx="0">
+            <a:schemeClr val="accent1"/>
+          </a:effectRef>
+          <a:fontRef idx="minor">
+            <a:schemeClr val="lt1"/>
+          </a:fontRef>
+        </p:style>
+        <p:txBody>
+          <a:bodyPr rtlCol="0" anchor="ctr"/>
+          <a:lstStyle/>
+          <a:p>
+            <a:pPr algn="ctr"/>
+            <a:endParaRPr lang="de-DE"/>
+          </a:p>
+        </p:txBody>
+      </p:sp>
+      <p:sp>
+        <p:nvSpPr>
+          <p:cNvPr id="65" name="Parallelogramm 64">
+            <a:extLst>
+              <a:ext uri="{FF2B5EF4-FFF2-40B4-BE49-F238E27FC236}">
+                <a16:creationId xmlns:a16="http://schemas.microsoft.com/office/drawing/2014/main" id="{EE50694F-AE36-0145-B558-894835C6757E}"/>
+              </a:ext>
+            </a:extLst>
+          </p:cNvPr>
+          <p:cNvSpPr/>
+          <p:nvPr/>
+        </p:nvSpPr>
+        <p:spPr>
+          <a:xfrm>
+            <a:off x="5723128" y="3752006"/>
+            <a:ext cx="426600" cy="549798"/>
+          </a:xfrm>
+          <a:prstGeom prst="parallelogram">
+            <a:avLst/>
+          </a:prstGeom>
+        </p:spPr>
+        <p:style>
+          <a:lnRef idx="2">
+            <a:schemeClr val="accent1">
+              <a:shade val="50000"/>
+            </a:schemeClr>
+          </a:lnRef>
+          <a:fillRef idx="1">
+            <a:schemeClr val="accent1"/>
+          </a:fillRef>
+          <a:effectRef idx="0">
+            <a:schemeClr val="accent1"/>
+          </a:effectRef>
+          <a:fontRef idx="minor">
+            <a:schemeClr val="lt1"/>
+          </a:fontRef>
+        </p:style>
+        <p:txBody>
+          <a:bodyPr rtlCol="0" anchor="ctr"/>
+          <a:lstStyle/>
+          <a:p>
+            <a:pPr algn="ctr"/>
+            <a:endParaRPr lang="de-DE"/>
+          </a:p>
+        </p:txBody>
+      </p:sp>
+      <p:sp>
+        <p:nvSpPr>
+          <p:cNvPr id="66" name="Parallelogramm 65">
+            <a:extLst>
+              <a:ext uri="{FF2B5EF4-FFF2-40B4-BE49-F238E27FC236}">
+                <a16:creationId xmlns:a16="http://schemas.microsoft.com/office/drawing/2014/main" id="{59C732B8-427A-2E4E-B9A2-62CE570B4900}"/>
+              </a:ext>
+            </a:extLst>
+          </p:cNvPr>
+          <p:cNvSpPr/>
+          <p:nvPr/>
+        </p:nvSpPr>
+        <p:spPr>
+          <a:xfrm>
+            <a:off x="6789921" y="3748150"/>
+            <a:ext cx="426600" cy="549798"/>
+          </a:xfrm>
+          <a:prstGeom prst="parallelogram">
+            <a:avLst/>
+          </a:prstGeom>
+        </p:spPr>
+        <p:style>
+          <a:lnRef idx="2">
+            <a:schemeClr val="accent1">
+              <a:shade val="50000"/>
+            </a:schemeClr>
+          </a:lnRef>
+          <a:fillRef idx="1">
+            <a:schemeClr val="accent1"/>
+          </a:fillRef>
+          <a:effectRef idx="0">
+            <a:schemeClr val="accent1"/>
+          </a:effectRef>
+          <a:fontRef idx="minor">
+            <a:schemeClr val="lt1"/>
+          </a:fontRef>
+        </p:style>
+        <p:txBody>
+          <a:bodyPr rtlCol="0" anchor="ctr"/>
+          <a:lstStyle/>
+          <a:p>
+            <a:pPr algn="ctr"/>
+            <a:endParaRPr lang="de-DE"/>
+          </a:p>
+        </p:txBody>
+      </p:sp>
+      <p:sp>
+        <p:nvSpPr>
+          <p:cNvPr id="67" name="Parallelogramm 66">
+            <a:extLst>
+              <a:ext uri="{FF2B5EF4-FFF2-40B4-BE49-F238E27FC236}">
+                <a16:creationId xmlns:a16="http://schemas.microsoft.com/office/drawing/2014/main" id="{30D015AE-4112-2C41-9B01-CD3FD552C64A}"/>
+              </a:ext>
+            </a:extLst>
+          </p:cNvPr>
+          <p:cNvSpPr/>
+          <p:nvPr/>
+        </p:nvSpPr>
+        <p:spPr>
+          <a:xfrm>
+            <a:off x="6791853" y="2841476"/>
+            <a:ext cx="426600" cy="549798"/>
+          </a:xfrm>
+          <a:prstGeom prst="parallelogram">
+            <a:avLst/>
+          </a:prstGeom>
+        </p:spPr>
+        <p:style>
+          <a:lnRef idx="2">
+            <a:schemeClr val="accent1">
+              <a:shade val="50000"/>
+            </a:schemeClr>
+          </a:lnRef>
+          <a:fillRef idx="1">
+            <a:schemeClr val="accent1"/>
+          </a:fillRef>
+          <a:effectRef idx="0">
+            <a:schemeClr val="accent1"/>
+          </a:effectRef>
+          <a:fontRef idx="minor">
+            <a:schemeClr val="lt1"/>
+          </a:fontRef>
+        </p:style>
+        <p:txBody>
+          <a:bodyPr rtlCol="0" anchor="ctr"/>
+          <a:lstStyle/>
+          <a:p>
+            <a:pPr algn="ctr"/>
+            <a:endParaRPr lang="de-DE"/>
+          </a:p>
+        </p:txBody>
+      </p:sp>
+      <p:sp>
+        <p:nvSpPr>
+          <p:cNvPr id="68" name="Pfeil nach oben und unten 67">
+            <a:extLst>
+              <a:ext uri="{FF2B5EF4-FFF2-40B4-BE49-F238E27FC236}">
+                <a16:creationId xmlns:a16="http://schemas.microsoft.com/office/drawing/2014/main" id="{0DB67AE5-A5FF-6B41-903D-92B34587C8F4}"/>
+              </a:ext>
+            </a:extLst>
+          </p:cNvPr>
+          <p:cNvSpPr/>
+          <p:nvPr/>
+        </p:nvSpPr>
+        <p:spPr>
+          <a:xfrm rot="667511">
+            <a:off x="4754868" y="2921438"/>
+            <a:ext cx="156258" cy="388512"/>
+          </a:xfrm>
+          <a:prstGeom prst="upDownArrow">
+            <a:avLst/>
+          </a:prstGeom>
+          <a:ln w="15875"/>
+        </p:spPr>
+        <p:style>
+          <a:lnRef idx="3">
+            <a:schemeClr val="lt1"/>
+          </a:lnRef>
+          <a:fillRef idx="1">
+            <a:schemeClr val="accent3"/>
+          </a:fillRef>
+          <a:effectRef idx="1">
+            <a:schemeClr val="accent3"/>
+          </a:effectRef>
+          <a:fontRef idx="minor">
+            <a:schemeClr val="lt1"/>
+          </a:fontRef>
+        </p:style>
+        <p:txBody>
+          <a:bodyPr rtlCol="0" anchor="ctr"/>
+          <a:lstStyle/>
+          <a:p>
+            <a:pPr algn="ctr"/>
+            <a:endParaRPr lang="de-DE"/>
+          </a:p>
+        </p:txBody>
+      </p:sp>
+      <p:sp>
+        <p:nvSpPr>
+          <p:cNvPr id="69" name="Pfeil nach oben und unten 68">
+            <a:extLst>
+              <a:ext uri="{FF2B5EF4-FFF2-40B4-BE49-F238E27FC236}">
+                <a16:creationId xmlns:a16="http://schemas.microsoft.com/office/drawing/2014/main" id="{F1ECB380-C8BC-D245-8893-15FD4B538C86}"/>
+              </a:ext>
+            </a:extLst>
+          </p:cNvPr>
+          <p:cNvSpPr/>
+          <p:nvPr/>
+        </p:nvSpPr>
+        <p:spPr>
+          <a:xfrm rot="667511">
+            <a:off x="5862172" y="2929154"/>
+            <a:ext cx="156258" cy="388512"/>
+          </a:xfrm>
+          <a:prstGeom prst="upDownArrow">
+            <a:avLst/>
+          </a:prstGeom>
+          <a:ln w="15875"/>
+        </p:spPr>
+        <p:style>
+          <a:lnRef idx="3">
+            <a:schemeClr val="lt1"/>
+          </a:lnRef>
+          <a:fillRef idx="1">
+            <a:schemeClr val="accent3"/>
+          </a:fillRef>
+          <a:effectRef idx="1">
+            <a:schemeClr val="accent3"/>
+          </a:effectRef>
+          <a:fontRef idx="minor">
+            <a:schemeClr val="lt1"/>
+          </a:fontRef>
+        </p:style>
+        <p:txBody>
+          <a:bodyPr rtlCol="0" anchor="ctr"/>
+          <a:lstStyle/>
+          <a:p>
+            <a:pPr algn="ctr"/>
+            <a:endParaRPr lang="de-DE"/>
+          </a:p>
+        </p:txBody>
+      </p:sp>
+      <p:sp>
+        <p:nvSpPr>
+          <p:cNvPr id="70" name="Pfeil nach oben und unten 69">
+            <a:extLst>
+              <a:ext uri="{FF2B5EF4-FFF2-40B4-BE49-F238E27FC236}">
+                <a16:creationId xmlns:a16="http://schemas.microsoft.com/office/drawing/2014/main" id="{468529BF-B0FF-5B47-AF50-33FF277FC293}"/>
+              </a:ext>
+            </a:extLst>
+          </p:cNvPr>
+          <p:cNvSpPr/>
+          <p:nvPr/>
+        </p:nvSpPr>
+        <p:spPr>
+          <a:xfrm rot="667511">
+            <a:off x="6928965" y="2925300"/>
+            <a:ext cx="156258" cy="388512"/>
+          </a:xfrm>
+          <a:prstGeom prst="upDownArrow">
+            <a:avLst/>
+          </a:prstGeom>
+          <a:ln w="15875"/>
+        </p:spPr>
+        <p:style>
+          <a:lnRef idx="3">
+            <a:schemeClr val="lt1"/>
+          </a:lnRef>
+          <a:fillRef idx="1">
+            <a:schemeClr val="accent3"/>
+          </a:fillRef>
+          <a:effectRef idx="1">
+            <a:schemeClr val="accent3"/>
+          </a:effectRef>
+          <a:fontRef idx="minor">
+            <a:schemeClr val="lt1"/>
+          </a:fontRef>
+        </p:style>
+        <p:txBody>
+          <a:bodyPr rtlCol="0" anchor="ctr"/>
+          <a:lstStyle/>
+          <a:p>
+            <a:pPr algn="ctr"/>
+            <a:endParaRPr lang="de-DE"/>
+          </a:p>
+        </p:txBody>
+      </p:sp>
+      <p:sp>
+        <p:nvSpPr>
+          <p:cNvPr id="71" name="Pfeil nach oben und unten 70">
+            <a:extLst>
+              <a:ext uri="{FF2B5EF4-FFF2-40B4-BE49-F238E27FC236}">
+                <a16:creationId xmlns:a16="http://schemas.microsoft.com/office/drawing/2014/main" id="{15D4AA40-01DA-6648-AA54-CD2154D58558}"/>
+              </a:ext>
+            </a:extLst>
+          </p:cNvPr>
+          <p:cNvSpPr/>
+          <p:nvPr/>
+        </p:nvSpPr>
+        <p:spPr>
+          <a:xfrm rot="667511">
+            <a:off x="3683530" y="3443042"/>
+            <a:ext cx="156258" cy="388512"/>
+          </a:xfrm>
+          <a:prstGeom prst="upDownArrow">
+            <a:avLst/>
+          </a:prstGeom>
+          <a:ln w="15875"/>
+        </p:spPr>
+        <p:style>
+          <a:lnRef idx="3">
+            <a:schemeClr val="lt1"/>
+          </a:lnRef>
+          <a:fillRef idx="1">
+            <a:schemeClr val="accent3"/>
+          </a:fillRef>
+          <a:effectRef idx="1">
+            <a:schemeClr val="accent3"/>
+          </a:effectRef>
+          <a:fontRef idx="minor">
+            <a:schemeClr val="lt1"/>
+          </a:fontRef>
+        </p:style>
+        <p:txBody>
+          <a:bodyPr rtlCol="0" anchor="ctr"/>
+          <a:lstStyle/>
+          <a:p>
+            <a:pPr algn="ctr"/>
+            <a:endParaRPr lang="de-DE"/>
+          </a:p>
+        </p:txBody>
+      </p:sp>
+    </p:spTree>
+    <p:extLst>
+      <p:ext uri="{BB962C8B-B14F-4D97-AF65-F5344CB8AC3E}">
+        <p14:creationId xmlns:p14="http://schemas.microsoft.com/office/powerpoint/2010/main" val="567535412"/>
+      </p:ext>
+    </p:extLst>
+  </p:cSld>
+  <p:clrMapOvr>
+    <a:masterClrMapping/>
+  </p:clrMapOvr>
 </p:sld>
 </file>
 
@@ -3246,34 +5313,34 @@
         <a:sysClr val="window" lastClr="FFFFFF"/>
       </a:lt1>
       <a:dk2>
-        <a:srgbClr val="44546a"/>
+        <a:srgbClr val="44546A"/>
       </a:dk2>
       <a:lt2>
-        <a:srgbClr val="e7e6e6"/>
+        <a:srgbClr val="E7E6E6"/>
       </a:lt2>
       <a:accent1>
-        <a:srgbClr val="4472c4"/>
+        <a:srgbClr val="4472C4"/>
       </a:accent1>
       <a:accent2>
-        <a:srgbClr val="ed7d31"/>
+        <a:srgbClr val="ED7D31"/>
       </a:accent2>
       <a:accent3>
-        <a:srgbClr val="a5a5a5"/>
+        <a:srgbClr val="A5A5A5"/>
       </a:accent3>
       <a:accent4>
-        <a:srgbClr val="ffc000"/>
+        <a:srgbClr val="FFC000"/>
       </a:accent4>
       <a:accent5>
-        <a:srgbClr val="5b9bd5"/>
+        <a:srgbClr val="5B9BD5"/>
       </a:accent5>
       <a:accent6>
-        <a:srgbClr val="70ad47"/>
+        <a:srgbClr val="70AD47"/>
       </a:accent6>
       <a:hlink>
-        <a:srgbClr val="0563c1"/>
+        <a:srgbClr val="0563C1"/>
       </a:hlink>
       <a:folHlink>
-        <a:srgbClr val="954f72"/>
+        <a:srgbClr val="954F72"/>
       </a:folHlink>
     </a:clrScheme>
     <a:fontScheme name="Office">
@@ -3455,5 +5522,7 @@
       </a:bgFillStyleLst>
     </a:fmtScheme>
   </a:themeElements>
+  <a:objectDefaults/>
+  <a:extraClrSchemeLst/>
 </a:theme>
 </file>
</xml_diff>

<commit_message>
"Information about the Zolertia Remote"
</commit_message>
<xml_diff>
--- a/report/PPT/Application_Flow_Graph.pptx
+++ b/report/PPT/Application_Flow_Graph.pptx
@@ -7,6 +7,7 @@
   <p:sldIdLst>
     <p:sldId id="256" r:id="rId2"/>
     <p:sldId id="257" r:id="rId3"/>
+    <p:sldId id="258" r:id="rId4"/>
   </p:sldIdLst>
   <p:sldSz cx="12192000" cy="6858000"/>
   <p:notesSz cx="7772400" cy="10058400"/>
@@ -105,6 +106,11 @@
       </a:defRPr>
     </a:lvl9pPr>
   </p:defaultTextStyle>
+  <p:extLst>
+    <p:ext uri="{EFAFB233-063F-42B5-8137-9DF3F51BA10A}">
+      <p15:sldGuideLst xmlns:p15="http://schemas.microsoft.com/office/powerpoint/2012/main"/>
+    </p:ext>
+  </p:extLst>
 </p:presentation>
 </file>
 
@@ -5323,6 +5329,188 @@
 </p:sld>
 </file>
 
+<file path=ppt/slides/slide3.xml><?xml version="1.0" encoding="utf-8"?>
+<p:sld xmlns:a="http://schemas.openxmlformats.org/drawingml/2006/main" xmlns:r="http://schemas.openxmlformats.org/officeDocument/2006/relationships" xmlns:p="http://schemas.openxmlformats.org/presentationml/2006/main">
+  <p:cSld>
+    <p:spTree>
+      <p:nvGrpSpPr>
+        <p:cNvPr id="1" name=""/>
+        <p:cNvGrpSpPr/>
+        <p:nvPr/>
+      </p:nvGrpSpPr>
+      <p:grpSpPr>
+        <a:xfrm>
+          <a:off x="0" y="0"/>
+          <a:ext cx="0" cy="0"/>
+          <a:chOff x="0" y="0"/>
+          <a:chExt cx="0" cy="0"/>
+        </a:xfrm>
+      </p:grpSpPr>
+      <p:sp>
+        <p:nvSpPr>
+          <p:cNvPr id="4" name="Abgerundetes Rechteck 3">
+            <a:extLst>
+              <a:ext uri="{FF2B5EF4-FFF2-40B4-BE49-F238E27FC236}">
+                <a16:creationId xmlns:a16="http://schemas.microsoft.com/office/drawing/2014/main" id="{90C5623A-963E-1A4E-8EBD-28F4C8EFEBD9}"/>
+              </a:ext>
+            </a:extLst>
+          </p:cNvPr>
+          <p:cNvSpPr/>
+          <p:nvPr/>
+        </p:nvSpPr>
+        <p:spPr>
+          <a:xfrm>
+            <a:off x="1371600" y="2303929"/>
+            <a:ext cx="1371600" cy="887506"/>
+          </a:xfrm>
+          <a:prstGeom prst="roundRect">
+            <a:avLst/>
+          </a:prstGeom>
+          <a:solidFill>
+            <a:schemeClr val="tx1">
+              <a:lumMod val="65000"/>
+              <a:lumOff val="35000"/>
+            </a:schemeClr>
+          </a:solidFill>
+          <a:ln>
+            <a:solidFill>
+              <a:schemeClr val="tx1"/>
+            </a:solidFill>
+          </a:ln>
+        </p:spPr>
+        <p:style>
+          <a:lnRef idx="2">
+            <a:schemeClr val="accent1">
+              <a:shade val="50000"/>
+            </a:schemeClr>
+          </a:lnRef>
+          <a:fillRef idx="1">
+            <a:schemeClr val="accent1"/>
+          </a:fillRef>
+          <a:effectRef idx="0">
+            <a:schemeClr val="accent1"/>
+          </a:effectRef>
+          <a:fontRef idx="minor">
+            <a:schemeClr val="lt1"/>
+          </a:fontRef>
+        </p:style>
+        <p:txBody>
+          <a:bodyPr rtlCol="0" anchor="ctr"/>
+          <a:lstStyle/>
+          <a:p>
+            <a:pPr algn="ctr"/>
+            <a:r>
+              <a:rPr lang="de-DE" dirty="0"/>
+              <a:t>Base Station</a:t>
+            </a:r>
+          </a:p>
+        </p:txBody>
+      </p:sp>
+      <p:sp>
+        <p:nvSpPr>
+          <p:cNvPr id="5" name="Oval 4">
+            <a:extLst>
+              <a:ext uri="{FF2B5EF4-FFF2-40B4-BE49-F238E27FC236}">
+                <a16:creationId xmlns:a16="http://schemas.microsoft.com/office/drawing/2014/main" id="{75772F01-A29A-2143-991A-49AADC53A69F}"/>
+              </a:ext>
+            </a:extLst>
+          </p:cNvPr>
+          <p:cNvSpPr/>
+          <p:nvPr/>
+        </p:nvSpPr>
+        <p:spPr>
+          <a:xfrm>
+            <a:off x="3845859" y="1775012"/>
+            <a:ext cx="1855694" cy="986117"/>
+          </a:xfrm>
+          <a:prstGeom prst="ellipse">
+            <a:avLst/>
+          </a:prstGeom>
+          <a:solidFill>
+            <a:srgbClr val="C00000">
+              <a:alpha val="50000"/>
+            </a:srgbClr>
+          </a:solidFill>
+          <a:ln>
+            <a:solidFill>
+              <a:srgbClr val="C00000"/>
+            </a:solidFill>
+          </a:ln>
+        </p:spPr>
+        <p:style>
+          <a:lnRef idx="2">
+            <a:schemeClr val="accent1">
+              <a:shade val="50000"/>
+            </a:schemeClr>
+          </a:lnRef>
+          <a:fillRef idx="1">
+            <a:schemeClr val="accent1"/>
+          </a:fillRef>
+          <a:effectRef idx="0">
+            <a:schemeClr val="accent1"/>
+          </a:effectRef>
+          <a:fontRef idx="minor">
+            <a:schemeClr val="lt1"/>
+          </a:fontRef>
+        </p:style>
+        <p:txBody>
+          <a:bodyPr rtlCol="0" anchor="ctr"/>
+          <a:lstStyle/>
+          <a:p>
+            <a:pPr algn="ctr"/>
+            <a:r>
+              <a:rPr lang="de-DE" dirty="0">
+                <a:solidFill>
+                  <a:srgbClr val="C00000"/>
+                </a:solidFill>
+              </a:rPr>
+              <a:t>Broadcast Message</a:t>
+            </a:r>
+          </a:p>
+        </p:txBody>
+      </p:sp>
+      <p:pic>
+        <p:nvPicPr>
+          <p:cNvPr id="6" name="Grafik 18">
+            <a:extLst>
+              <a:ext uri="{FF2B5EF4-FFF2-40B4-BE49-F238E27FC236}">
+                <a16:creationId xmlns:a16="http://schemas.microsoft.com/office/drawing/2014/main" id="{FDE0C7AB-455A-D049-8F14-E52079FE7C49}"/>
+              </a:ext>
+            </a:extLst>
+          </p:cNvPr>
+          <p:cNvPicPr/>
+          <p:nvPr/>
+        </p:nvPicPr>
+        <p:blipFill>
+          <a:blip r:embed="rId2"/>
+          <a:stretch/>
+        </p:blipFill>
+        <p:spPr>
+          <a:xfrm>
+            <a:off x="2441880" y="1982402"/>
+            <a:ext cx="301320" cy="305640"/>
+          </a:xfrm>
+          <a:prstGeom prst="rect">
+            <a:avLst/>
+          </a:prstGeom>
+          <a:ln>
+            <a:noFill/>
+          </a:ln>
+        </p:spPr>
+      </p:pic>
+    </p:spTree>
+    <p:extLst>
+      <p:ext uri="{BB962C8B-B14F-4D97-AF65-F5344CB8AC3E}">
+        <p14:creationId xmlns:p14="http://schemas.microsoft.com/office/powerpoint/2010/main" val="661465629"/>
+      </p:ext>
+    </p:extLst>
+  </p:cSld>
+  <p:clrMapOvr>
+    <a:masterClrMapping/>
+  </p:clrMapOvr>
+</p:sld>
+</file>
+
 <file path=ppt/theme/theme1.xml><?xml version="1.0" encoding="utf-8"?>
 <a:theme xmlns:a="http://schemas.openxmlformats.org/drawingml/2006/main" name="Office Theme">
   <a:themeElements>

</xml_diff>

<commit_message>
Integrated JM's changes in my local branch More minor changes
</commit_message>
<xml_diff>
--- a/report/PPT/Application_Flow_Graph.pptx
+++ b/report/PPT/Application_Flow_Graph.pptx
@@ -7,6 +7,7 @@
   <p:sldIdLst>
     <p:sldId id="256" r:id="rId2"/>
     <p:sldId id="257" r:id="rId3"/>
+    <p:sldId id="258" r:id="rId4"/>
   </p:sldIdLst>
   <p:sldSz cx="12192000" cy="6858000"/>
   <p:notesSz cx="7772400" cy="10058400"/>
@@ -105,6 +106,11 @@
       </a:defRPr>
     </a:lvl9pPr>
   </p:defaultTextStyle>
+  <p:extLst>
+    <p:ext uri="{EFAFB233-063F-42B5-8137-9DF3F51BA10A}">
+      <p15:sldGuideLst xmlns:p15="http://schemas.microsoft.com/office/powerpoint/2012/main"/>
+    </p:ext>
+  </p:extLst>
 </p:presentation>
 </file>
 
@@ -5323,6 +5329,188 @@
 </p:sld>
 </file>
 
+<file path=ppt/slides/slide3.xml><?xml version="1.0" encoding="utf-8"?>
+<p:sld xmlns:a="http://schemas.openxmlformats.org/drawingml/2006/main" xmlns:r="http://schemas.openxmlformats.org/officeDocument/2006/relationships" xmlns:p="http://schemas.openxmlformats.org/presentationml/2006/main">
+  <p:cSld>
+    <p:spTree>
+      <p:nvGrpSpPr>
+        <p:cNvPr id="1" name=""/>
+        <p:cNvGrpSpPr/>
+        <p:nvPr/>
+      </p:nvGrpSpPr>
+      <p:grpSpPr>
+        <a:xfrm>
+          <a:off x="0" y="0"/>
+          <a:ext cx="0" cy="0"/>
+          <a:chOff x="0" y="0"/>
+          <a:chExt cx="0" cy="0"/>
+        </a:xfrm>
+      </p:grpSpPr>
+      <p:sp>
+        <p:nvSpPr>
+          <p:cNvPr id="4" name="Abgerundetes Rechteck 3">
+            <a:extLst>
+              <a:ext uri="{FF2B5EF4-FFF2-40B4-BE49-F238E27FC236}">
+                <a16:creationId xmlns:a16="http://schemas.microsoft.com/office/drawing/2014/main" id="{90C5623A-963E-1A4E-8EBD-28F4C8EFEBD9}"/>
+              </a:ext>
+            </a:extLst>
+          </p:cNvPr>
+          <p:cNvSpPr/>
+          <p:nvPr/>
+        </p:nvSpPr>
+        <p:spPr>
+          <a:xfrm>
+            <a:off x="1371600" y="2303929"/>
+            <a:ext cx="1371600" cy="887506"/>
+          </a:xfrm>
+          <a:prstGeom prst="roundRect">
+            <a:avLst/>
+          </a:prstGeom>
+          <a:solidFill>
+            <a:schemeClr val="tx1">
+              <a:lumMod val="65000"/>
+              <a:lumOff val="35000"/>
+            </a:schemeClr>
+          </a:solidFill>
+          <a:ln>
+            <a:solidFill>
+              <a:schemeClr val="tx1"/>
+            </a:solidFill>
+          </a:ln>
+        </p:spPr>
+        <p:style>
+          <a:lnRef idx="2">
+            <a:schemeClr val="accent1">
+              <a:shade val="50000"/>
+            </a:schemeClr>
+          </a:lnRef>
+          <a:fillRef idx="1">
+            <a:schemeClr val="accent1"/>
+          </a:fillRef>
+          <a:effectRef idx="0">
+            <a:schemeClr val="accent1"/>
+          </a:effectRef>
+          <a:fontRef idx="minor">
+            <a:schemeClr val="lt1"/>
+          </a:fontRef>
+        </p:style>
+        <p:txBody>
+          <a:bodyPr rtlCol="0" anchor="ctr"/>
+          <a:lstStyle/>
+          <a:p>
+            <a:pPr algn="ctr"/>
+            <a:r>
+              <a:rPr lang="de-DE" dirty="0"/>
+              <a:t>Base Station</a:t>
+            </a:r>
+          </a:p>
+        </p:txBody>
+      </p:sp>
+      <p:sp>
+        <p:nvSpPr>
+          <p:cNvPr id="5" name="Oval 4">
+            <a:extLst>
+              <a:ext uri="{FF2B5EF4-FFF2-40B4-BE49-F238E27FC236}">
+                <a16:creationId xmlns:a16="http://schemas.microsoft.com/office/drawing/2014/main" id="{75772F01-A29A-2143-991A-49AADC53A69F}"/>
+              </a:ext>
+            </a:extLst>
+          </p:cNvPr>
+          <p:cNvSpPr/>
+          <p:nvPr/>
+        </p:nvSpPr>
+        <p:spPr>
+          <a:xfrm>
+            <a:off x="3845859" y="1775012"/>
+            <a:ext cx="1855694" cy="986117"/>
+          </a:xfrm>
+          <a:prstGeom prst="ellipse">
+            <a:avLst/>
+          </a:prstGeom>
+          <a:solidFill>
+            <a:srgbClr val="C00000">
+              <a:alpha val="50000"/>
+            </a:srgbClr>
+          </a:solidFill>
+          <a:ln>
+            <a:solidFill>
+              <a:srgbClr val="C00000"/>
+            </a:solidFill>
+          </a:ln>
+        </p:spPr>
+        <p:style>
+          <a:lnRef idx="2">
+            <a:schemeClr val="accent1">
+              <a:shade val="50000"/>
+            </a:schemeClr>
+          </a:lnRef>
+          <a:fillRef idx="1">
+            <a:schemeClr val="accent1"/>
+          </a:fillRef>
+          <a:effectRef idx="0">
+            <a:schemeClr val="accent1"/>
+          </a:effectRef>
+          <a:fontRef idx="minor">
+            <a:schemeClr val="lt1"/>
+          </a:fontRef>
+        </p:style>
+        <p:txBody>
+          <a:bodyPr rtlCol="0" anchor="ctr"/>
+          <a:lstStyle/>
+          <a:p>
+            <a:pPr algn="ctr"/>
+            <a:r>
+              <a:rPr lang="de-DE" dirty="0">
+                <a:solidFill>
+                  <a:srgbClr val="C00000"/>
+                </a:solidFill>
+              </a:rPr>
+              <a:t>Broadcast Message</a:t>
+            </a:r>
+          </a:p>
+        </p:txBody>
+      </p:sp>
+      <p:pic>
+        <p:nvPicPr>
+          <p:cNvPr id="6" name="Grafik 18">
+            <a:extLst>
+              <a:ext uri="{FF2B5EF4-FFF2-40B4-BE49-F238E27FC236}">
+                <a16:creationId xmlns:a16="http://schemas.microsoft.com/office/drawing/2014/main" id="{FDE0C7AB-455A-D049-8F14-E52079FE7C49}"/>
+              </a:ext>
+            </a:extLst>
+          </p:cNvPr>
+          <p:cNvPicPr/>
+          <p:nvPr/>
+        </p:nvPicPr>
+        <p:blipFill>
+          <a:blip r:embed="rId2"/>
+          <a:stretch/>
+        </p:blipFill>
+        <p:spPr>
+          <a:xfrm>
+            <a:off x="2441880" y="1982402"/>
+            <a:ext cx="301320" cy="305640"/>
+          </a:xfrm>
+          <a:prstGeom prst="rect">
+            <a:avLst/>
+          </a:prstGeom>
+          <a:ln>
+            <a:noFill/>
+          </a:ln>
+        </p:spPr>
+      </p:pic>
+    </p:spTree>
+    <p:extLst>
+      <p:ext uri="{BB962C8B-B14F-4D97-AF65-F5344CB8AC3E}">
+        <p14:creationId xmlns:p14="http://schemas.microsoft.com/office/powerpoint/2010/main" val="661465629"/>
+      </p:ext>
+    </p:extLst>
+  </p:cSld>
+  <p:clrMapOvr>
+    <a:masterClrMapping/>
+  </p:clrMapOvr>
+</p:sld>
+</file>
+
 <file path=ppt/theme/theme1.xml><?xml version="1.0" encoding="utf-8"?>
 <a:theme xmlns:a="http://schemas.openxmlformats.org/drawingml/2006/main" name="Office Theme">
   <a:themeElements>

</xml_diff>

<commit_message>
Updated image of the application flow graph
</commit_message>
<xml_diff>
--- a/report/PPT/Application_Flow_Graph.pptx
+++ b/report/PPT/Application_Flow_Graph.pptx
@@ -1744,7 +1744,7 @@
                 </a:solidFill>
                 <a:latin typeface="Calibri"/>
               </a:rPr>
-              <a:t>7/14/19</a:t>
+              <a:t>7/15/19</a:t>
             </a:fld>
             <a:endParaRPr lang="en-US" sz="1200" b="0" strike="noStrike" spc="-1">
               <a:latin typeface="Nimbus Roman"/>
@@ -2327,7 +2327,13 @@
       </p:grpSpPr>
       <p:grpSp>
         <p:nvGrpSpPr>
-          <p:cNvPr id="41" name="Group 1"/>
+          <p:cNvPr id="9" name="Gruppieren 8">
+            <a:extLst>
+              <a:ext uri="{FF2B5EF4-FFF2-40B4-BE49-F238E27FC236}">
+                <a16:creationId xmlns:a16="http://schemas.microsoft.com/office/drawing/2014/main" id="{F4F618B4-5944-BD43-BADD-237F550A36E4}"/>
+              </a:ext>
+            </a:extLst>
+          </p:cNvPr>
           <p:cNvGrpSpPr/>
           <p:nvPr/>
         </p:nvGrpSpPr>
@@ -2339,387 +2345,1437 @@
             <a:chExt cx="8895240" cy="6571440"/>
           </a:xfrm>
         </p:grpSpPr>
-        <p:sp>
-          <p:nvSpPr>
-            <p:cNvPr id="42" name="CustomShape 2"/>
-            <p:cNvSpPr/>
+        <p:grpSp>
+          <p:nvGrpSpPr>
+            <p:cNvPr id="41" name="Group 1"/>
+            <p:cNvGrpSpPr/>
             <p:nvPr/>
-          </p:nvSpPr>
+          </p:nvGrpSpPr>
+          <p:grpSpPr>
+            <a:xfrm>
+              <a:off x="429120" y="263520"/>
+              <a:ext cx="8895240" cy="6571440"/>
+              <a:chOff x="429120" y="263520"/>
+              <a:chExt cx="8895240" cy="6571440"/>
+            </a:xfrm>
+          </p:grpSpPr>
+          <p:sp>
+            <p:nvSpPr>
+              <p:cNvPr id="42" name="CustomShape 2"/>
+              <p:cNvSpPr/>
+              <p:nvPr/>
+            </p:nvSpPr>
+            <p:spPr>
+              <a:xfrm>
+                <a:off x="429120" y="3504600"/>
+                <a:ext cx="8895240" cy="3330360"/>
+              </a:xfrm>
+              <a:prstGeom prst="roundRect">
+                <a:avLst>
+                  <a:gd name="adj" fmla="val 16667"/>
+                </a:avLst>
+              </a:prstGeom>
+              <a:solidFill>
+                <a:srgbClr val="00B0F0">
+                  <a:alpha val="48000"/>
+                </a:srgbClr>
+              </a:solidFill>
+              <a:ln>
+                <a:noFill/>
+              </a:ln>
+            </p:spPr>
+            <p:style>
+              <a:lnRef idx="2">
+                <a:schemeClr val="accent1">
+                  <a:shade val="50000"/>
+                </a:schemeClr>
+              </a:lnRef>
+              <a:fillRef idx="1">
+                <a:schemeClr val="accent1"/>
+              </a:fillRef>
+              <a:effectRef idx="0">
+                <a:schemeClr val="accent1"/>
+              </a:effectRef>
+              <a:fontRef idx="minor"/>
+            </p:style>
+          </p:sp>
+          <p:sp>
+            <p:nvSpPr>
+              <p:cNvPr id="43" name="CustomShape 3"/>
+              <p:cNvSpPr/>
+              <p:nvPr/>
+            </p:nvSpPr>
+            <p:spPr>
+              <a:xfrm>
+                <a:off x="429120" y="1830600"/>
+                <a:ext cx="8895240" cy="1673640"/>
+              </a:xfrm>
+              <a:prstGeom prst="roundRect">
+                <a:avLst>
+                  <a:gd name="adj" fmla="val 16667"/>
+                </a:avLst>
+              </a:prstGeom>
+              <a:solidFill>
+                <a:srgbClr val="C00000">
+                  <a:alpha val="48000"/>
+                </a:srgbClr>
+              </a:solidFill>
+              <a:ln>
+                <a:noFill/>
+              </a:ln>
+            </p:spPr>
+            <p:style>
+              <a:lnRef idx="2">
+                <a:schemeClr val="accent1">
+                  <a:shade val="50000"/>
+                </a:schemeClr>
+              </a:lnRef>
+              <a:fillRef idx="1">
+                <a:schemeClr val="accent1"/>
+              </a:fillRef>
+              <a:effectRef idx="0">
+                <a:schemeClr val="accent1"/>
+              </a:effectRef>
+              <a:fontRef idx="minor"/>
+            </p:style>
+          </p:sp>
+          <p:sp>
+            <p:nvSpPr>
+              <p:cNvPr id="44" name="CustomShape 4"/>
+              <p:cNvSpPr/>
+              <p:nvPr/>
+            </p:nvSpPr>
+            <p:spPr>
+              <a:xfrm>
+                <a:off x="2166120" y="263520"/>
+                <a:ext cx="2121480" cy="1056240"/>
+              </a:xfrm>
+              <a:prstGeom prst="ellipse">
+                <a:avLst/>
+              </a:prstGeom>
+              <a:ln/>
+            </p:spPr>
+            <p:style>
+              <a:lnRef idx="2">
+                <a:schemeClr val="accent1">
+                  <a:shade val="50000"/>
+                </a:schemeClr>
+              </a:lnRef>
+              <a:fillRef idx="1">
+                <a:schemeClr val="accent1"/>
+              </a:fillRef>
+              <a:effectRef idx="0">
+                <a:schemeClr val="accent1"/>
+              </a:effectRef>
+              <a:fontRef idx="minor"/>
+            </p:style>
+            <p:txBody>
+              <a:bodyPr lIns="90000" tIns="45000" rIns="90000" bIns="45000" anchor="ctr">
+                <a:noAutofit/>
+              </a:bodyPr>
+              <a:lstStyle/>
+              <a:p>
+                <a:pPr algn="ctr">
+                  <a:lnSpc>
+                    <a:spcPct val="100000"/>
+                  </a:lnSpc>
+                </a:pPr>
+                <a:r>
+                  <a:rPr lang="en-US" sz="1800" b="0" strike="noStrike" spc="-1">
+                    <a:solidFill>
+                      <a:srgbClr val="FFFFFF"/>
+                    </a:solidFill>
+                    <a:latin typeface="Calibri"/>
+                  </a:rPr>
+                  <a:t>IDLE</a:t>
+                </a:r>
+                <a:endParaRPr lang="en-US" sz="1800" b="0" strike="noStrike" spc="-1">
+                  <a:latin typeface="Nimbus Sans"/>
+                </a:endParaRPr>
+              </a:p>
+            </p:txBody>
+          </p:sp>
+          <p:sp>
+            <p:nvSpPr>
+              <p:cNvPr id="45" name="CustomShape 5"/>
+              <p:cNvSpPr/>
+              <p:nvPr/>
+            </p:nvSpPr>
+            <p:spPr>
+              <a:xfrm>
+                <a:off x="2167560" y="2203200"/>
+                <a:ext cx="2121480" cy="1056240"/>
+              </a:xfrm>
+              <a:prstGeom prst="ellipse">
+                <a:avLst/>
+              </a:prstGeom>
+              <a:ln/>
+            </p:spPr>
+            <p:style>
+              <a:lnRef idx="2">
+                <a:schemeClr val="accent1">
+                  <a:shade val="50000"/>
+                </a:schemeClr>
+              </a:lnRef>
+              <a:fillRef idx="1">
+                <a:schemeClr val="accent1"/>
+              </a:fillRef>
+              <a:effectRef idx="0">
+                <a:schemeClr val="accent1"/>
+              </a:effectRef>
+              <a:fontRef idx="minor"/>
+            </p:style>
+            <p:txBody>
+              <a:bodyPr lIns="90000" tIns="45000" rIns="90000" bIns="45000" anchor="ctr">
+                <a:noAutofit/>
+              </a:bodyPr>
+              <a:lstStyle/>
+              <a:p>
+                <a:pPr algn="ctr">
+                  <a:lnSpc>
+                    <a:spcPct val="100000"/>
+                  </a:lnSpc>
+                </a:pPr>
+                <a:r>
+                  <a:rPr lang="en-US" sz="1800" b="0" strike="noStrike" spc="-1">
+                    <a:solidFill>
+                      <a:srgbClr val="FFFFFF"/>
+                    </a:solidFill>
+                    <a:latin typeface="Calibri"/>
+                  </a:rPr>
+                  <a:t>NETWORK DISCOVERY</a:t>
+                </a:r>
+                <a:endParaRPr lang="en-US" sz="1800" b="0" strike="noStrike" spc="-1">
+                  <a:latin typeface="Nimbus Sans"/>
+                </a:endParaRPr>
+              </a:p>
+            </p:txBody>
+          </p:sp>
+          <p:sp>
+            <p:nvSpPr>
+              <p:cNvPr id="46" name="CustomShape 6"/>
+              <p:cNvSpPr/>
+              <p:nvPr/>
+            </p:nvSpPr>
+            <p:spPr>
+              <a:xfrm>
+                <a:off x="2166120" y="3713760"/>
+                <a:ext cx="2121480" cy="1056240"/>
+              </a:xfrm>
+              <a:prstGeom prst="ellipse">
+                <a:avLst/>
+              </a:prstGeom>
+              <a:ln/>
+            </p:spPr>
+            <p:style>
+              <a:lnRef idx="2">
+                <a:schemeClr val="accent1">
+                  <a:shade val="50000"/>
+                </a:schemeClr>
+              </a:lnRef>
+              <a:fillRef idx="1">
+                <a:schemeClr val="accent1"/>
+              </a:fillRef>
+              <a:effectRef idx="0">
+                <a:schemeClr val="accent1"/>
+              </a:effectRef>
+              <a:fontRef idx="minor"/>
+            </p:style>
+            <p:txBody>
+              <a:bodyPr lIns="90000" tIns="45000" rIns="90000" bIns="45000" anchor="ctr">
+                <a:noAutofit/>
+              </a:bodyPr>
+              <a:lstStyle/>
+              <a:p>
+                <a:pPr algn="ctr">
+                  <a:lnSpc>
+                    <a:spcPct val="100000"/>
+                  </a:lnSpc>
+                </a:pPr>
+                <a:r>
+                  <a:rPr lang="en-US" sz="1800" b="0" strike="noStrike" spc="-1">
+                    <a:solidFill>
+                      <a:srgbClr val="FFFFFF"/>
+                    </a:solidFill>
+                    <a:latin typeface="Calibri"/>
+                  </a:rPr>
+                  <a:t>PATHMODE</a:t>
+                </a:r>
+                <a:endParaRPr lang="en-US" sz="1800" b="0" strike="noStrike" spc="-1">
+                  <a:latin typeface="Nimbus Sans"/>
+                </a:endParaRPr>
+              </a:p>
+            </p:txBody>
+          </p:sp>
+          <p:sp>
+            <p:nvSpPr>
+              <p:cNvPr id="47" name="CustomShape 7"/>
+              <p:cNvSpPr/>
+              <p:nvPr/>
+            </p:nvSpPr>
+            <p:spPr>
+              <a:xfrm>
+                <a:off x="2166120" y="5224680"/>
+                <a:ext cx="2121480" cy="1056240"/>
+              </a:xfrm>
+              <a:prstGeom prst="ellipse">
+                <a:avLst/>
+              </a:prstGeom>
+              <a:ln/>
+            </p:spPr>
+            <p:style>
+              <a:lnRef idx="2">
+                <a:schemeClr val="accent1">
+                  <a:shade val="50000"/>
+                </a:schemeClr>
+              </a:lnRef>
+              <a:fillRef idx="1">
+                <a:schemeClr val="accent1"/>
+              </a:fillRef>
+              <a:effectRef idx="0">
+                <a:schemeClr val="accent1"/>
+              </a:effectRef>
+              <a:fontRef idx="minor"/>
+            </p:style>
+            <p:txBody>
+              <a:bodyPr lIns="90000" tIns="45000" rIns="90000" bIns="45000" anchor="ctr">
+                <a:noAutofit/>
+              </a:bodyPr>
+              <a:lstStyle/>
+              <a:p>
+                <a:pPr algn="ctr">
+                  <a:lnSpc>
+                    <a:spcPct val="100000"/>
+                  </a:lnSpc>
+                </a:pPr>
+                <a:r>
+                  <a:rPr lang="en-US" sz="1800" b="0" strike="noStrike" spc="-1">
+                    <a:solidFill>
+                      <a:srgbClr val="FFFFFF"/>
+                    </a:solidFill>
+                    <a:latin typeface="Calibri"/>
+                  </a:rPr>
+                  <a:t>UNICAST MODE</a:t>
+                </a:r>
+                <a:endParaRPr lang="en-US" sz="1800" b="0" strike="noStrike" spc="-1">
+                  <a:latin typeface="Nimbus Sans"/>
+                </a:endParaRPr>
+              </a:p>
+            </p:txBody>
+          </p:sp>
+          <p:sp>
+            <p:nvSpPr>
+              <p:cNvPr id="48" name="CustomShape 8"/>
+              <p:cNvSpPr/>
+              <p:nvPr/>
+            </p:nvSpPr>
+            <p:spPr>
+              <a:xfrm>
+                <a:off x="6162480" y="2203200"/>
+                <a:ext cx="2121480" cy="1056240"/>
+              </a:xfrm>
+              <a:prstGeom prst="ellipse">
+                <a:avLst/>
+              </a:prstGeom>
+              <a:ln/>
+            </p:spPr>
+            <p:style>
+              <a:lnRef idx="2">
+                <a:schemeClr val="accent1">
+                  <a:shade val="50000"/>
+                </a:schemeClr>
+              </a:lnRef>
+              <a:fillRef idx="1">
+                <a:schemeClr val="accent1"/>
+              </a:fillRef>
+              <a:effectRef idx="0">
+                <a:schemeClr val="accent1"/>
+              </a:effectRef>
+              <a:fontRef idx="minor"/>
+            </p:style>
+            <p:txBody>
+              <a:bodyPr lIns="90000" tIns="45000" rIns="90000" bIns="45000" anchor="ctr">
+                <a:noAutofit/>
+              </a:bodyPr>
+              <a:lstStyle/>
+              <a:p>
+                <a:pPr algn="ctr">
+                  <a:lnSpc>
+                    <a:spcPct val="100000"/>
+                  </a:lnSpc>
+                </a:pPr>
+                <a:r>
+                  <a:rPr lang="en-US" sz="1800" b="0" strike="noStrike" spc="-1">
+                    <a:solidFill>
+                      <a:srgbClr val="FFFFFF"/>
+                    </a:solidFill>
+                    <a:latin typeface="Calibri"/>
+                  </a:rPr>
+                  <a:t>EMERGENCY</a:t>
+                </a:r>
+                <a:endParaRPr lang="en-US" sz="1800" b="0" strike="noStrike" spc="-1">
+                  <a:latin typeface="Nimbus Sans"/>
+                </a:endParaRPr>
+              </a:p>
+            </p:txBody>
+          </p:sp>
+          <p:sp>
+            <p:nvSpPr>
+              <p:cNvPr id="49" name="CustomShape 9"/>
+              <p:cNvSpPr/>
+              <p:nvPr/>
+            </p:nvSpPr>
+            <p:spPr>
+              <a:xfrm rot="5400000" flipH="1">
+                <a:off x="3603600" y="5753160"/>
+                <a:ext cx="746640" cy="12240"/>
+              </a:xfrm>
+              <a:prstGeom prst="curvedConnector5">
+                <a:avLst>
+                  <a:gd name="adj1" fmla="val -23472"/>
+                  <a:gd name="adj2" fmla="val -7242488"/>
+                  <a:gd name="adj3" fmla="val 124660"/>
+                </a:avLst>
+              </a:prstGeom>
+              <a:noFill/>
+              <a:ln w="38160">
+                <a:tailEnd type="triangle" w="med" len="med"/>
+              </a:ln>
+            </p:spPr>
+            <p:style>
+              <a:lnRef idx="1">
+                <a:schemeClr val="accent1"/>
+              </a:lnRef>
+              <a:fillRef idx="0">
+                <a:schemeClr val="accent1"/>
+              </a:fillRef>
+              <a:effectRef idx="0">
+                <a:schemeClr val="accent1"/>
+              </a:effectRef>
+              <a:fontRef idx="minor"/>
+            </p:style>
+          </p:sp>
+          <p:sp>
+            <p:nvSpPr>
+              <p:cNvPr id="50" name="CustomShape 10"/>
+              <p:cNvSpPr/>
+              <p:nvPr/>
+            </p:nvSpPr>
+            <p:spPr>
+              <a:xfrm rot="5400000" flipH="1" flipV="1">
+                <a:off x="3714840" y="2771640"/>
+                <a:ext cx="3021120" cy="3996000"/>
+              </a:xfrm>
+              <a:prstGeom prst="curvedConnector3">
+                <a:avLst>
+                  <a:gd name="adj1" fmla="val -14030"/>
+                </a:avLst>
+              </a:prstGeom>
+              <a:noFill/>
+              <a:ln w="38160">
+                <a:tailEnd type="triangle" w="med" len="med"/>
+              </a:ln>
+            </p:spPr>
+            <p:style>
+              <a:lnRef idx="1">
+                <a:schemeClr val="accent1"/>
+              </a:lnRef>
+              <a:fillRef idx="0">
+                <a:schemeClr val="accent1"/>
+              </a:fillRef>
+              <a:effectRef idx="0">
+                <a:schemeClr val="accent1"/>
+              </a:effectRef>
+              <a:fontRef idx="minor"/>
+            </p:style>
+          </p:sp>
+          <p:sp>
+            <p:nvSpPr>
+              <p:cNvPr id="51" name="CustomShape 11"/>
+              <p:cNvSpPr/>
+              <p:nvPr/>
+            </p:nvSpPr>
+            <p:spPr>
+              <a:xfrm>
+                <a:off x="3227040" y="1319760"/>
+                <a:ext cx="1080" cy="882720"/>
+              </a:xfrm>
+              <a:custGeom>
+                <a:avLst/>
+                <a:gdLst/>
+                <a:ahLst/>
+                <a:cxnLst/>
+                <a:rect l="l" t="t" r="r" b="b"/>
+                <a:pathLst>
+                  <a:path w="21600" h="21600">
+                    <a:moveTo>
+                      <a:pt x="0" y="0"/>
+                    </a:moveTo>
+                    <a:lnTo>
+                      <a:pt x="21600" y="21600"/>
+                    </a:lnTo>
+                  </a:path>
+                </a:pathLst>
+              </a:custGeom>
+              <a:noFill/>
+              <a:ln w="38160">
+                <a:solidFill>
+                  <a:schemeClr val="accent1"/>
+                </a:solidFill>
+                <a:tailEnd type="triangle" w="med" len="med"/>
+              </a:ln>
+            </p:spPr>
+            <p:style>
+              <a:lnRef idx="1">
+                <a:schemeClr val="accent1"/>
+              </a:lnRef>
+              <a:fillRef idx="0">
+                <a:schemeClr val="accent1"/>
+              </a:fillRef>
+              <a:effectRef idx="0">
+                <a:schemeClr val="accent1"/>
+              </a:effectRef>
+              <a:fontRef idx="minor"/>
+            </p:style>
+          </p:sp>
+          <p:sp>
+            <p:nvSpPr>
+              <p:cNvPr id="52" name="CustomShape 12"/>
+              <p:cNvSpPr/>
+              <p:nvPr/>
+            </p:nvSpPr>
+            <p:spPr>
+              <a:xfrm flipH="1">
+                <a:off x="3226320" y="3259440"/>
+                <a:ext cx="1080" cy="453960"/>
+              </a:xfrm>
+              <a:custGeom>
+                <a:avLst/>
+                <a:gdLst/>
+                <a:ahLst/>
+                <a:cxnLst/>
+                <a:rect l="l" t="t" r="r" b="b"/>
+                <a:pathLst>
+                  <a:path w="21600" h="21600">
+                    <a:moveTo>
+                      <a:pt x="0" y="0"/>
+                    </a:moveTo>
+                    <a:lnTo>
+                      <a:pt x="21600" y="21600"/>
+                    </a:lnTo>
+                  </a:path>
+                </a:pathLst>
+              </a:custGeom>
+              <a:noFill/>
+              <a:ln w="38160">
+                <a:tailEnd type="triangle" w="med" len="med"/>
+              </a:ln>
+            </p:spPr>
+            <p:style>
+              <a:lnRef idx="1">
+                <a:schemeClr val="accent1"/>
+              </a:lnRef>
+              <a:fillRef idx="0">
+                <a:schemeClr val="accent1"/>
+              </a:fillRef>
+              <a:effectRef idx="0">
+                <a:schemeClr val="accent1"/>
+              </a:effectRef>
+              <a:fontRef idx="minor"/>
+            </p:style>
+          </p:sp>
+          <p:sp>
+            <p:nvSpPr>
+              <p:cNvPr id="53" name="CustomShape 13"/>
+              <p:cNvSpPr/>
+              <p:nvPr/>
+            </p:nvSpPr>
+            <p:spPr>
+              <a:xfrm>
+                <a:off x="3227040" y="4770360"/>
+                <a:ext cx="360" cy="453960"/>
+              </a:xfrm>
+              <a:custGeom>
+                <a:avLst/>
+                <a:gdLst/>
+                <a:ahLst/>
+                <a:cxnLst/>
+                <a:rect l="l" t="t" r="r" b="b"/>
+                <a:pathLst>
+                  <a:path w="21600" h="21600">
+                    <a:moveTo>
+                      <a:pt x="0" y="0"/>
+                    </a:moveTo>
+                    <a:lnTo>
+                      <a:pt x="21600" y="21600"/>
+                    </a:lnTo>
+                  </a:path>
+                </a:pathLst>
+              </a:custGeom>
+              <a:noFill/>
+              <a:ln w="38160">
+                <a:tailEnd type="triangle" w="med" len="med"/>
+              </a:ln>
+            </p:spPr>
+            <p:style>
+              <a:lnRef idx="1">
+                <a:schemeClr val="accent1"/>
+              </a:lnRef>
+              <a:fillRef idx="0">
+                <a:schemeClr val="accent1"/>
+              </a:fillRef>
+              <a:effectRef idx="0">
+                <a:schemeClr val="accent1"/>
+              </a:effectRef>
+              <a:fontRef idx="minor"/>
+            </p:style>
+          </p:sp>
+          <p:sp>
+            <p:nvSpPr>
+              <p:cNvPr id="54" name="CustomShape 14"/>
+              <p:cNvSpPr/>
+              <p:nvPr/>
+            </p:nvSpPr>
+            <p:spPr>
+              <a:xfrm rot="10800000">
+                <a:off x="3227400" y="1976040"/>
+                <a:ext cx="3996000" cy="226800"/>
+              </a:xfrm>
+              <a:prstGeom prst="bentConnector3">
+                <a:avLst>
+                  <a:gd name="adj1" fmla="val -648"/>
+                </a:avLst>
+              </a:prstGeom>
+              <a:noFill/>
+              <a:ln w="38160">
+                <a:tailEnd type="triangle" w="med" len="med"/>
+              </a:ln>
+            </p:spPr>
+            <p:style>
+              <a:lnRef idx="1">
+                <a:schemeClr val="accent1"/>
+              </a:lnRef>
+              <a:fillRef idx="0">
+                <a:schemeClr val="accent1"/>
+              </a:fillRef>
+              <a:effectRef idx="0">
+                <a:schemeClr val="accent1"/>
+              </a:effectRef>
+              <a:fontRef idx="minor"/>
+            </p:style>
+          </p:sp>
+          <p:sp>
+            <p:nvSpPr>
+              <p:cNvPr id="55" name="CustomShape 15"/>
+              <p:cNvSpPr/>
+              <p:nvPr/>
+            </p:nvSpPr>
+            <p:spPr>
+              <a:xfrm rot="5400000" flipH="1">
+                <a:off x="7599960" y="2731680"/>
+                <a:ext cx="746640" cy="12240"/>
+              </a:xfrm>
+              <a:prstGeom prst="curvedConnector5">
+                <a:avLst>
+                  <a:gd name="adj1" fmla="val -30602"/>
+                  <a:gd name="adj2" fmla="val -7077638"/>
+                  <a:gd name="adj3" fmla="val 130602"/>
+                </a:avLst>
+              </a:prstGeom>
+              <a:noFill/>
+              <a:ln w="38160">
+                <a:tailEnd type="triangle" w="med" len="med"/>
+              </a:ln>
+            </p:spPr>
+            <p:style>
+              <a:lnRef idx="1">
+                <a:schemeClr val="accent1"/>
+              </a:lnRef>
+              <a:fillRef idx="0">
+                <a:schemeClr val="accent1"/>
+              </a:fillRef>
+              <a:effectRef idx="0">
+                <a:schemeClr val="accent1"/>
+              </a:effectRef>
+              <a:fontRef idx="minor"/>
+            </p:style>
+          </p:sp>
+          <p:sp>
+            <p:nvSpPr>
+              <p:cNvPr id="56" name="CustomShape 16"/>
+              <p:cNvSpPr/>
+              <p:nvPr/>
+            </p:nvSpPr>
+            <p:spPr>
+              <a:xfrm>
+                <a:off x="1546560" y="767520"/>
+                <a:ext cx="619200" cy="360"/>
+              </a:xfrm>
+              <a:custGeom>
+                <a:avLst/>
+                <a:gdLst/>
+                <a:ahLst/>
+                <a:cxnLst/>
+                <a:rect l="l" t="t" r="r" b="b"/>
+                <a:pathLst>
+                  <a:path w="21600" h="21600">
+                    <a:moveTo>
+                      <a:pt x="0" y="0"/>
+                    </a:moveTo>
+                    <a:lnTo>
+                      <a:pt x="21600" y="21600"/>
+                    </a:lnTo>
+                  </a:path>
+                </a:pathLst>
+              </a:custGeom>
+              <a:noFill/>
+              <a:ln w="38160">
+                <a:tailEnd type="triangle" w="med" len="med"/>
+              </a:ln>
+            </p:spPr>
+            <p:style>
+              <a:lnRef idx="1">
+                <a:schemeClr val="accent1"/>
+              </a:lnRef>
+              <a:fillRef idx="0">
+                <a:schemeClr val="accent1"/>
+              </a:fillRef>
+              <a:effectRef idx="0">
+                <a:schemeClr val="accent1"/>
+              </a:effectRef>
+              <a:fontRef idx="minor"/>
+            </p:style>
+          </p:sp>
+          <p:sp>
+            <p:nvSpPr>
+              <p:cNvPr id="57" name="CustomShape 17"/>
+              <p:cNvSpPr/>
+              <p:nvPr/>
+            </p:nvSpPr>
+            <p:spPr>
+              <a:xfrm>
+                <a:off x="485640" y="594360"/>
+                <a:ext cx="1060560" cy="638280"/>
+              </a:xfrm>
+              <a:prstGeom prst="rect">
+                <a:avLst/>
+              </a:prstGeom>
+              <a:noFill/>
+              <a:ln>
+                <a:noFill/>
+              </a:ln>
+            </p:spPr>
+            <p:style>
+              <a:lnRef idx="0">
+                <a:scrgbClr r="0" g="0" b="0"/>
+              </a:lnRef>
+              <a:fillRef idx="0">
+                <a:scrgbClr r="0" g="0" b="0"/>
+              </a:fillRef>
+              <a:effectRef idx="0">
+                <a:scrgbClr r="0" g="0" b="0"/>
+              </a:effectRef>
+              <a:fontRef idx="minor"/>
+            </p:style>
+            <p:txBody>
+              <a:bodyPr lIns="90000" tIns="45000" rIns="90000" bIns="45000">
+                <a:spAutoFit/>
+              </a:bodyPr>
+              <a:lstStyle/>
+              <a:p>
+                <a:pPr>
+                  <a:lnSpc>
+                    <a:spcPct val="100000"/>
+                  </a:lnSpc>
+                </a:pPr>
+                <a:r>
+                  <a:rPr lang="en-US" sz="1800" b="0" strike="noStrike" spc="-1">
+                    <a:solidFill>
+                      <a:srgbClr val="000000"/>
+                    </a:solidFill>
+                    <a:latin typeface="Calibri"/>
+                  </a:rPr>
+                  <a:t>BOOT UP</a:t>
+                </a:r>
+                <a:endParaRPr lang="en-US" sz="1800" b="0" strike="noStrike" spc="-1">
+                  <a:latin typeface="Nimbus Sans"/>
+                </a:endParaRPr>
+              </a:p>
+            </p:txBody>
+          </p:sp>
+          <p:sp>
+            <p:nvSpPr>
+              <p:cNvPr id="58" name="CustomShape 18"/>
+              <p:cNvSpPr/>
+              <p:nvPr/>
+            </p:nvSpPr>
+            <p:spPr>
+              <a:xfrm rot="5400000" flipH="1">
+                <a:off x="3603600" y="792000"/>
+                <a:ext cx="746640" cy="12240"/>
+              </a:xfrm>
+              <a:prstGeom prst="curvedConnector5">
+                <a:avLst>
+                  <a:gd name="adj1" fmla="val -30602"/>
+                  <a:gd name="adj2" fmla="val -7308929"/>
+                  <a:gd name="adj3" fmla="val 130602"/>
+                </a:avLst>
+              </a:prstGeom>
+              <a:noFill/>
+              <a:ln w="38160">
+                <a:tailEnd type="triangle" w="med" len="med"/>
+              </a:ln>
+            </p:spPr>
+            <p:style>
+              <a:lnRef idx="1">
+                <a:schemeClr val="accent1"/>
+              </a:lnRef>
+              <a:fillRef idx="0">
+                <a:schemeClr val="accent1"/>
+              </a:fillRef>
+              <a:effectRef idx="0">
+                <a:schemeClr val="accent1"/>
+              </a:effectRef>
+              <a:fontRef idx="minor"/>
+            </p:style>
+          </p:sp>
+          <p:sp>
+            <p:nvSpPr>
+              <p:cNvPr id="59" name="CustomShape 19"/>
+              <p:cNvSpPr/>
+              <p:nvPr/>
+            </p:nvSpPr>
+            <p:spPr>
+              <a:xfrm>
+                <a:off x="615960" y="1893600"/>
+                <a:ext cx="1860480" cy="364680"/>
+              </a:xfrm>
+              <a:prstGeom prst="rect">
+                <a:avLst/>
+              </a:prstGeom>
+              <a:noFill/>
+              <a:ln>
+                <a:noFill/>
+              </a:ln>
+            </p:spPr>
+            <p:style>
+              <a:lnRef idx="0">
+                <a:scrgbClr r="0" g="0" b="0"/>
+              </a:lnRef>
+              <a:fillRef idx="0">
+                <a:scrgbClr r="0" g="0" b="0"/>
+              </a:fillRef>
+              <a:effectRef idx="0">
+                <a:scrgbClr r="0" g="0" b="0"/>
+              </a:effectRef>
+              <a:fontRef idx="minor"/>
+            </p:style>
+            <p:txBody>
+              <a:bodyPr lIns="90000" tIns="45000" rIns="90000" bIns="45000">
+                <a:spAutoFit/>
+              </a:bodyPr>
+              <a:lstStyle/>
+              <a:p>
+                <a:pPr>
+                  <a:lnSpc>
+                    <a:spcPct val="100000"/>
+                  </a:lnSpc>
+                </a:pPr>
+                <a:r>
+                  <a:rPr lang="en-US" sz="1800" b="1" strike="noStrike" spc="-1">
+                    <a:solidFill>
+                      <a:srgbClr val="C00000"/>
+                    </a:solidFill>
+                    <a:latin typeface="Calibri"/>
+                  </a:rPr>
+                  <a:t>Broadcast</a:t>
+                </a:r>
+                <a:endParaRPr lang="en-US" sz="1800" b="0" strike="noStrike" spc="-1">
+                  <a:latin typeface="Nimbus Sans"/>
+                </a:endParaRPr>
+              </a:p>
+            </p:txBody>
+          </p:sp>
+          <p:sp>
+            <p:nvSpPr>
+              <p:cNvPr id="60" name="CustomShape 20"/>
+              <p:cNvSpPr/>
+              <p:nvPr/>
+            </p:nvSpPr>
+            <p:spPr>
+              <a:xfrm>
+                <a:off x="632160" y="3760200"/>
+                <a:ext cx="1860480" cy="364680"/>
+              </a:xfrm>
+              <a:prstGeom prst="rect">
+                <a:avLst/>
+              </a:prstGeom>
+              <a:noFill/>
+              <a:ln>
+                <a:noFill/>
+              </a:ln>
+            </p:spPr>
+            <p:style>
+              <a:lnRef idx="0">
+                <a:scrgbClr r="0" g="0" b="0"/>
+              </a:lnRef>
+              <a:fillRef idx="0">
+                <a:scrgbClr r="0" g="0" b="0"/>
+              </a:fillRef>
+              <a:effectRef idx="0">
+                <a:scrgbClr r="0" g="0" b="0"/>
+              </a:effectRef>
+              <a:fontRef idx="minor"/>
+            </p:style>
+            <p:txBody>
+              <a:bodyPr lIns="90000" tIns="45000" rIns="90000" bIns="45000">
+                <a:spAutoFit/>
+              </a:bodyPr>
+              <a:lstStyle/>
+              <a:p>
+                <a:pPr>
+                  <a:lnSpc>
+                    <a:spcPct val="100000"/>
+                  </a:lnSpc>
+                </a:pPr>
+                <a:r>
+                  <a:rPr lang="en-US" sz="1800" b="1" strike="noStrike" spc="-1">
+                    <a:solidFill>
+                      <a:srgbClr val="002060"/>
+                    </a:solidFill>
+                    <a:latin typeface="Calibri"/>
+                  </a:rPr>
+                  <a:t>Unicast</a:t>
+                </a:r>
+                <a:endParaRPr lang="en-US" sz="1800" b="0" strike="noStrike" spc="-1">
+                  <a:latin typeface="Nimbus Sans"/>
+                </a:endParaRPr>
+              </a:p>
+            </p:txBody>
+          </p:sp>
+          <p:sp>
+            <p:nvSpPr>
+              <p:cNvPr id="61" name="CustomShape 21"/>
+              <p:cNvSpPr/>
+              <p:nvPr/>
+            </p:nvSpPr>
+            <p:spPr>
+              <a:xfrm>
+                <a:off x="2477160" y="1300320"/>
+                <a:ext cx="1400760" cy="638280"/>
+              </a:xfrm>
+              <a:prstGeom prst="rect">
+                <a:avLst/>
+              </a:prstGeom>
+              <a:noFill/>
+              <a:ln>
+                <a:noFill/>
+              </a:ln>
+            </p:spPr>
+            <p:style>
+              <a:lnRef idx="0">
+                <a:scrgbClr r="0" g="0" b="0"/>
+              </a:lnRef>
+              <a:fillRef idx="0">
+                <a:scrgbClr r="0" g="0" b="0"/>
+              </a:fillRef>
+              <a:effectRef idx="0">
+                <a:scrgbClr r="0" g="0" b="0"/>
+              </a:effectRef>
+              <a:fontRef idx="minor"/>
+            </p:style>
+            <p:txBody>
+              <a:bodyPr lIns="90000" tIns="45000" rIns="90000" bIns="45000">
+                <a:spAutoFit/>
+              </a:bodyPr>
+              <a:lstStyle/>
+              <a:p>
+                <a:pPr>
+                  <a:lnSpc>
+                    <a:spcPct val="100000"/>
+                  </a:lnSpc>
+                </a:pPr>
+                <a:r>
+                  <a:rPr lang="en-US" sz="1800" b="0" i="1" strike="noStrike" spc="-1">
+                    <a:solidFill>
+                      <a:srgbClr val="000000"/>
+                    </a:solidFill>
+                    <a:latin typeface="Calibri"/>
+                  </a:rPr>
+                  <a:t>button  press</a:t>
+                </a:r>
+                <a:endParaRPr lang="en-US" sz="1800" b="0" strike="noStrike" spc="-1">
+                  <a:latin typeface="Nimbus Sans"/>
+                </a:endParaRPr>
+              </a:p>
+            </p:txBody>
+          </p:sp>
+          <p:sp>
+            <p:nvSpPr>
+              <p:cNvPr id="62" name="CustomShape 22"/>
+              <p:cNvSpPr/>
+              <p:nvPr/>
+            </p:nvSpPr>
+            <p:spPr>
+              <a:xfrm>
+                <a:off x="3177720" y="3201120"/>
+                <a:ext cx="1400760" cy="364680"/>
+              </a:xfrm>
+              <a:prstGeom prst="rect">
+                <a:avLst/>
+              </a:prstGeom>
+              <a:noFill/>
+              <a:ln>
+                <a:noFill/>
+              </a:ln>
+            </p:spPr>
+            <p:style>
+              <a:lnRef idx="0">
+                <a:scrgbClr r="0" g="0" b="0"/>
+              </a:lnRef>
+              <a:fillRef idx="0">
+                <a:scrgbClr r="0" g="0" b="0"/>
+              </a:fillRef>
+              <a:effectRef idx="0">
+                <a:scrgbClr r="0" g="0" b="0"/>
+              </a:effectRef>
+              <a:fontRef idx="minor"/>
+            </p:style>
+            <p:txBody>
+              <a:bodyPr lIns="90000" tIns="45000" rIns="90000" bIns="45000">
+                <a:spAutoFit/>
+              </a:bodyPr>
+              <a:lstStyle/>
+              <a:p>
+                <a:pPr>
+                  <a:lnSpc>
+                    <a:spcPct val="100000"/>
+                  </a:lnSpc>
+                </a:pPr>
+                <a:r>
+                  <a:rPr lang="en-US" sz="1800" b="0" i="1" strike="noStrike" spc="-1">
+                    <a:solidFill>
+                      <a:srgbClr val="000000"/>
+                    </a:solidFill>
+                    <a:latin typeface="Calibri"/>
+                  </a:rPr>
+                  <a:t>complete</a:t>
+                </a:r>
+                <a:endParaRPr lang="en-US" sz="1800" b="0" strike="noStrike" spc="-1">
+                  <a:latin typeface="Nimbus Sans"/>
+                </a:endParaRPr>
+              </a:p>
+            </p:txBody>
+          </p:sp>
+          <p:sp>
+            <p:nvSpPr>
+              <p:cNvPr id="63" name="CustomShape 23"/>
+              <p:cNvSpPr/>
+              <p:nvPr/>
+            </p:nvSpPr>
+            <p:spPr>
+              <a:xfrm rot="5400000" flipH="1">
+                <a:off x="3564720" y="4207680"/>
+                <a:ext cx="746640" cy="12240"/>
+              </a:xfrm>
+              <a:prstGeom prst="curvedConnector5">
+                <a:avLst>
+                  <a:gd name="adj1" fmla="val -30602"/>
+                  <a:gd name="adj2" fmla="val -7131142"/>
+                  <a:gd name="adj3" fmla="val 130602"/>
+                </a:avLst>
+              </a:prstGeom>
+              <a:noFill/>
+              <a:ln w="38160">
+                <a:tailEnd type="triangle" w="med" len="med"/>
+              </a:ln>
+            </p:spPr>
+            <p:style>
+              <a:lnRef idx="1">
+                <a:schemeClr val="accent1"/>
+              </a:lnRef>
+              <a:fillRef idx="0">
+                <a:schemeClr val="accent1"/>
+              </a:fillRef>
+              <a:effectRef idx="0">
+                <a:schemeClr val="accent1"/>
+              </a:effectRef>
+              <a:fontRef idx="minor"/>
+            </p:style>
+          </p:sp>
+          <p:sp>
+            <p:nvSpPr>
+              <p:cNvPr id="64" name="CustomShape 24"/>
+              <p:cNvSpPr/>
+              <p:nvPr/>
+            </p:nvSpPr>
+            <p:spPr>
+              <a:xfrm>
+                <a:off x="4826880" y="4023360"/>
+                <a:ext cx="1400760" cy="364680"/>
+              </a:xfrm>
+              <a:prstGeom prst="rect">
+                <a:avLst/>
+              </a:prstGeom>
+              <a:noFill/>
+              <a:ln>
+                <a:noFill/>
+              </a:ln>
+            </p:spPr>
+            <p:style>
+              <a:lnRef idx="0">
+                <a:scrgbClr r="0" g="0" b="0"/>
+              </a:lnRef>
+              <a:fillRef idx="0">
+                <a:scrgbClr r="0" g="0" b="0"/>
+              </a:fillRef>
+              <a:effectRef idx="0">
+                <a:scrgbClr r="0" g="0" b="0"/>
+              </a:effectRef>
+              <a:fontRef idx="minor"/>
+            </p:style>
+            <p:txBody>
+              <a:bodyPr lIns="90000" tIns="45000" rIns="90000" bIns="45000">
+                <a:spAutoFit/>
+              </a:bodyPr>
+              <a:lstStyle/>
+              <a:p>
+                <a:pPr>
+                  <a:lnSpc>
+                    <a:spcPct val="100000"/>
+                  </a:lnSpc>
+                </a:pPr>
+                <a:r>
+                  <a:rPr lang="en-US" sz="1800" b="0" i="1" strike="noStrike" spc="-1">
+                    <a:solidFill>
+                      <a:srgbClr val="000000"/>
+                    </a:solidFill>
+                    <a:latin typeface="Calibri"/>
+                  </a:rPr>
+                  <a:t>next Mote</a:t>
+                </a:r>
+                <a:endParaRPr lang="en-US" sz="1800" b="0" strike="noStrike" spc="-1">
+                  <a:latin typeface="Nimbus Sans"/>
+                </a:endParaRPr>
+              </a:p>
+            </p:txBody>
+          </p:sp>
+          <p:sp>
+            <p:nvSpPr>
+              <p:cNvPr id="65" name="CustomShape 25"/>
+              <p:cNvSpPr/>
+              <p:nvPr/>
+            </p:nvSpPr>
+            <p:spPr>
+              <a:xfrm>
+                <a:off x="1922760" y="6188760"/>
+                <a:ext cx="1400760" cy="639000"/>
+              </a:xfrm>
+              <a:prstGeom prst="rect">
+                <a:avLst/>
+              </a:prstGeom>
+              <a:noFill/>
+              <a:ln>
+                <a:noFill/>
+              </a:ln>
+            </p:spPr>
+            <p:style>
+              <a:lnRef idx="0">
+                <a:scrgbClr r="0" g="0" b="0"/>
+              </a:lnRef>
+              <a:fillRef idx="0">
+                <a:scrgbClr r="0" g="0" b="0"/>
+              </a:fillRef>
+              <a:effectRef idx="0">
+                <a:scrgbClr r="0" g="0" b="0"/>
+              </a:effectRef>
+              <a:fontRef idx="minor"/>
+            </p:style>
+            <p:txBody>
+              <a:bodyPr lIns="90000" tIns="45000" rIns="90000" bIns="45000">
+                <a:spAutoFit/>
+              </a:bodyPr>
+              <a:lstStyle/>
+              <a:p>
+                <a:pPr>
+                  <a:lnSpc>
+                    <a:spcPct val="100000"/>
+                  </a:lnSpc>
+                </a:pPr>
+                <a:r>
+                  <a:rPr lang="en-US" sz="1800" b="0" i="1" strike="noStrike" spc="-1">
+                    <a:solidFill>
+                      <a:srgbClr val="000000"/>
+                    </a:solidFill>
+                    <a:latin typeface="Calibri"/>
+                  </a:rPr>
+                  <a:t>automatic or manual</a:t>
+                </a:r>
+                <a:endParaRPr lang="en-US" sz="1800" b="0" strike="noStrike" spc="-1">
+                  <a:latin typeface="Nimbus Sans"/>
+                </a:endParaRPr>
+              </a:p>
+            </p:txBody>
+          </p:sp>
+          <p:sp>
+            <p:nvSpPr>
+              <p:cNvPr id="66" name="CustomShape 26"/>
+              <p:cNvSpPr/>
+              <p:nvPr/>
+            </p:nvSpPr>
+            <p:spPr>
+              <a:xfrm>
+                <a:off x="4871160" y="5562360"/>
+                <a:ext cx="1400760" cy="364680"/>
+              </a:xfrm>
+              <a:prstGeom prst="rect">
+                <a:avLst/>
+              </a:prstGeom>
+              <a:noFill/>
+              <a:ln>
+                <a:noFill/>
+              </a:ln>
+            </p:spPr>
+            <p:style>
+              <a:lnRef idx="0">
+                <a:scrgbClr r="0" g="0" b="0"/>
+              </a:lnRef>
+              <a:fillRef idx="0">
+                <a:scrgbClr r="0" g="0" b="0"/>
+              </a:fillRef>
+              <a:effectRef idx="0">
+                <a:scrgbClr r="0" g="0" b="0"/>
+              </a:effectRef>
+              <a:fontRef idx="minor"/>
+            </p:style>
+            <p:txBody>
+              <a:bodyPr lIns="90000" tIns="45000" rIns="90000" bIns="45000">
+                <a:spAutoFit/>
+              </a:bodyPr>
+              <a:lstStyle/>
+              <a:p>
+                <a:pPr>
+                  <a:lnSpc>
+                    <a:spcPct val="100000"/>
+                  </a:lnSpc>
+                </a:pPr>
+                <a:r>
+                  <a:rPr lang="en-US" sz="1800" b="0" i="1" strike="noStrike" spc="-1">
+                    <a:solidFill>
+                      <a:srgbClr val="000000"/>
+                    </a:solidFill>
+                    <a:latin typeface="Calibri"/>
+                  </a:rPr>
+                  <a:t>next Mote</a:t>
+                </a:r>
+                <a:endParaRPr lang="en-US" sz="1800" b="0" strike="noStrike" spc="-1">
+                  <a:latin typeface="Nimbus Sans"/>
+                </a:endParaRPr>
+              </a:p>
+            </p:txBody>
+          </p:sp>
+          <p:sp>
+            <p:nvSpPr>
+              <p:cNvPr id="67" name="CustomShape 27"/>
+              <p:cNvSpPr/>
+              <p:nvPr/>
+            </p:nvSpPr>
+            <p:spPr>
+              <a:xfrm>
+                <a:off x="3171960" y="4685400"/>
+                <a:ext cx="1400760" cy="364680"/>
+              </a:xfrm>
+              <a:prstGeom prst="rect">
+                <a:avLst/>
+              </a:prstGeom>
+              <a:noFill/>
+              <a:ln>
+                <a:noFill/>
+              </a:ln>
+            </p:spPr>
+            <p:style>
+              <a:lnRef idx="0">
+                <a:scrgbClr r="0" g="0" b="0"/>
+              </a:lnRef>
+              <a:fillRef idx="0">
+                <a:scrgbClr r="0" g="0" b="0"/>
+              </a:fillRef>
+              <a:effectRef idx="0">
+                <a:scrgbClr r="0" g="0" b="0"/>
+              </a:effectRef>
+              <a:fontRef idx="minor"/>
+            </p:style>
+            <p:txBody>
+              <a:bodyPr lIns="90000" tIns="45000" rIns="90000" bIns="45000">
+                <a:spAutoFit/>
+              </a:bodyPr>
+              <a:lstStyle/>
+              <a:p>
+                <a:pPr>
+                  <a:lnSpc>
+                    <a:spcPct val="100000"/>
+                  </a:lnSpc>
+                </a:pPr>
+                <a:r>
+                  <a:rPr lang="en-US" sz="1800" b="0" i="1" strike="noStrike" spc="-1" dirty="0">
+                    <a:solidFill>
+                      <a:srgbClr val="000000"/>
+                    </a:solidFill>
+                    <a:latin typeface="Calibri"/>
+                  </a:rPr>
+                  <a:t>complete</a:t>
+                </a:r>
+                <a:endParaRPr lang="en-US" sz="1800" b="0" strike="noStrike" spc="-1" dirty="0">
+                  <a:latin typeface="Nimbus Sans"/>
+                </a:endParaRPr>
+              </a:p>
+            </p:txBody>
+          </p:sp>
+          <p:sp>
+            <p:nvSpPr>
+              <p:cNvPr id="68" name="CustomShape 28"/>
+              <p:cNvSpPr/>
+              <p:nvPr/>
+            </p:nvSpPr>
+            <p:spPr>
+              <a:xfrm>
+                <a:off x="7743240" y="1738440"/>
+                <a:ext cx="1400760" cy="364680"/>
+              </a:xfrm>
+              <a:prstGeom prst="rect">
+                <a:avLst/>
+              </a:prstGeom>
+              <a:noFill/>
+              <a:ln>
+                <a:noFill/>
+              </a:ln>
+            </p:spPr>
+            <p:style>
+              <a:lnRef idx="0">
+                <a:scrgbClr r="0" g="0" b="0"/>
+              </a:lnRef>
+              <a:fillRef idx="0">
+                <a:scrgbClr r="0" g="0" b="0"/>
+              </a:fillRef>
+              <a:effectRef idx="0">
+                <a:scrgbClr r="0" g="0" b="0"/>
+              </a:effectRef>
+              <a:fontRef idx="minor"/>
+            </p:style>
+            <p:txBody>
+              <a:bodyPr lIns="90000" tIns="45000" rIns="90000" bIns="45000">
+                <a:spAutoFit/>
+              </a:bodyPr>
+              <a:lstStyle/>
+              <a:p>
+                <a:pPr>
+                  <a:lnSpc>
+                    <a:spcPct val="100000"/>
+                  </a:lnSpc>
+                </a:pPr>
+                <a:r>
+                  <a:rPr lang="en-US" sz="1800" b="0" i="1" strike="noStrike" spc="-1">
+                    <a:solidFill>
+                      <a:srgbClr val="000000"/>
+                    </a:solidFill>
+                    <a:latin typeface="Calibri"/>
+                  </a:rPr>
+                  <a:t>Emergency</a:t>
+                </a:r>
+                <a:endParaRPr lang="en-US" sz="1800" b="0" strike="noStrike" spc="-1">
+                  <a:latin typeface="Nimbus Sans"/>
+                </a:endParaRPr>
+              </a:p>
+            </p:txBody>
+          </p:sp>
+          <p:sp>
+            <p:nvSpPr>
+              <p:cNvPr id="69" name="CustomShape 29"/>
+              <p:cNvSpPr/>
+              <p:nvPr/>
+            </p:nvSpPr>
+            <p:spPr>
+              <a:xfrm>
+                <a:off x="4572000" y="2012760"/>
+                <a:ext cx="1400760" cy="638280"/>
+              </a:xfrm>
+              <a:prstGeom prst="rect">
+                <a:avLst/>
+              </a:prstGeom>
+              <a:noFill/>
+              <a:ln>
+                <a:noFill/>
+              </a:ln>
+            </p:spPr>
+            <p:style>
+              <a:lnRef idx="0">
+                <a:scrgbClr r="0" g="0" b="0"/>
+              </a:lnRef>
+              <a:fillRef idx="0">
+                <a:scrgbClr r="0" g="0" b="0"/>
+              </a:fillRef>
+              <a:effectRef idx="0">
+                <a:scrgbClr r="0" g="0" b="0"/>
+              </a:effectRef>
+              <a:fontRef idx="minor"/>
+            </p:style>
+            <p:txBody>
+              <a:bodyPr lIns="90000" tIns="45000" rIns="90000" bIns="45000">
+                <a:spAutoFit/>
+              </a:bodyPr>
+              <a:lstStyle/>
+              <a:p>
+                <a:pPr>
+                  <a:lnSpc>
+                    <a:spcPct val="100000"/>
+                  </a:lnSpc>
+                </a:pPr>
+                <a:r>
+                  <a:rPr lang="en-US" sz="1800" b="0" i="1" strike="noStrike" spc="-1">
+                    <a:solidFill>
+                      <a:srgbClr val="000000"/>
+                    </a:solidFill>
+                    <a:latin typeface="Calibri"/>
+                  </a:rPr>
+                  <a:t>Resume Operation</a:t>
+                </a:r>
+                <a:endParaRPr lang="en-US" sz="1800" b="0" strike="noStrike" spc="-1">
+                  <a:latin typeface="Nimbus Sans"/>
+                </a:endParaRPr>
+              </a:p>
+            </p:txBody>
+          </p:sp>
+        </p:grpSp>
+        <p:cxnSp>
+          <p:nvCxnSpPr>
+            <p:cNvPr id="7" name="Gekrümmte Verbindung 6">
+              <a:extLst>
+                <a:ext uri="{FF2B5EF4-FFF2-40B4-BE49-F238E27FC236}">
+                  <a16:creationId xmlns:a16="http://schemas.microsoft.com/office/drawing/2014/main" id="{7EEFB268-057A-9848-8326-45029506D57D}"/>
+                </a:ext>
+              </a:extLst>
+            </p:cNvPr>
+            <p:cNvCxnSpPr>
+              <a:stCxn id="47" idx="2"/>
+              <a:endCxn id="45" idx="2"/>
+            </p:cNvCxnSpPr>
+            <p:nvPr/>
+          </p:nvCxnSpPr>
           <p:spPr>
-            <a:xfrm>
-              <a:off x="429120" y="3504600"/>
-              <a:ext cx="8895240" cy="3330360"/>
+            <a:xfrm rot="10800000" flipH="1">
+              <a:off x="2166120" y="2731320"/>
+              <a:ext cx="1440" cy="3021480"/>
             </a:xfrm>
-            <a:prstGeom prst="roundRect">
+            <a:prstGeom prst="curvedConnector3">
               <a:avLst>
-                <a:gd name="adj" fmla="val 16667"/>
+                <a:gd name="adj1" fmla="val -32061250"/>
               </a:avLst>
             </a:prstGeom>
-            <a:solidFill>
-              <a:srgbClr val="00B0F0">
-                <a:alpha val="48000"/>
-              </a:srgbClr>
-            </a:solidFill>
-            <a:ln>
-              <a:noFill/>
-            </a:ln>
-          </p:spPr>
-          <p:style>
-            <a:lnRef idx="2">
-              <a:schemeClr val="accent1">
-                <a:shade val="50000"/>
-              </a:schemeClr>
-            </a:lnRef>
-            <a:fillRef idx="1">
-              <a:schemeClr val="accent1"/>
-            </a:fillRef>
-            <a:effectRef idx="0">
-              <a:schemeClr val="accent1"/>
-            </a:effectRef>
-            <a:fontRef idx="minor"/>
-          </p:style>
-        </p:sp>
-        <p:sp>
-          <p:nvSpPr>
-            <p:cNvPr id="43" name="CustomShape 3"/>
-            <p:cNvSpPr/>
-            <p:nvPr/>
-          </p:nvSpPr>
-          <p:spPr>
-            <a:xfrm>
-              <a:off x="429120" y="1830600"/>
-              <a:ext cx="8895240" cy="1673640"/>
-            </a:xfrm>
-            <a:prstGeom prst="roundRect">
-              <a:avLst>
-                <a:gd name="adj" fmla="val 16667"/>
-              </a:avLst>
-            </a:prstGeom>
-            <a:solidFill>
-              <a:srgbClr val="C00000">
-                <a:alpha val="48000"/>
-              </a:srgbClr>
-            </a:solidFill>
-            <a:ln>
-              <a:noFill/>
-            </a:ln>
-          </p:spPr>
-          <p:style>
-            <a:lnRef idx="2">
-              <a:schemeClr val="accent1">
-                <a:shade val="50000"/>
-              </a:schemeClr>
-            </a:lnRef>
-            <a:fillRef idx="1">
-              <a:schemeClr val="accent1"/>
-            </a:fillRef>
-            <a:effectRef idx="0">
-              <a:schemeClr val="accent1"/>
-            </a:effectRef>
-            <a:fontRef idx="minor"/>
-          </p:style>
-        </p:sp>
-        <p:sp>
-          <p:nvSpPr>
-            <p:cNvPr id="44" name="CustomShape 4"/>
-            <p:cNvSpPr/>
-            <p:nvPr/>
-          </p:nvSpPr>
-          <p:spPr>
-            <a:xfrm>
-              <a:off x="2166120" y="263520"/>
-              <a:ext cx="2121480" cy="1056240"/>
-            </a:xfrm>
-            <a:prstGeom prst="ellipse">
-              <a:avLst/>
-            </a:prstGeom>
-            <a:ln/>
-          </p:spPr>
-          <p:style>
-            <a:lnRef idx="2">
-              <a:schemeClr val="accent1">
-                <a:shade val="50000"/>
-              </a:schemeClr>
-            </a:lnRef>
-            <a:fillRef idx="1">
-              <a:schemeClr val="accent1"/>
-            </a:fillRef>
-            <a:effectRef idx="0">
-              <a:schemeClr val="accent1"/>
-            </a:effectRef>
-            <a:fontRef idx="minor"/>
-          </p:style>
-          <p:txBody>
-            <a:bodyPr lIns="90000" tIns="45000" rIns="90000" bIns="45000" anchor="ctr">
-              <a:noAutofit/>
-            </a:bodyPr>
-            <a:lstStyle/>
-            <a:p>
-              <a:pPr algn="ctr">
-                <a:lnSpc>
-                  <a:spcPct val="100000"/>
-                </a:lnSpc>
-              </a:pPr>
-              <a:r>
-                <a:rPr lang="en-US" sz="1800" b="0" strike="noStrike" spc="-1">
-                  <a:solidFill>
-                    <a:srgbClr val="FFFFFF"/>
-                  </a:solidFill>
-                  <a:latin typeface="Calibri"/>
-                </a:rPr>
-                <a:t>IDLE</a:t>
-              </a:r>
-              <a:endParaRPr lang="en-US" sz="1800" b="0" strike="noStrike" spc="-1">
-                <a:latin typeface="Nimbus Sans"/>
-              </a:endParaRPr>
-            </a:p>
-          </p:txBody>
-        </p:sp>
-        <p:sp>
-          <p:nvSpPr>
-            <p:cNvPr id="45" name="CustomShape 5"/>
-            <p:cNvSpPr/>
-            <p:nvPr/>
-          </p:nvSpPr>
-          <p:spPr>
-            <a:xfrm>
-              <a:off x="2167560" y="2203200"/>
-              <a:ext cx="2121480" cy="1056240"/>
-            </a:xfrm>
-            <a:prstGeom prst="ellipse">
-              <a:avLst/>
-            </a:prstGeom>
-            <a:ln/>
-          </p:spPr>
-          <p:style>
-            <a:lnRef idx="2">
-              <a:schemeClr val="accent1">
-                <a:shade val="50000"/>
-              </a:schemeClr>
-            </a:lnRef>
-            <a:fillRef idx="1">
-              <a:schemeClr val="accent1"/>
-            </a:fillRef>
-            <a:effectRef idx="0">
-              <a:schemeClr val="accent1"/>
-            </a:effectRef>
-            <a:fontRef idx="minor"/>
-          </p:style>
-          <p:txBody>
-            <a:bodyPr lIns="90000" tIns="45000" rIns="90000" bIns="45000" anchor="ctr">
-              <a:noAutofit/>
-            </a:bodyPr>
-            <a:lstStyle/>
-            <a:p>
-              <a:pPr algn="ctr">
-                <a:lnSpc>
-                  <a:spcPct val="100000"/>
-                </a:lnSpc>
-              </a:pPr>
-              <a:r>
-                <a:rPr lang="en-US" sz="1800" b="0" strike="noStrike" spc="-1">
-                  <a:solidFill>
-                    <a:srgbClr val="FFFFFF"/>
-                  </a:solidFill>
-                  <a:latin typeface="Calibri"/>
-                </a:rPr>
-                <a:t>NETWORK DISCOVERY</a:t>
-              </a:r>
-              <a:endParaRPr lang="en-US" sz="1800" b="0" strike="noStrike" spc="-1">
-                <a:latin typeface="Nimbus Sans"/>
-              </a:endParaRPr>
-            </a:p>
-          </p:txBody>
-        </p:sp>
-        <p:sp>
-          <p:nvSpPr>
-            <p:cNvPr id="46" name="CustomShape 6"/>
-            <p:cNvSpPr/>
-            <p:nvPr/>
-          </p:nvSpPr>
-          <p:spPr>
-            <a:xfrm>
-              <a:off x="2166120" y="3713760"/>
-              <a:ext cx="2121480" cy="1056240"/>
-            </a:xfrm>
-            <a:prstGeom prst="ellipse">
-              <a:avLst/>
-            </a:prstGeom>
-            <a:ln/>
-          </p:spPr>
-          <p:style>
-            <a:lnRef idx="2">
-              <a:schemeClr val="accent1">
-                <a:shade val="50000"/>
-              </a:schemeClr>
-            </a:lnRef>
-            <a:fillRef idx="1">
-              <a:schemeClr val="accent1"/>
-            </a:fillRef>
-            <a:effectRef idx="0">
-              <a:schemeClr val="accent1"/>
-            </a:effectRef>
-            <a:fontRef idx="minor"/>
-          </p:style>
-          <p:txBody>
-            <a:bodyPr lIns="90000" tIns="45000" rIns="90000" bIns="45000" anchor="ctr">
-              <a:noAutofit/>
-            </a:bodyPr>
-            <a:lstStyle/>
-            <a:p>
-              <a:pPr algn="ctr">
-                <a:lnSpc>
-                  <a:spcPct val="100000"/>
-                </a:lnSpc>
-              </a:pPr>
-              <a:r>
-                <a:rPr lang="en-US" sz="1800" b="0" strike="noStrike" spc="-1">
-                  <a:solidFill>
-                    <a:srgbClr val="FFFFFF"/>
-                  </a:solidFill>
-                  <a:latin typeface="Calibri"/>
-                </a:rPr>
-                <a:t>PATHMODE</a:t>
-              </a:r>
-              <a:endParaRPr lang="en-US" sz="1800" b="0" strike="noStrike" spc="-1">
-                <a:latin typeface="Nimbus Sans"/>
-              </a:endParaRPr>
-            </a:p>
-          </p:txBody>
-        </p:sp>
-        <p:sp>
-          <p:nvSpPr>
-            <p:cNvPr id="47" name="CustomShape 7"/>
-            <p:cNvSpPr/>
-            <p:nvPr/>
-          </p:nvSpPr>
-          <p:spPr>
-            <a:xfrm>
-              <a:off x="2166120" y="5224680"/>
-              <a:ext cx="2121480" cy="1056240"/>
-            </a:xfrm>
-            <a:prstGeom prst="ellipse">
-              <a:avLst/>
-            </a:prstGeom>
-            <a:ln/>
-          </p:spPr>
-          <p:style>
-            <a:lnRef idx="2">
-              <a:schemeClr val="accent1">
-                <a:shade val="50000"/>
-              </a:schemeClr>
-            </a:lnRef>
-            <a:fillRef idx="1">
-              <a:schemeClr val="accent1"/>
-            </a:fillRef>
-            <a:effectRef idx="0">
-              <a:schemeClr val="accent1"/>
-            </a:effectRef>
-            <a:fontRef idx="minor"/>
-          </p:style>
-          <p:txBody>
-            <a:bodyPr lIns="90000" tIns="45000" rIns="90000" bIns="45000" anchor="ctr">
-              <a:noAutofit/>
-            </a:bodyPr>
-            <a:lstStyle/>
-            <a:p>
-              <a:pPr algn="ctr">
-                <a:lnSpc>
-                  <a:spcPct val="100000"/>
-                </a:lnSpc>
-              </a:pPr>
-              <a:r>
-                <a:rPr lang="en-US" sz="1800" b="0" strike="noStrike" spc="-1">
-                  <a:solidFill>
-                    <a:srgbClr val="FFFFFF"/>
-                  </a:solidFill>
-                  <a:latin typeface="Calibri"/>
-                </a:rPr>
-                <a:t>UNICAST MODE</a:t>
-              </a:r>
-              <a:endParaRPr lang="en-US" sz="1800" b="0" strike="noStrike" spc="-1">
-                <a:latin typeface="Nimbus Sans"/>
-              </a:endParaRPr>
-            </a:p>
-          </p:txBody>
-        </p:sp>
-        <p:sp>
-          <p:nvSpPr>
-            <p:cNvPr id="48" name="CustomShape 8"/>
-            <p:cNvSpPr/>
-            <p:nvPr/>
-          </p:nvSpPr>
-          <p:spPr>
-            <a:xfrm>
-              <a:off x="6162480" y="2203200"/>
-              <a:ext cx="2121480" cy="1056240"/>
-            </a:xfrm>
-            <a:prstGeom prst="ellipse">
-              <a:avLst/>
-            </a:prstGeom>
-            <a:ln/>
-          </p:spPr>
-          <p:style>
-            <a:lnRef idx="2">
-              <a:schemeClr val="accent1">
-                <a:shade val="50000"/>
-              </a:schemeClr>
-            </a:lnRef>
-            <a:fillRef idx="1">
-              <a:schemeClr val="accent1"/>
-            </a:fillRef>
-            <a:effectRef idx="0">
-              <a:schemeClr val="accent1"/>
-            </a:effectRef>
-            <a:fontRef idx="minor"/>
-          </p:style>
-          <p:txBody>
-            <a:bodyPr lIns="90000" tIns="45000" rIns="90000" bIns="45000" anchor="ctr">
-              <a:noAutofit/>
-            </a:bodyPr>
-            <a:lstStyle/>
-            <a:p>
-              <a:pPr algn="ctr">
-                <a:lnSpc>
-                  <a:spcPct val="100000"/>
-                </a:lnSpc>
-              </a:pPr>
-              <a:r>
-                <a:rPr lang="en-US" sz="1800" b="0" strike="noStrike" spc="-1">
-                  <a:solidFill>
-                    <a:srgbClr val="FFFFFF"/>
-                  </a:solidFill>
-                  <a:latin typeface="Calibri"/>
-                </a:rPr>
-                <a:t>EMERGENCY</a:t>
-              </a:r>
-              <a:endParaRPr lang="en-US" sz="1800" b="0" strike="noStrike" spc="-1">
-                <a:latin typeface="Nimbus Sans"/>
-              </a:endParaRPr>
-            </a:p>
-          </p:txBody>
-        </p:sp>
-        <p:sp>
-          <p:nvSpPr>
-            <p:cNvPr id="49" name="CustomShape 9"/>
-            <p:cNvSpPr/>
-            <p:nvPr/>
-          </p:nvSpPr>
-          <p:spPr>
-            <a:xfrm rot="5400000" flipH="1">
-              <a:off x="3603600" y="5753160"/>
-              <a:ext cx="746640" cy="12240"/>
-            </a:xfrm>
-            <a:prstGeom prst="curvedConnector5">
-              <a:avLst>
-                <a:gd name="adj1" fmla="val -23472"/>
-                <a:gd name="adj2" fmla="val -7242488"/>
-                <a:gd name="adj3" fmla="val 124660"/>
-              </a:avLst>
-            </a:prstGeom>
-            <a:noFill/>
-            <a:ln w="38160">
-              <a:tailEnd type="triangle" w="med" len="med"/>
+            <a:ln w="38100">
+              <a:solidFill>
+                <a:schemeClr val="accent1"/>
+              </a:solidFill>
+              <a:tailEnd type="triangle"/>
             </a:ln>
           </p:spPr>
           <p:style>
@@ -2732,310 +3788,27 @@
             <a:effectRef idx="0">
               <a:schemeClr val="accent1"/>
             </a:effectRef>
-            <a:fontRef idx="minor"/>
+            <a:fontRef idx="minor">
+              <a:schemeClr val="tx1"/>
+            </a:fontRef>
           </p:style>
-        </p:sp>
+        </p:cxnSp>
         <p:sp>
           <p:nvSpPr>
-            <p:cNvPr id="50" name="CustomShape 10"/>
-            <p:cNvSpPr/>
-            <p:nvPr/>
-          </p:nvSpPr>
-          <p:spPr>
-            <a:xfrm rot="5400000" flipH="1" flipV="1">
-              <a:off x="3714840" y="2771640"/>
-              <a:ext cx="3021120" cy="3996000"/>
-            </a:xfrm>
-            <a:prstGeom prst="curvedConnector3">
-              <a:avLst>
-                <a:gd name="adj1" fmla="val -14030"/>
-              </a:avLst>
-            </a:prstGeom>
-            <a:noFill/>
-            <a:ln w="38160">
-              <a:tailEnd type="triangle" w="med" len="med"/>
-            </a:ln>
-          </p:spPr>
-          <p:style>
-            <a:lnRef idx="1">
-              <a:schemeClr val="accent1"/>
-            </a:lnRef>
-            <a:fillRef idx="0">
-              <a:schemeClr val="accent1"/>
-            </a:fillRef>
-            <a:effectRef idx="0">
-              <a:schemeClr val="accent1"/>
-            </a:effectRef>
-            <a:fontRef idx="minor"/>
-          </p:style>
-        </p:sp>
-        <p:sp>
-          <p:nvSpPr>
-            <p:cNvPr id="51" name="CustomShape 11"/>
+            <p:cNvPr id="38" name="CustomShape 27">
+              <a:extLst>
+                <a:ext uri="{FF2B5EF4-FFF2-40B4-BE49-F238E27FC236}">
+                  <a16:creationId xmlns:a16="http://schemas.microsoft.com/office/drawing/2014/main" id="{6A8467D6-F3CA-F441-AC98-C76E49BFC34A}"/>
+                </a:ext>
+              </a:extLst>
+            </p:cNvPr>
             <p:cNvSpPr/>
             <p:nvPr/>
           </p:nvSpPr>
           <p:spPr>
             <a:xfrm>
-              <a:off x="3227040" y="1319760"/>
-              <a:ext cx="1080" cy="882720"/>
-            </a:xfrm>
-            <a:custGeom>
-              <a:avLst/>
-              <a:gdLst/>
-              <a:ahLst/>
-              <a:cxnLst/>
-              <a:rect l="l" t="t" r="r" b="b"/>
-              <a:pathLst>
-                <a:path w="21600" h="21600">
-                  <a:moveTo>
-                    <a:pt x="0" y="0"/>
-                  </a:moveTo>
-                  <a:lnTo>
-                    <a:pt x="21600" y="21600"/>
-                  </a:lnTo>
-                </a:path>
-              </a:pathLst>
-            </a:custGeom>
-            <a:noFill/>
-            <a:ln w="38160">
-              <a:solidFill>
-                <a:schemeClr val="accent1"/>
-              </a:solidFill>
-              <a:tailEnd type="triangle" w="med" len="med"/>
-            </a:ln>
-          </p:spPr>
-          <p:style>
-            <a:lnRef idx="1">
-              <a:schemeClr val="accent1"/>
-            </a:lnRef>
-            <a:fillRef idx="0">
-              <a:schemeClr val="accent1"/>
-            </a:fillRef>
-            <a:effectRef idx="0">
-              <a:schemeClr val="accent1"/>
-            </a:effectRef>
-            <a:fontRef idx="minor"/>
-          </p:style>
-        </p:sp>
-        <p:sp>
-          <p:nvSpPr>
-            <p:cNvPr id="52" name="CustomShape 12"/>
-            <p:cNvSpPr/>
-            <p:nvPr/>
-          </p:nvSpPr>
-          <p:spPr>
-            <a:xfrm flipH="1">
-              <a:off x="3226320" y="3259440"/>
-              <a:ext cx="1080" cy="453960"/>
-            </a:xfrm>
-            <a:custGeom>
-              <a:avLst/>
-              <a:gdLst/>
-              <a:ahLst/>
-              <a:cxnLst/>
-              <a:rect l="l" t="t" r="r" b="b"/>
-              <a:pathLst>
-                <a:path w="21600" h="21600">
-                  <a:moveTo>
-                    <a:pt x="0" y="0"/>
-                  </a:moveTo>
-                  <a:lnTo>
-                    <a:pt x="21600" y="21600"/>
-                  </a:lnTo>
-                </a:path>
-              </a:pathLst>
-            </a:custGeom>
-            <a:noFill/>
-            <a:ln w="38160">
-              <a:tailEnd type="triangle" w="med" len="med"/>
-            </a:ln>
-          </p:spPr>
-          <p:style>
-            <a:lnRef idx="1">
-              <a:schemeClr val="accent1"/>
-            </a:lnRef>
-            <a:fillRef idx="0">
-              <a:schemeClr val="accent1"/>
-            </a:fillRef>
-            <a:effectRef idx="0">
-              <a:schemeClr val="accent1"/>
-            </a:effectRef>
-            <a:fontRef idx="minor"/>
-          </p:style>
-        </p:sp>
-        <p:sp>
-          <p:nvSpPr>
-            <p:cNvPr id="53" name="CustomShape 13"/>
-            <p:cNvSpPr/>
-            <p:nvPr/>
-          </p:nvSpPr>
-          <p:spPr>
-            <a:xfrm>
-              <a:off x="3227040" y="4770360"/>
-              <a:ext cx="360" cy="453960"/>
-            </a:xfrm>
-            <a:custGeom>
-              <a:avLst/>
-              <a:gdLst/>
-              <a:ahLst/>
-              <a:cxnLst/>
-              <a:rect l="l" t="t" r="r" b="b"/>
-              <a:pathLst>
-                <a:path w="21600" h="21600">
-                  <a:moveTo>
-                    <a:pt x="0" y="0"/>
-                  </a:moveTo>
-                  <a:lnTo>
-                    <a:pt x="21600" y="21600"/>
-                  </a:lnTo>
-                </a:path>
-              </a:pathLst>
-            </a:custGeom>
-            <a:noFill/>
-            <a:ln w="38160">
-              <a:tailEnd type="triangle" w="med" len="med"/>
-            </a:ln>
-          </p:spPr>
-          <p:style>
-            <a:lnRef idx="1">
-              <a:schemeClr val="accent1"/>
-            </a:lnRef>
-            <a:fillRef idx="0">
-              <a:schemeClr val="accent1"/>
-            </a:fillRef>
-            <a:effectRef idx="0">
-              <a:schemeClr val="accent1"/>
-            </a:effectRef>
-            <a:fontRef idx="minor"/>
-          </p:style>
-        </p:sp>
-        <p:sp>
-          <p:nvSpPr>
-            <p:cNvPr id="54" name="CustomShape 14"/>
-            <p:cNvSpPr/>
-            <p:nvPr/>
-          </p:nvSpPr>
-          <p:spPr>
-            <a:xfrm rot="10800000">
-              <a:off x="3227400" y="1976040"/>
-              <a:ext cx="3996000" cy="226800"/>
-            </a:xfrm>
-            <a:prstGeom prst="bentConnector3">
-              <a:avLst>
-                <a:gd name="adj1" fmla="val -648"/>
-              </a:avLst>
-            </a:prstGeom>
-            <a:noFill/>
-            <a:ln w="38160">
-              <a:tailEnd type="triangle" w="med" len="med"/>
-            </a:ln>
-          </p:spPr>
-          <p:style>
-            <a:lnRef idx="1">
-              <a:schemeClr val="accent1"/>
-            </a:lnRef>
-            <a:fillRef idx="0">
-              <a:schemeClr val="accent1"/>
-            </a:fillRef>
-            <a:effectRef idx="0">
-              <a:schemeClr val="accent1"/>
-            </a:effectRef>
-            <a:fontRef idx="minor"/>
-          </p:style>
-        </p:sp>
-        <p:sp>
-          <p:nvSpPr>
-            <p:cNvPr id="55" name="CustomShape 15"/>
-            <p:cNvSpPr/>
-            <p:nvPr/>
-          </p:nvSpPr>
-          <p:spPr>
-            <a:xfrm rot="5400000" flipH="1">
-              <a:off x="7599960" y="2731680"/>
-              <a:ext cx="746640" cy="12240"/>
-            </a:xfrm>
-            <a:prstGeom prst="curvedConnector5">
-              <a:avLst>
-                <a:gd name="adj1" fmla="val -30602"/>
-                <a:gd name="adj2" fmla="val -7077638"/>
-                <a:gd name="adj3" fmla="val 130602"/>
-              </a:avLst>
-            </a:prstGeom>
-            <a:noFill/>
-            <a:ln w="38160">
-              <a:tailEnd type="triangle" w="med" len="med"/>
-            </a:ln>
-          </p:spPr>
-          <p:style>
-            <a:lnRef idx="1">
-              <a:schemeClr val="accent1"/>
-            </a:lnRef>
-            <a:fillRef idx="0">
-              <a:schemeClr val="accent1"/>
-            </a:fillRef>
-            <a:effectRef idx="0">
-              <a:schemeClr val="accent1"/>
-            </a:effectRef>
-            <a:fontRef idx="minor"/>
-          </p:style>
-        </p:sp>
-        <p:sp>
-          <p:nvSpPr>
-            <p:cNvPr id="56" name="CustomShape 16"/>
-            <p:cNvSpPr/>
-            <p:nvPr/>
-          </p:nvSpPr>
-          <p:spPr>
-            <a:xfrm>
-              <a:off x="1546560" y="767520"/>
-              <a:ext cx="619200" cy="360"/>
-            </a:xfrm>
-            <a:custGeom>
-              <a:avLst/>
-              <a:gdLst/>
-              <a:ahLst/>
-              <a:cxnLst/>
-              <a:rect l="l" t="t" r="r" b="b"/>
-              <a:pathLst>
-                <a:path w="21600" h="21600">
-                  <a:moveTo>
-                    <a:pt x="0" y="0"/>
-                  </a:moveTo>
-                  <a:lnTo>
-                    <a:pt x="21600" y="21600"/>
-                  </a:lnTo>
-                </a:path>
-              </a:pathLst>
-            </a:custGeom>
-            <a:noFill/>
-            <a:ln w="38160">
-              <a:tailEnd type="triangle" w="med" len="med"/>
-            </a:ln>
-          </p:spPr>
-          <p:style>
-            <a:lnRef idx="1">
-              <a:schemeClr val="accent1"/>
-            </a:lnRef>
-            <a:fillRef idx="0">
-              <a:schemeClr val="accent1"/>
-            </a:fillRef>
-            <a:effectRef idx="0">
-              <a:schemeClr val="accent1"/>
-            </a:effectRef>
-            <a:fontRef idx="minor"/>
-          </p:style>
-        </p:sp>
-        <p:sp>
-          <p:nvSpPr>
-            <p:cNvPr id="57" name="CustomShape 17"/>
-            <p:cNvSpPr/>
-            <p:nvPr/>
-          </p:nvSpPr>
-          <p:spPr>
-            <a:xfrm>
-              <a:off x="485640" y="594360"/>
-              <a:ext cx="1060560" cy="638280"/>
+              <a:off x="643913" y="5438435"/>
+              <a:ext cx="1400760" cy="644877"/>
             </a:xfrm>
             <a:prstGeom prst="rect">
               <a:avLst/>
@@ -3069,657 +3842,24 @@
                 </a:lnSpc>
               </a:pPr>
               <a:r>
-                <a:rPr lang="en-US" sz="1800" b="0" strike="noStrike" spc="-1">
+                <a:rPr lang="en-US" i="1" spc="-1" dirty="0">
                   <a:solidFill>
                     <a:srgbClr val="000000"/>
                   </a:solidFill>
                   <a:latin typeface="Calibri"/>
                 </a:rPr>
-                <a:t>BOOT UP</a:t>
+                <a:t>t</a:t>
               </a:r>
-              <a:endParaRPr lang="en-US" sz="1800" b="0" strike="noStrike" spc="-1">
-                <a:latin typeface="Nimbus Sans"/>
-              </a:endParaRPr>
-            </a:p>
-          </p:txBody>
-        </p:sp>
-        <p:sp>
-          <p:nvSpPr>
-            <p:cNvPr id="58" name="CustomShape 18"/>
-            <p:cNvSpPr/>
-            <p:nvPr/>
-          </p:nvSpPr>
-          <p:spPr>
-            <a:xfrm rot="5400000" flipH="1">
-              <a:off x="3603600" y="792000"/>
-              <a:ext cx="746640" cy="12240"/>
-            </a:xfrm>
-            <a:prstGeom prst="curvedConnector5">
-              <a:avLst>
-                <a:gd name="adj1" fmla="val -30602"/>
-                <a:gd name="adj2" fmla="val -7308929"/>
-                <a:gd name="adj3" fmla="val 130602"/>
-              </a:avLst>
-            </a:prstGeom>
-            <a:noFill/>
-            <a:ln w="38160">
-              <a:tailEnd type="triangle" w="med" len="med"/>
-            </a:ln>
-          </p:spPr>
-          <p:style>
-            <a:lnRef idx="1">
-              <a:schemeClr val="accent1"/>
-            </a:lnRef>
-            <a:fillRef idx="0">
-              <a:schemeClr val="accent1"/>
-            </a:fillRef>
-            <a:effectRef idx="0">
-              <a:schemeClr val="accent1"/>
-            </a:effectRef>
-            <a:fontRef idx="minor"/>
-          </p:style>
-        </p:sp>
-        <p:sp>
-          <p:nvSpPr>
-            <p:cNvPr id="59" name="CustomShape 19"/>
-            <p:cNvSpPr/>
-            <p:nvPr/>
-          </p:nvSpPr>
-          <p:spPr>
-            <a:xfrm>
-              <a:off x="615960" y="1893600"/>
-              <a:ext cx="1860480" cy="364680"/>
-            </a:xfrm>
-            <a:prstGeom prst="rect">
-              <a:avLst/>
-            </a:prstGeom>
-            <a:noFill/>
-            <a:ln>
-              <a:noFill/>
-            </a:ln>
-          </p:spPr>
-          <p:style>
-            <a:lnRef idx="0">
-              <a:scrgbClr r="0" g="0" b="0"/>
-            </a:lnRef>
-            <a:fillRef idx="0">
-              <a:scrgbClr r="0" g="0" b="0"/>
-            </a:fillRef>
-            <a:effectRef idx="0">
-              <a:scrgbClr r="0" g="0" b="0"/>
-            </a:effectRef>
-            <a:fontRef idx="minor"/>
-          </p:style>
-          <p:txBody>
-            <a:bodyPr lIns="90000" tIns="45000" rIns="90000" bIns="45000">
-              <a:spAutoFit/>
-            </a:bodyPr>
-            <a:lstStyle/>
-            <a:p>
-              <a:pPr>
-                <a:lnSpc>
-                  <a:spcPct val="100000"/>
-                </a:lnSpc>
-              </a:pPr>
               <a:r>
-                <a:rPr lang="en-US" sz="1800" b="1" strike="noStrike" spc="-1">
-                  <a:solidFill>
-                    <a:srgbClr val="C00000"/>
-                  </a:solidFill>
-                  <a:latin typeface="Calibri"/>
-                </a:rPr>
-                <a:t>Broadcast</a:t>
-              </a:r>
-              <a:endParaRPr lang="en-US" sz="1800" b="0" strike="noStrike" spc="-1">
-                <a:latin typeface="Nimbus Sans"/>
-              </a:endParaRPr>
-            </a:p>
-          </p:txBody>
-        </p:sp>
-        <p:sp>
-          <p:nvSpPr>
-            <p:cNvPr id="60" name="CustomShape 20"/>
-            <p:cNvSpPr/>
-            <p:nvPr/>
-          </p:nvSpPr>
-          <p:spPr>
-            <a:xfrm>
-              <a:off x="632160" y="3760200"/>
-              <a:ext cx="1860480" cy="364680"/>
-            </a:xfrm>
-            <a:prstGeom prst="rect">
-              <a:avLst/>
-            </a:prstGeom>
-            <a:noFill/>
-            <a:ln>
-              <a:noFill/>
-            </a:ln>
-          </p:spPr>
-          <p:style>
-            <a:lnRef idx="0">
-              <a:scrgbClr r="0" g="0" b="0"/>
-            </a:lnRef>
-            <a:fillRef idx="0">
-              <a:scrgbClr r="0" g="0" b="0"/>
-            </a:fillRef>
-            <a:effectRef idx="0">
-              <a:scrgbClr r="0" g="0" b="0"/>
-            </a:effectRef>
-            <a:fontRef idx="minor"/>
-          </p:style>
-          <p:txBody>
-            <a:bodyPr lIns="90000" tIns="45000" rIns="90000" bIns="45000">
-              <a:spAutoFit/>
-            </a:bodyPr>
-            <a:lstStyle/>
-            <a:p>
-              <a:pPr>
-                <a:lnSpc>
-                  <a:spcPct val="100000"/>
-                </a:lnSpc>
-              </a:pPr>
-              <a:r>
-                <a:rPr lang="en-US" sz="1800" b="1" strike="noStrike" spc="-1">
-                  <a:solidFill>
-                    <a:srgbClr val="002060"/>
-                  </a:solidFill>
-                  <a:latin typeface="Calibri"/>
-                </a:rPr>
-                <a:t>Unicast</a:t>
-              </a:r>
-              <a:endParaRPr lang="en-US" sz="1800" b="0" strike="noStrike" spc="-1">
-                <a:latin typeface="Nimbus Sans"/>
-              </a:endParaRPr>
-            </a:p>
-          </p:txBody>
-        </p:sp>
-        <p:sp>
-          <p:nvSpPr>
-            <p:cNvPr id="61" name="CustomShape 21"/>
-            <p:cNvSpPr/>
-            <p:nvPr/>
-          </p:nvSpPr>
-          <p:spPr>
-            <a:xfrm>
-              <a:off x="2477160" y="1300320"/>
-              <a:ext cx="1400760" cy="638280"/>
-            </a:xfrm>
-            <a:prstGeom prst="rect">
-              <a:avLst/>
-            </a:prstGeom>
-            <a:noFill/>
-            <a:ln>
-              <a:noFill/>
-            </a:ln>
-          </p:spPr>
-          <p:style>
-            <a:lnRef idx="0">
-              <a:scrgbClr r="0" g="0" b="0"/>
-            </a:lnRef>
-            <a:fillRef idx="0">
-              <a:scrgbClr r="0" g="0" b="0"/>
-            </a:fillRef>
-            <a:effectRef idx="0">
-              <a:scrgbClr r="0" g="0" b="0"/>
-            </a:effectRef>
-            <a:fontRef idx="minor"/>
-          </p:style>
-          <p:txBody>
-            <a:bodyPr lIns="90000" tIns="45000" rIns="90000" bIns="45000">
-              <a:spAutoFit/>
-            </a:bodyPr>
-            <a:lstStyle/>
-            <a:p>
-              <a:pPr>
-                <a:lnSpc>
-                  <a:spcPct val="100000"/>
-                </a:lnSpc>
-              </a:pPr>
-              <a:r>
-                <a:rPr lang="en-US" sz="1800" b="0" i="1" strike="noStrike" spc="-1">
+                <a:rPr lang="en-US" sz="1800" b="0" i="1" strike="noStrike" spc="-1" dirty="0">
                   <a:solidFill>
                     <a:srgbClr val="000000"/>
                   </a:solidFill>
                   <a:latin typeface="Calibri"/>
                 </a:rPr>
-                <a:t>button  press</a:t>
+                <a:t>ransmission error</a:t>
               </a:r>
-              <a:endParaRPr lang="en-US" sz="1800" b="0" strike="noStrike" spc="-1">
-                <a:latin typeface="Nimbus Sans"/>
-              </a:endParaRPr>
-            </a:p>
-          </p:txBody>
-        </p:sp>
-        <p:sp>
-          <p:nvSpPr>
-            <p:cNvPr id="62" name="CustomShape 22"/>
-            <p:cNvSpPr/>
-            <p:nvPr/>
-          </p:nvSpPr>
-          <p:spPr>
-            <a:xfrm>
-              <a:off x="3177720" y="3201120"/>
-              <a:ext cx="1400760" cy="364680"/>
-            </a:xfrm>
-            <a:prstGeom prst="rect">
-              <a:avLst/>
-            </a:prstGeom>
-            <a:noFill/>
-            <a:ln>
-              <a:noFill/>
-            </a:ln>
-          </p:spPr>
-          <p:style>
-            <a:lnRef idx="0">
-              <a:scrgbClr r="0" g="0" b="0"/>
-            </a:lnRef>
-            <a:fillRef idx="0">
-              <a:scrgbClr r="0" g="0" b="0"/>
-            </a:fillRef>
-            <a:effectRef idx="0">
-              <a:scrgbClr r="0" g="0" b="0"/>
-            </a:effectRef>
-            <a:fontRef idx="minor"/>
-          </p:style>
-          <p:txBody>
-            <a:bodyPr lIns="90000" tIns="45000" rIns="90000" bIns="45000">
-              <a:spAutoFit/>
-            </a:bodyPr>
-            <a:lstStyle/>
-            <a:p>
-              <a:pPr>
-                <a:lnSpc>
-                  <a:spcPct val="100000"/>
-                </a:lnSpc>
-              </a:pPr>
-              <a:r>
-                <a:rPr lang="en-US" sz="1800" b="0" i="1" strike="noStrike" spc="-1">
-                  <a:solidFill>
-                    <a:srgbClr val="000000"/>
-                  </a:solidFill>
-                  <a:latin typeface="Calibri"/>
-                </a:rPr>
-                <a:t>complete</a:t>
-              </a:r>
-              <a:endParaRPr lang="en-US" sz="1800" b="0" strike="noStrike" spc="-1">
-                <a:latin typeface="Nimbus Sans"/>
-              </a:endParaRPr>
-            </a:p>
-          </p:txBody>
-        </p:sp>
-        <p:sp>
-          <p:nvSpPr>
-            <p:cNvPr id="63" name="CustomShape 23"/>
-            <p:cNvSpPr/>
-            <p:nvPr/>
-          </p:nvSpPr>
-          <p:spPr>
-            <a:xfrm rot="5400000" flipH="1">
-              <a:off x="3564720" y="4207680"/>
-              <a:ext cx="746640" cy="12240"/>
-            </a:xfrm>
-            <a:prstGeom prst="curvedConnector5">
-              <a:avLst>
-                <a:gd name="adj1" fmla="val -30602"/>
-                <a:gd name="adj2" fmla="val -7131142"/>
-                <a:gd name="adj3" fmla="val 130602"/>
-              </a:avLst>
-            </a:prstGeom>
-            <a:noFill/>
-            <a:ln w="38160">
-              <a:tailEnd type="triangle" w="med" len="med"/>
-            </a:ln>
-          </p:spPr>
-          <p:style>
-            <a:lnRef idx="1">
-              <a:schemeClr val="accent1"/>
-            </a:lnRef>
-            <a:fillRef idx="0">
-              <a:schemeClr val="accent1"/>
-            </a:fillRef>
-            <a:effectRef idx="0">
-              <a:schemeClr val="accent1"/>
-            </a:effectRef>
-            <a:fontRef idx="minor"/>
-          </p:style>
-        </p:sp>
-        <p:sp>
-          <p:nvSpPr>
-            <p:cNvPr id="64" name="CustomShape 24"/>
-            <p:cNvSpPr/>
-            <p:nvPr/>
-          </p:nvSpPr>
-          <p:spPr>
-            <a:xfrm>
-              <a:off x="4826880" y="4023360"/>
-              <a:ext cx="1400760" cy="364680"/>
-            </a:xfrm>
-            <a:prstGeom prst="rect">
-              <a:avLst/>
-            </a:prstGeom>
-            <a:noFill/>
-            <a:ln>
-              <a:noFill/>
-            </a:ln>
-          </p:spPr>
-          <p:style>
-            <a:lnRef idx="0">
-              <a:scrgbClr r="0" g="0" b="0"/>
-            </a:lnRef>
-            <a:fillRef idx="0">
-              <a:scrgbClr r="0" g="0" b="0"/>
-            </a:fillRef>
-            <a:effectRef idx="0">
-              <a:scrgbClr r="0" g="0" b="0"/>
-            </a:effectRef>
-            <a:fontRef idx="minor"/>
-          </p:style>
-          <p:txBody>
-            <a:bodyPr lIns="90000" tIns="45000" rIns="90000" bIns="45000">
-              <a:spAutoFit/>
-            </a:bodyPr>
-            <a:lstStyle/>
-            <a:p>
-              <a:pPr>
-                <a:lnSpc>
-                  <a:spcPct val="100000"/>
-                </a:lnSpc>
-              </a:pPr>
-              <a:r>
-                <a:rPr lang="en-US" sz="1800" b="0" i="1" strike="noStrike" spc="-1">
-                  <a:solidFill>
-                    <a:srgbClr val="000000"/>
-                  </a:solidFill>
-                  <a:latin typeface="Calibri"/>
-                </a:rPr>
-                <a:t>next Mote</a:t>
-              </a:r>
-              <a:endParaRPr lang="en-US" sz="1800" b="0" strike="noStrike" spc="-1">
-                <a:latin typeface="Nimbus Sans"/>
-              </a:endParaRPr>
-            </a:p>
-          </p:txBody>
-        </p:sp>
-        <p:sp>
-          <p:nvSpPr>
-            <p:cNvPr id="65" name="CustomShape 25"/>
-            <p:cNvSpPr/>
-            <p:nvPr/>
-          </p:nvSpPr>
-          <p:spPr>
-            <a:xfrm>
-              <a:off x="1922760" y="6188760"/>
-              <a:ext cx="1400760" cy="639000"/>
-            </a:xfrm>
-            <a:prstGeom prst="rect">
-              <a:avLst/>
-            </a:prstGeom>
-            <a:noFill/>
-            <a:ln>
-              <a:noFill/>
-            </a:ln>
-          </p:spPr>
-          <p:style>
-            <a:lnRef idx="0">
-              <a:scrgbClr r="0" g="0" b="0"/>
-            </a:lnRef>
-            <a:fillRef idx="0">
-              <a:scrgbClr r="0" g="0" b="0"/>
-            </a:fillRef>
-            <a:effectRef idx="0">
-              <a:scrgbClr r="0" g="0" b="0"/>
-            </a:effectRef>
-            <a:fontRef idx="minor"/>
-          </p:style>
-          <p:txBody>
-            <a:bodyPr lIns="90000" tIns="45000" rIns="90000" bIns="45000">
-              <a:spAutoFit/>
-            </a:bodyPr>
-            <a:lstStyle/>
-            <a:p>
-              <a:pPr>
-                <a:lnSpc>
-                  <a:spcPct val="100000"/>
-                </a:lnSpc>
-              </a:pPr>
-              <a:r>
-                <a:rPr lang="en-US" sz="1800" b="0" i="1" strike="noStrike" spc="-1">
-                  <a:solidFill>
-                    <a:srgbClr val="000000"/>
-                  </a:solidFill>
-                  <a:latin typeface="Calibri"/>
-                </a:rPr>
-                <a:t>automatic or manual</a:t>
-              </a:r>
-              <a:endParaRPr lang="en-US" sz="1800" b="0" strike="noStrike" spc="-1">
-                <a:latin typeface="Nimbus Sans"/>
-              </a:endParaRPr>
-            </a:p>
-          </p:txBody>
-        </p:sp>
-        <p:sp>
-          <p:nvSpPr>
-            <p:cNvPr id="66" name="CustomShape 26"/>
-            <p:cNvSpPr/>
-            <p:nvPr/>
-          </p:nvSpPr>
-          <p:spPr>
-            <a:xfrm>
-              <a:off x="4871160" y="5562360"/>
-              <a:ext cx="1400760" cy="364680"/>
-            </a:xfrm>
-            <a:prstGeom prst="rect">
-              <a:avLst/>
-            </a:prstGeom>
-            <a:noFill/>
-            <a:ln>
-              <a:noFill/>
-            </a:ln>
-          </p:spPr>
-          <p:style>
-            <a:lnRef idx="0">
-              <a:scrgbClr r="0" g="0" b="0"/>
-            </a:lnRef>
-            <a:fillRef idx="0">
-              <a:scrgbClr r="0" g="0" b="0"/>
-            </a:fillRef>
-            <a:effectRef idx="0">
-              <a:scrgbClr r="0" g="0" b="0"/>
-            </a:effectRef>
-            <a:fontRef idx="minor"/>
-          </p:style>
-          <p:txBody>
-            <a:bodyPr lIns="90000" tIns="45000" rIns="90000" bIns="45000">
-              <a:spAutoFit/>
-            </a:bodyPr>
-            <a:lstStyle/>
-            <a:p>
-              <a:pPr>
-                <a:lnSpc>
-                  <a:spcPct val="100000"/>
-                </a:lnSpc>
-              </a:pPr>
-              <a:r>
-                <a:rPr lang="en-US" sz="1800" b="0" i="1" strike="noStrike" spc="-1">
-                  <a:solidFill>
-                    <a:srgbClr val="000000"/>
-                  </a:solidFill>
-                  <a:latin typeface="Calibri"/>
-                </a:rPr>
-                <a:t>next Mote</a:t>
-              </a:r>
-              <a:endParaRPr lang="en-US" sz="1800" b="0" strike="noStrike" spc="-1">
-                <a:latin typeface="Nimbus Sans"/>
-              </a:endParaRPr>
-            </a:p>
-          </p:txBody>
-        </p:sp>
-        <p:sp>
-          <p:nvSpPr>
-            <p:cNvPr id="67" name="CustomShape 27"/>
-            <p:cNvSpPr/>
-            <p:nvPr/>
-          </p:nvSpPr>
-          <p:spPr>
-            <a:xfrm>
-              <a:off x="3171960" y="4685400"/>
-              <a:ext cx="1400760" cy="364680"/>
-            </a:xfrm>
-            <a:prstGeom prst="rect">
-              <a:avLst/>
-            </a:prstGeom>
-            <a:noFill/>
-            <a:ln>
-              <a:noFill/>
-            </a:ln>
-          </p:spPr>
-          <p:style>
-            <a:lnRef idx="0">
-              <a:scrgbClr r="0" g="0" b="0"/>
-            </a:lnRef>
-            <a:fillRef idx="0">
-              <a:scrgbClr r="0" g="0" b="0"/>
-            </a:fillRef>
-            <a:effectRef idx="0">
-              <a:scrgbClr r="0" g="0" b="0"/>
-            </a:effectRef>
-            <a:fontRef idx="minor"/>
-          </p:style>
-          <p:txBody>
-            <a:bodyPr lIns="90000" tIns="45000" rIns="90000" bIns="45000">
-              <a:spAutoFit/>
-            </a:bodyPr>
-            <a:lstStyle/>
-            <a:p>
-              <a:pPr>
-                <a:lnSpc>
-                  <a:spcPct val="100000"/>
-                </a:lnSpc>
-              </a:pPr>
-              <a:r>
-                <a:rPr lang="en-US" sz="1800" b="0" i="1" strike="noStrike" spc="-1">
-                  <a:solidFill>
-                    <a:srgbClr val="000000"/>
-                  </a:solidFill>
-                  <a:latin typeface="Calibri"/>
-                </a:rPr>
-                <a:t>complete</a:t>
-              </a:r>
-              <a:endParaRPr lang="en-US" sz="1800" b="0" strike="noStrike" spc="-1">
-                <a:latin typeface="Nimbus Sans"/>
-              </a:endParaRPr>
-            </a:p>
-          </p:txBody>
-        </p:sp>
-        <p:sp>
-          <p:nvSpPr>
-            <p:cNvPr id="68" name="CustomShape 28"/>
-            <p:cNvSpPr/>
-            <p:nvPr/>
-          </p:nvSpPr>
-          <p:spPr>
-            <a:xfrm>
-              <a:off x="7743240" y="1738440"/>
-              <a:ext cx="1400760" cy="364680"/>
-            </a:xfrm>
-            <a:prstGeom prst="rect">
-              <a:avLst/>
-            </a:prstGeom>
-            <a:noFill/>
-            <a:ln>
-              <a:noFill/>
-            </a:ln>
-          </p:spPr>
-          <p:style>
-            <a:lnRef idx="0">
-              <a:scrgbClr r="0" g="0" b="0"/>
-            </a:lnRef>
-            <a:fillRef idx="0">
-              <a:scrgbClr r="0" g="0" b="0"/>
-            </a:fillRef>
-            <a:effectRef idx="0">
-              <a:scrgbClr r="0" g="0" b="0"/>
-            </a:effectRef>
-            <a:fontRef idx="minor"/>
-          </p:style>
-          <p:txBody>
-            <a:bodyPr lIns="90000" tIns="45000" rIns="90000" bIns="45000">
-              <a:spAutoFit/>
-            </a:bodyPr>
-            <a:lstStyle/>
-            <a:p>
-              <a:pPr>
-                <a:lnSpc>
-                  <a:spcPct val="100000"/>
-                </a:lnSpc>
-              </a:pPr>
-              <a:r>
-                <a:rPr lang="en-US" sz="1800" b="0" i="1" strike="noStrike" spc="-1">
-                  <a:solidFill>
-                    <a:srgbClr val="000000"/>
-                  </a:solidFill>
-                  <a:latin typeface="Calibri"/>
-                </a:rPr>
-                <a:t>Emergency</a:t>
-              </a:r>
-              <a:endParaRPr lang="en-US" sz="1800" b="0" strike="noStrike" spc="-1">
-                <a:latin typeface="Nimbus Sans"/>
-              </a:endParaRPr>
-            </a:p>
-          </p:txBody>
-        </p:sp>
-        <p:sp>
-          <p:nvSpPr>
-            <p:cNvPr id="69" name="CustomShape 29"/>
-            <p:cNvSpPr/>
-            <p:nvPr/>
-          </p:nvSpPr>
-          <p:spPr>
-            <a:xfrm>
-              <a:off x="4572000" y="2012760"/>
-              <a:ext cx="1400760" cy="638280"/>
-            </a:xfrm>
-            <a:prstGeom prst="rect">
-              <a:avLst/>
-            </a:prstGeom>
-            <a:noFill/>
-            <a:ln>
-              <a:noFill/>
-            </a:ln>
-          </p:spPr>
-          <p:style>
-            <a:lnRef idx="0">
-              <a:scrgbClr r="0" g="0" b="0"/>
-            </a:lnRef>
-            <a:fillRef idx="0">
-              <a:scrgbClr r="0" g="0" b="0"/>
-            </a:fillRef>
-            <a:effectRef idx="0">
-              <a:scrgbClr r="0" g="0" b="0"/>
-            </a:effectRef>
-            <a:fontRef idx="minor"/>
-          </p:style>
-          <p:txBody>
-            <a:bodyPr lIns="90000" tIns="45000" rIns="90000" bIns="45000">
-              <a:spAutoFit/>
-            </a:bodyPr>
-            <a:lstStyle/>
-            <a:p>
-              <a:pPr>
-                <a:lnSpc>
-                  <a:spcPct val="100000"/>
-                </a:lnSpc>
-              </a:pPr>
-              <a:r>
-                <a:rPr lang="en-US" sz="1800" b="0" i="1" strike="noStrike" spc="-1">
-                  <a:solidFill>
-                    <a:srgbClr val="000000"/>
-                  </a:solidFill>
-                  <a:latin typeface="Calibri"/>
-                </a:rPr>
-                <a:t>Resume Operation</a:t>
-              </a:r>
-              <a:endParaRPr lang="en-US" sz="1800" b="0" strike="noStrike" spc="-1">
+              <a:endParaRPr lang="en-US" sz="1800" b="0" strike="noStrike" spc="-1" dirty="0">
                 <a:latin typeface="Nimbus Sans"/>
               </a:endParaRPr>
             </a:p>

</xml_diff>